<commit_message>
Added new Ui pictures and add Ui introduction
</commit_message>
<xml_diff>
--- a/docs/2103UG.pptx
+++ b/docs/2103UG.pptx
@@ -8,6 +8,8 @@
     <p:sldId id="256" r:id="rId2"/>
     <p:sldId id="257" r:id="rId3"/>
     <p:sldId id="258" r:id="rId4"/>
+    <p:sldId id="259" r:id="rId5"/>
+    <p:sldId id="260" r:id="rId6"/>
   </p:sldIdLst>
   <p:sldSz cx="12192000" cy="6858000"/>
   <p:notesSz cx="6858000" cy="9144000"/>
@@ -263,7 +265,7 @@
           <a:p>
             <a:fld id="{EB7151ED-93A3-4DE6-9A0B-D1B289A286F2}" type="datetimeFigureOut">
               <a:rPr lang="en-SG" smtClean="0"/>
-              <a:t>30/3/2023</a:t>
+              <a:t>31/3/23</a:t>
             </a:fld>
             <a:endParaRPr lang="en-SG"/>
           </a:p>
@@ -463,7 +465,7 @@
           <a:p>
             <a:fld id="{EB7151ED-93A3-4DE6-9A0B-D1B289A286F2}" type="datetimeFigureOut">
               <a:rPr lang="en-SG" smtClean="0"/>
-              <a:t>30/3/2023</a:t>
+              <a:t>31/3/23</a:t>
             </a:fld>
             <a:endParaRPr lang="en-SG"/>
           </a:p>
@@ -673,7 +675,7 @@
           <a:p>
             <a:fld id="{EB7151ED-93A3-4DE6-9A0B-D1B289A286F2}" type="datetimeFigureOut">
               <a:rPr lang="en-SG" smtClean="0"/>
-              <a:t>30/3/2023</a:t>
+              <a:t>31/3/23</a:t>
             </a:fld>
             <a:endParaRPr lang="en-SG"/>
           </a:p>
@@ -873,7 +875,7 @@
           <a:p>
             <a:fld id="{EB7151ED-93A3-4DE6-9A0B-D1B289A286F2}" type="datetimeFigureOut">
               <a:rPr lang="en-SG" smtClean="0"/>
-              <a:t>30/3/2023</a:t>
+              <a:t>31/3/23</a:t>
             </a:fld>
             <a:endParaRPr lang="en-SG"/>
           </a:p>
@@ -1149,7 +1151,7 @@
           <a:p>
             <a:fld id="{EB7151ED-93A3-4DE6-9A0B-D1B289A286F2}" type="datetimeFigureOut">
               <a:rPr lang="en-SG" smtClean="0"/>
-              <a:t>30/3/2023</a:t>
+              <a:t>31/3/23</a:t>
             </a:fld>
             <a:endParaRPr lang="en-SG"/>
           </a:p>
@@ -1417,7 +1419,7 @@
           <a:p>
             <a:fld id="{EB7151ED-93A3-4DE6-9A0B-D1B289A286F2}" type="datetimeFigureOut">
               <a:rPr lang="en-SG" smtClean="0"/>
-              <a:t>30/3/2023</a:t>
+              <a:t>31/3/23</a:t>
             </a:fld>
             <a:endParaRPr lang="en-SG"/>
           </a:p>
@@ -1832,7 +1834,7 @@
           <a:p>
             <a:fld id="{EB7151ED-93A3-4DE6-9A0B-D1B289A286F2}" type="datetimeFigureOut">
               <a:rPr lang="en-SG" smtClean="0"/>
-              <a:t>30/3/2023</a:t>
+              <a:t>31/3/23</a:t>
             </a:fld>
             <a:endParaRPr lang="en-SG"/>
           </a:p>
@@ -1974,7 +1976,7 @@
           <a:p>
             <a:fld id="{EB7151ED-93A3-4DE6-9A0B-D1B289A286F2}" type="datetimeFigureOut">
               <a:rPr lang="en-SG" smtClean="0"/>
-              <a:t>30/3/2023</a:t>
+              <a:t>31/3/23</a:t>
             </a:fld>
             <a:endParaRPr lang="en-SG"/>
           </a:p>
@@ -2087,7 +2089,7 @@
           <a:p>
             <a:fld id="{EB7151ED-93A3-4DE6-9A0B-D1B289A286F2}" type="datetimeFigureOut">
               <a:rPr lang="en-SG" smtClean="0"/>
-              <a:t>30/3/2023</a:t>
+              <a:t>31/3/23</a:t>
             </a:fld>
             <a:endParaRPr lang="en-SG"/>
           </a:p>
@@ -2400,7 +2402,7 @@
           <a:p>
             <a:fld id="{EB7151ED-93A3-4DE6-9A0B-D1B289A286F2}" type="datetimeFigureOut">
               <a:rPr lang="en-SG" smtClean="0"/>
-              <a:t>30/3/2023</a:t>
+              <a:t>31/3/23</a:t>
             </a:fld>
             <a:endParaRPr lang="en-SG"/>
           </a:p>
@@ -2689,7 +2691,7 @@
           <a:p>
             <a:fld id="{EB7151ED-93A3-4DE6-9A0B-D1B289A286F2}" type="datetimeFigureOut">
               <a:rPr lang="en-SG" smtClean="0"/>
-              <a:t>30/3/2023</a:t>
+              <a:t>31/3/23</a:t>
             </a:fld>
             <a:endParaRPr lang="en-SG"/>
           </a:p>
@@ -2932,7 +2934,7 @@
           <a:p>
             <a:fld id="{EB7151ED-93A3-4DE6-9A0B-D1B289A286F2}" type="datetimeFigureOut">
               <a:rPr lang="en-SG" smtClean="0"/>
-              <a:t>30/3/2023</a:t>
+              <a:t>31/3/23</a:t>
             </a:fld>
             <a:endParaRPr lang="en-SG"/>
           </a:p>
@@ -4875,6 +4877,1146 @@
 </p:sld>
 </file>
 
+<file path=ppt/slides/slide4.xml><?xml version="1.0" encoding="utf-8"?>
+<p:sld xmlns:a="http://schemas.openxmlformats.org/drawingml/2006/main" xmlns:r="http://schemas.openxmlformats.org/officeDocument/2006/relationships" xmlns:p="http://schemas.openxmlformats.org/presentationml/2006/main">
+  <p:cSld>
+    <p:spTree>
+      <p:nvGrpSpPr>
+        <p:cNvPr id="1" name=""/>
+        <p:cNvGrpSpPr/>
+        <p:nvPr/>
+      </p:nvGrpSpPr>
+      <p:grpSpPr>
+        <a:xfrm>
+          <a:off x="0" y="0"/>
+          <a:ext cx="0" cy="0"/>
+          <a:chOff x="0" y="0"/>
+          <a:chExt cx="0" cy="0"/>
+        </a:xfrm>
+      </p:grpSpPr>
+      <p:pic>
+        <p:nvPicPr>
+          <p:cNvPr id="7" name="Picture 6" descr="A screenshot of a computer&#10;&#10;Description automatically generated with medium confidence">
+            <a:extLst>
+              <a:ext uri="{FF2B5EF4-FFF2-40B4-BE49-F238E27FC236}">
+                <a16:creationId xmlns:a16="http://schemas.microsoft.com/office/drawing/2014/main" id="{B6ED7993-029F-3991-0E7F-B7FA2173BF82}"/>
+              </a:ext>
+            </a:extLst>
+          </p:cNvPr>
+          <p:cNvPicPr>
+            <a:picLocks noChangeAspect="1"/>
+          </p:cNvPicPr>
+          <p:nvPr/>
+        </p:nvPicPr>
+        <p:blipFill>
+          <a:blip r:embed="rId2">
+            <a:extLst>
+              <a:ext uri="{28A0092B-C50C-407E-A947-70E740481C1C}">
+                <a14:useLocalDpi xmlns:a14="http://schemas.microsoft.com/office/drawing/2010/main" val="0"/>
+              </a:ext>
+            </a:extLst>
+          </a:blip>
+          <a:stretch>
+            <a:fillRect/>
+          </a:stretch>
+        </p:blipFill>
+        <p:spPr>
+          <a:xfrm>
+            <a:off x="1756299" y="155196"/>
+            <a:ext cx="8358371" cy="6702804"/>
+          </a:xfrm>
+          <a:prstGeom prst="rect">
+            <a:avLst/>
+          </a:prstGeom>
+        </p:spPr>
+      </p:pic>
+    </p:spTree>
+    <p:extLst>
+      <p:ext uri="{BB962C8B-B14F-4D97-AF65-F5344CB8AC3E}">
+        <p14:creationId xmlns:p14="http://schemas.microsoft.com/office/powerpoint/2010/main" val="1420427733"/>
+      </p:ext>
+    </p:extLst>
+  </p:cSld>
+  <p:clrMapOvr>
+    <a:masterClrMapping/>
+  </p:clrMapOvr>
+</p:sld>
+</file>
+
+<file path=ppt/slides/slide5.xml><?xml version="1.0" encoding="utf-8"?>
+<p:sld xmlns:a="http://schemas.openxmlformats.org/drawingml/2006/main" xmlns:r="http://schemas.openxmlformats.org/officeDocument/2006/relationships" xmlns:p="http://schemas.openxmlformats.org/presentationml/2006/main">
+  <p:cSld>
+    <p:spTree>
+      <p:nvGrpSpPr>
+        <p:cNvPr id="1" name=""/>
+        <p:cNvGrpSpPr/>
+        <p:nvPr/>
+      </p:nvGrpSpPr>
+      <p:grpSpPr>
+        <a:xfrm>
+          <a:off x="0" y="0"/>
+          <a:ext cx="0" cy="0"/>
+          <a:chOff x="0" y="0"/>
+          <a:chExt cx="0" cy="0"/>
+        </a:xfrm>
+      </p:grpSpPr>
+      <p:grpSp>
+        <p:nvGrpSpPr>
+          <p:cNvPr id="62" name="Group 61">
+            <a:extLst>
+              <a:ext uri="{FF2B5EF4-FFF2-40B4-BE49-F238E27FC236}">
+                <a16:creationId xmlns:a16="http://schemas.microsoft.com/office/drawing/2014/main" id="{C4773E4B-46FF-85B5-C5DB-6DEF415C9679}"/>
+              </a:ext>
+            </a:extLst>
+          </p:cNvPr>
+          <p:cNvGrpSpPr/>
+          <p:nvPr/>
+        </p:nvGrpSpPr>
+        <p:grpSpPr>
+          <a:xfrm>
+            <a:off x="556246" y="290131"/>
+            <a:ext cx="10732338" cy="7110333"/>
+            <a:chOff x="556246" y="195537"/>
+            <a:chExt cx="10732338" cy="7110333"/>
+          </a:xfrm>
+        </p:grpSpPr>
+        <p:pic>
+          <p:nvPicPr>
+            <p:cNvPr id="7" name="Picture 6" descr="A screenshot of a computer&#10;&#10;Description automatically generated with medium confidence">
+              <a:extLst>
+                <a:ext uri="{FF2B5EF4-FFF2-40B4-BE49-F238E27FC236}">
+                  <a16:creationId xmlns:a16="http://schemas.microsoft.com/office/drawing/2014/main" id="{B6ED7993-029F-3991-0E7F-B7FA2173BF82}"/>
+                </a:ext>
+              </a:extLst>
+            </p:cNvPr>
+            <p:cNvPicPr>
+              <a:picLocks noChangeAspect="1"/>
+            </p:cNvPicPr>
+            <p:nvPr/>
+          </p:nvPicPr>
+          <p:blipFill>
+            <a:blip r:embed="rId2">
+              <a:extLst>
+                <a:ext uri="{28A0092B-C50C-407E-A947-70E740481C1C}">
+                  <a14:useLocalDpi xmlns:a14="http://schemas.microsoft.com/office/drawing/2010/main" val="0"/>
+                </a:ext>
+              </a:extLst>
+            </a:blip>
+            <a:stretch>
+              <a:fillRect/>
+            </a:stretch>
+          </p:blipFill>
+          <p:spPr>
+            <a:xfrm>
+              <a:off x="1944950" y="1204045"/>
+              <a:ext cx="7608952" cy="6101825"/>
+            </a:xfrm>
+            <a:prstGeom prst="rect">
+              <a:avLst/>
+            </a:prstGeom>
+          </p:spPr>
+        </p:pic>
+        <p:sp>
+          <p:nvSpPr>
+            <p:cNvPr id="5" name="Rounded Rectangle 4">
+              <a:extLst>
+                <a:ext uri="{FF2B5EF4-FFF2-40B4-BE49-F238E27FC236}">
+                  <a16:creationId xmlns:a16="http://schemas.microsoft.com/office/drawing/2014/main" id="{4C53B0D9-FD4C-9DB0-7278-5FB52F165392}"/>
+                </a:ext>
+              </a:extLst>
+            </p:cNvPr>
+            <p:cNvSpPr/>
+            <p:nvPr/>
+          </p:nvSpPr>
+          <p:spPr>
+            <a:xfrm>
+              <a:off x="9524584" y="777763"/>
+              <a:ext cx="1764000" cy="1555513"/>
+            </a:xfrm>
+            <a:prstGeom prst="roundRect">
+              <a:avLst/>
+            </a:prstGeom>
+            <a:solidFill>
+              <a:srgbClr val="3E7589"/>
+            </a:solidFill>
+            <a:ln w="38100">
+              <a:solidFill>
+                <a:srgbClr val="3E7589"/>
+              </a:solidFill>
+            </a:ln>
+          </p:spPr>
+          <p:style>
+            <a:lnRef idx="2">
+              <a:schemeClr val="accent1">
+                <a:shade val="50000"/>
+              </a:schemeClr>
+            </a:lnRef>
+            <a:fillRef idx="1">
+              <a:schemeClr val="accent1"/>
+            </a:fillRef>
+            <a:effectRef idx="0">
+              <a:schemeClr val="accent1"/>
+            </a:effectRef>
+            <a:fontRef idx="minor">
+              <a:schemeClr val="lt1"/>
+            </a:fontRef>
+          </p:style>
+          <p:txBody>
+            <a:bodyPr rtlCol="0" anchor="ctr"/>
+            <a:lstStyle/>
+            <a:p>
+              <a:pPr algn="ctr"/>
+              <a:r>
+                <a:rPr lang="en-US" sz="1600" b="1" dirty="0">
+                  <a:solidFill>
+                    <a:schemeClr val="bg1"/>
+                  </a:solidFill>
+                  <a:latin typeface="Segoe UI" panose="020B0502040204020203" pitchFamily="34" charset="0"/>
+                  <a:cs typeface="Segoe UI" panose="020B0502040204020203" pitchFamily="34" charset="0"/>
+                </a:rPr>
+                <a:t>Command Line</a:t>
+              </a:r>
+            </a:p>
+            <a:p>
+              <a:pPr algn="ctr"/>
+              <a:r>
+                <a:rPr lang="en-US" sz="1600" dirty="0">
+                  <a:solidFill>
+                    <a:schemeClr val="bg1"/>
+                  </a:solidFill>
+                  <a:latin typeface="Segoe UI" panose="020B0502040204020203" pitchFamily="34" charset="0"/>
+                  <a:cs typeface="Segoe UI" panose="020B0502040204020203" pitchFamily="34" charset="0"/>
+                </a:rPr>
+                <a:t>Enter commands here</a:t>
+              </a:r>
+            </a:p>
+          </p:txBody>
+        </p:sp>
+        <p:sp>
+          <p:nvSpPr>
+            <p:cNvPr id="6" name="Rounded Rectangle 5">
+              <a:extLst>
+                <a:ext uri="{FF2B5EF4-FFF2-40B4-BE49-F238E27FC236}">
+                  <a16:creationId xmlns:a16="http://schemas.microsoft.com/office/drawing/2014/main" id="{95552FA6-EB44-3823-9C4A-E8891F8CACEE}"/>
+                </a:ext>
+              </a:extLst>
+            </p:cNvPr>
+            <p:cNvSpPr/>
+            <p:nvPr/>
+          </p:nvSpPr>
+          <p:spPr>
+            <a:xfrm>
+              <a:off x="9514073" y="2469920"/>
+              <a:ext cx="1764000" cy="1408387"/>
+            </a:xfrm>
+            <a:prstGeom prst="roundRect">
+              <a:avLst/>
+            </a:prstGeom>
+            <a:solidFill>
+              <a:srgbClr val="3E7589"/>
+            </a:solidFill>
+            <a:ln w="38100">
+              <a:solidFill>
+                <a:srgbClr val="3E7589"/>
+              </a:solidFill>
+            </a:ln>
+          </p:spPr>
+          <p:style>
+            <a:lnRef idx="2">
+              <a:schemeClr val="accent1">
+                <a:shade val="50000"/>
+              </a:schemeClr>
+            </a:lnRef>
+            <a:fillRef idx="1">
+              <a:schemeClr val="accent1"/>
+            </a:fillRef>
+            <a:effectRef idx="0">
+              <a:schemeClr val="accent1"/>
+            </a:effectRef>
+            <a:fontRef idx="minor">
+              <a:schemeClr val="lt1"/>
+            </a:fontRef>
+          </p:style>
+          <p:txBody>
+            <a:bodyPr rtlCol="0" anchor="ctr"/>
+            <a:lstStyle/>
+            <a:p>
+              <a:pPr algn="ctr"/>
+              <a:r>
+                <a:rPr lang="en-US" sz="1600" b="1" dirty="0">
+                  <a:solidFill>
+                    <a:schemeClr val="bg1"/>
+                  </a:solidFill>
+                  <a:latin typeface="Segoe UI" panose="020B0502040204020203" pitchFamily="34" charset="0"/>
+                  <a:cs typeface="Segoe UI" panose="020B0502040204020203" pitchFamily="34" charset="0"/>
+                </a:rPr>
+                <a:t>Alerts</a:t>
+              </a:r>
+            </a:p>
+            <a:p>
+              <a:pPr algn="ctr"/>
+              <a:r>
+                <a:rPr lang="en-US" sz="1600" dirty="0">
+                  <a:solidFill>
+                    <a:schemeClr val="bg1"/>
+                  </a:solidFill>
+                  <a:latin typeface="Segoe UI" panose="020B0502040204020203" pitchFamily="34" charset="0"/>
+                  <a:cs typeface="Segoe UI" panose="020B0502040204020203" pitchFamily="34" charset="0"/>
+                </a:rPr>
+                <a:t>Displays results from commands</a:t>
+              </a:r>
+            </a:p>
+          </p:txBody>
+        </p:sp>
+        <p:sp>
+          <p:nvSpPr>
+            <p:cNvPr id="8" name="Rounded Rectangle 7">
+              <a:extLst>
+                <a:ext uri="{FF2B5EF4-FFF2-40B4-BE49-F238E27FC236}">
+                  <a16:creationId xmlns:a16="http://schemas.microsoft.com/office/drawing/2014/main" id="{2C81840F-4B60-1CD7-F1A8-AC4E0F620260}"/>
+                </a:ext>
+              </a:extLst>
+            </p:cNvPr>
+            <p:cNvSpPr/>
+            <p:nvPr/>
+          </p:nvSpPr>
+          <p:spPr>
+            <a:xfrm>
+              <a:off x="9514074" y="4014951"/>
+              <a:ext cx="1764000" cy="2039006"/>
+            </a:xfrm>
+            <a:prstGeom prst="roundRect">
+              <a:avLst/>
+            </a:prstGeom>
+            <a:solidFill>
+              <a:srgbClr val="3E7589"/>
+            </a:solidFill>
+            <a:ln w="38100">
+              <a:solidFill>
+                <a:srgbClr val="3E7589"/>
+              </a:solidFill>
+            </a:ln>
+          </p:spPr>
+          <p:style>
+            <a:lnRef idx="2">
+              <a:schemeClr val="accent1">
+                <a:shade val="50000"/>
+              </a:schemeClr>
+            </a:lnRef>
+            <a:fillRef idx="1">
+              <a:schemeClr val="accent1"/>
+            </a:fillRef>
+            <a:effectRef idx="0">
+              <a:schemeClr val="accent1"/>
+            </a:effectRef>
+            <a:fontRef idx="minor">
+              <a:schemeClr val="lt1"/>
+            </a:fontRef>
+          </p:style>
+          <p:txBody>
+            <a:bodyPr rtlCol="0" anchor="ctr"/>
+            <a:lstStyle/>
+            <a:p>
+              <a:pPr algn="ctr"/>
+              <a:r>
+                <a:rPr lang="en-US" sz="1600" b="1" dirty="0">
+                  <a:solidFill>
+                    <a:schemeClr val="bg1"/>
+                  </a:solidFill>
+                  <a:latin typeface="Segoe UI" panose="020B0502040204020203" pitchFamily="34" charset="0"/>
+                  <a:cs typeface="Segoe UI" panose="020B0502040204020203" pitchFamily="34" charset="0"/>
+                </a:rPr>
+                <a:t>Panels</a:t>
+              </a:r>
+            </a:p>
+            <a:p>
+              <a:pPr algn="ctr"/>
+              <a:r>
+                <a:rPr lang="en-US" sz="1600" dirty="0">
+                  <a:solidFill>
+                    <a:schemeClr val="bg1"/>
+                  </a:solidFill>
+                  <a:latin typeface="Segoe UI" panose="020B0502040204020203" pitchFamily="34" charset="0"/>
+                  <a:cs typeface="Segoe UI" panose="020B0502040204020203" pitchFamily="34" charset="0"/>
+                </a:rPr>
+                <a:t>Displays Tank, Fish and Task Information</a:t>
+              </a:r>
+            </a:p>
+          </p:txBody>
+        </p:sp>
+        <p:sp>
+          <p:nvSpPr>
+            <p:cNvPr id="9" name="Rounded Rectangle 8">
+              <a:extLst>
+                <a:ext uri="{FF2B5EF4-FFF2-40B4-BE49-F238E27FC236}">
+                  <a16:creationId xmlns:a16="http://schemas.microsoft.com/office/drawing/2014/main" id="{0FAC34BB-6568-09DE-7D9F-BD7EACD7EF07}"/>
+                </a:ext>
+              </a:extLst>
+            </p:cNvPr>
+            <p:cNvSpPr/>
+            <p:nvPr/>
+          </p:nvSpPr>
+          <p:spPr>
+            <a:xfrm>
+              <a:off x="556246" y="210204"/>
+              <a:ext cx="1764000" cy="1135117"/>
+            </a:xfrm>
+            <a:prstGeom prst="roundRect">
+              <a:avLst/>
+            </a:prstGeom>
+            <a:solidFill>
+              <a:srgbClr val="3E7589"/>
+            </a:solidFill>
+            <a:ln w="38100">
+              <a:solidFill>
+                <a:srgbClr val="3E7589"/>
+              </a:solidFill>
+            </a:ln>
+          </p:spPr>
+          <p:style>
+            <a:lnRef idx="2">
+              <a:schemeClr val="accent1">
+                <a:shade val="50000"/>
+              </a:schemeClr>
+            </a:lnRef>
+            <a:fillRef idx="1">
+              <a:schemeClr val="accent1"/>
+            </a:fillRef>
+            <a:effectRef idx="0">
+              <a:schemeClr val="accent1"/>
+            </a:effectRef>
+            <a:fontRef idx="minor">
+              <a:schemeClr val="lt1"/>
+            </a:fontRef>
+          </p:style>
+          <p:txBody>
+            <a:bodyPr rtlCol="0" anchor="ctr"/>
+            <a:lstStyle/>
+            <a:p>
+              <a:pPr algn="ctr"/>
+              <a:r>
+                <a:rPr lang="en-US" sz="1600" b="1" dirty="0">
+                  <a:solidFill>
+                    <a:schemeClr val="bg1"/>
+                  </a:solidFill>
+                  <a:latin typeface="Segoe UI" panose="020B0502040204020203" pitchFamily="34" charset="0"/>
+                  <a:cs typeface="Segoe UI" panose="020B0502040204020203" pitchFamily="34" charset="0"/>
+                </a:rPr>
+                <a:t>File</a:t>
+              </a:r>
+              <a:endParaRPr lang="en-US" sz="1600" dirty="0">
+                <a:solidFill>
+                  <a:schemeClr val="bg1"/>
+                </a:solidFill>
+                <a:latin typeface="Segoe UI" panose="020B0502040204020203" pitchFamily="34" charset="0"/>
+                <a:cs typeface="Segoe UI" panose="020B0502040204020203" pitchFamily="34" charset="0"/>
+              </a:endParaRPr>
+            </a:p>
+            <a:p>
+              <a:pPr algn="ctr"/>
+              <a:r>
+                <a:rPr lang="en-US" sz="1600" dirty="0">
+                  <a:solidFill>
+                    <a:schemeClr val="bg1"/>
+                  </a:solidFill>
+                  <a:latin typeface="Segoe UI" panose="020B0502040204020203" pitchFamily="34" charset="0"/>
+                  <a:cs typeface="Segoe UI" panose="020B0502040204020203" pitchFamily="34" charset="0"/>
+                </a:rPr>
+                <a:t>Exits the Application </a:t>
+              </a:r>
+            </a:p>
+          </p:txBody>
+        </p:sp>
+        <p:sp>
+          <p:nvSpPr>
+            <p:cNvPr id="10" name="Rounded Rectangle 9">
+              <a:extLst>
+                <a:ext uri="{FF2B5EF4-FFF2-40B4-BE49-F238E27FC236}">
+                  <a16:creationId xmlns:a16="http://schemas.microsoft.com/office/drawing/2014/main" id="{54548E66-0CC8-8CD6-347D-F61CE5C26AE0}"/>
+                </a:ext>
+              </a:extLst>
+            </p:cNvPr>
+            <p:cNvSpPr/>
+            <p:nvPr/>
+          </p:nvSpPr>
+          <p:spPr>
+            <a:xfrm>
+              <a:off x="3799807" y="195537"/>
+              <a:ext cx="1764000" cy="1135117"/>
+            </a:xfrm>
+            <a:prstGeom prst="roundRect">
+              <a:avLst/>
+            </a:prstGeom>
+            <a:solidFill>
+              <a:srgbClr val="3E7589"/>
+            </a:solidFill>
+            <a:ln w="38100">
+              <a:solidFill>
+                <a:srgbClr val="3E7589"/>
+              </a:solidFill>
+            </a:ln>
+          </p:spPr>
+          <p:style>
+            <a:lnRef idx="2">
+              <a:schemeClr val="accent1">
+                <a:shade val="50000"/>
+              </a:schemeClr>
+            </a:lnRef>
+            <a:fillRef idx="1">
+              <a:schemeClr val="accent1"/>
+            </a:fillRef>
+            <a:effectRef idx="0">
+              <a:schemeClr val="accent1"/>
+            </a:effectRef>
+            <a:fontRef idx="minor">
+              <a:schemeClr val="lt1"/>
+            </a:fontRef>
+          </p:style>
+          <p:txBody>
+            <a:bodyPr rtlCol="0" anchor="ctr"/>
+            <a:lstStyle/>
+            <a:p>
+              <a:pPr algn="ctr"/>
+              <a:r>
+                <a:rPr lang="en-US" sz="1600" b="1" dirty="0">
+                  <a:solidFill>
+                    <a:schemeClr val="bg1"/>
+                  </a:solidFill>
+                  <a:latin typeface="Segoe UI" panose="020B0502040204020203" pitchFamily="34" charset="0"/>
+                  <a:cs typeface="Segoe UI" panose="020B0502040204020203" pitchFamily="34" charset="0"/>
+                </a:rPr>
+                <a:t>Help</a:t>
+              </a:r>
+            </a:p>
+            <a:p>
+              <a:pPr algn="ctr"/>
+              <a:r>
+                <a:rPr lang="en-US" sz="1600" dirty="0">
+                  <a:solidFill>
+                    <a:schemeClr val="bg1"/>
+                  </a:solidFill>
+                  <a:latin typeface="Segoe UI" panose="020B0502040204020203" pitchFamily="34" charset="0"/>
+                  <a:cs typeface="Segoe UI" panose="020B0502040204020203" pitchFamily="34" charset="0"/>
+                </a:rPr>
+                <a:t>Displays User Guide</a:t>
+              </a:r>
+            </a:p>
+          </p:txBody>
+        </p:sp>
+        <p:cxnSp>
+          <p:nvCxnSpPr>
+            <p:cNvPr id="15" name="Straight Arrow Connector 14">
+              <a:extLst>
+                <a:ext uri="{FF2B5EF4-FFF2-40B4-BE49-F238E27FC236}">
+                  <a16:creationId xmlns:a16="http://schemas.microsoft.com/office/drawing/2014/main" id="{C8E4DE62-20A9-E717-03E7-6E01607FF97D}"/>
+                </a:ext>
+              </a:extLst>
+            </p:cNvPr>
+            <p:cNvCxnSpPr>
+              <a:cxnSpLocks/>
+            </p:cNvCxnSpPr>
+            <p:nvPr/>
+          </p:nvCxnSpPr>
+          <p:spPr>
+            <a:xfrm>
+              <a:off x="935421" y="1286843"/>
+              <a:ext cx="1492469" cy="499428"/>
+            </a:xfrm>
+            <a:prstGeom prst="straightConnector1">
+              <a:avLst/>
+            </a:prstGeom>
+            <a:ln w="76200">
+              <a:solidFill>
+                <a:srgbClr val="3E7589"/>
+              </a:solidFill>
+              <a:tailEnd type="triangle"/>
+            </a:ln>
+          </p:spPr>
+          <p:style>
+            <a:lnRef idx="1">
+              <a:schemeClr val="accent1"/>
+            </a:lnRef>
+            <a:fillRef idx="0">
+              <a:schemeClr val="accent1"/>
+            </a:fillRef>
+            <a:effectRef idx="0">
+              <a:schemeClr val="accent1"/>
+            </a:effectRef>
+            <a:fontRef idx="minor">
+              <a:schemeClr val="tx1"/>
+            </a:fontRef>
+          </p:style>
+        </p:cxnSp>
+        <p:cxnSp>
+          <p:nvCxnSpPr>
+            <p:cNvPr id="19" name="Straight Arrow Connector 18">
+              <a:extLst>
+                <a:ext uri="{FF2B5EF4-FFF2-40B4-BE49-F238E27FC236}">
+                  <a16:creationId xmlns:a16="http://schemas.microsoft.com/office/drawing/2014/main" id="{9E9AEB44-D5B1-407E-6689-617325C00857}"/>
+                </a:ext>
+              </a:extLst>
+            </p:cNvPr>
+            <p:cNvCxnSpPr>
+              <a:cxnSpLocks/>
+            </p:cNvCxnSpPr>
+            <p:nvPr/>
+          </p:nvCxnSpPr>
+          <p:spPr>
+            <a:xfrm flipH="1">
+              <a:off x="3303613" y="1134194"/>
+              <a:ext cx="2035642" cy="652077"/>
+            </a:xfrm>
+            <a:prstGeom prst="straightConnector1">
+              <a:avLst/>
+            </a:prstGeom>
+            <a:ln w="76200">
+              <a:solidFill>
+                <a:srgbClr val="3E7589"/>
+              </a:solidFill>
+              <a:tailEnd type="triangle"/>
+            </a:ln>
+          </p:spPr>
+          <p:style>
+            <a:lnRef idx="1">
+              <a:schemeClr val="accent1"/>
+            </a:lnRef>
+            <a:fillRef idx="0">
+              <a:schemeClr val="accent1"/>
+            </a:fillRef>
+            <a:effectRef idx="0">
+              <a:schemeClr val="accent1"/>
+            </a:effectRef>
+            <a:fontRef idx="minor">
+              <a:schemeClr val="tx1"/>
+            </a:fontRef>
+          </p:style>
+        </p:cxnSp>
+        <p:sp>
+          <p:nvSpPr>
+            <p:cNvPr id="25" name="Rounded Rectangle 24">
+              <a:extLst>
+                <a:ext uri="{FF2B5EF4-FFF2-40B4-BE49-F238E27FC236}">
+                  <a16:creationId xmlns:a16="http://schemas.microsoft.com/office/drawing/2014/main" id="{5A316987-5107-7E4A-812D-727649096CFB}"/>
+                </a:ext>
+              </a:extLst>
+            </p:cNvPr>
+            <p:cNvSpPr/>
+            <p:nvPr/>
+          </p:nvSpPr>
+          <p:spPr>
+            <a:xfrm>
+              <a:off x="2427890" y="1985228"/>
+              <a:ext cx="6621517" cy="411130"/>
+            </a:xfrm>
+            <a:prstGeom prst="roundRect">
+              <a:avLst/>
+            </a:prstGeom>
+            <a:noFill/>
+            <a:ln w="38100">
+              <a:solidFill>
+                <a:srgbClr val="3E7589"/>
+              </a:solidFill>
+            </a:ln>
+          </p:spPr>
+          <p:style>
+            <a:lnRef idx="2">
+              <a:schemeClr val="accent1">
+                <a:shade val="50000"/>
+              </a:schemeClr>
+            </a:lnRef>
+            <a:fillRef idx="1">
+              <a:schemeClr val="accent1"/>
+            </a:fillRef>
+            <a:effectRef idx="0">
+              <a:schemeClr val="accent1"/>
+            </a:effectRef>
+            <a:fontRef idx="minor">
+              <a:schemeClr val="lt1"/>
+            </a:fontRef>
+          </p:style>
+          <p:txBody>
+            <a:bodyPr rtlCol="0" anchor="ctr"/>
+            <a:lstStyle/>
+            <a:p>
+              <a:pPr algn="ctr"/>
+              <a:endParaRPr lang="en-US" sz="1600" dirty="0">
+                <a:solidFill>
+                  <a:schemeClr val="bg1"/>
+                </a:solidFill>
+                <a:latin typeface="Segoe UI" panose="020B0502040204020203" pitchFamily="34" charset="0"/>
+                <a:cs typeface="Segoe UI" panose="020B0502040204020203" pitchFamily="34" charset="0"/>
+              </a:endParaRPr>
+            </a:p>
+          </p:txBody>
+        </p:sp>
+        <p:cxnSp>
+          <p:nvCxnSpPr>
+            <p:cNvPr id="35" name="Straight Arrow Connector 34">
+              <a:extLst>
+                <a:ext uri="{FF2B5EF4-FFF2-40B4-BE49-F238E27FC236}">
+                  <a16:creationId xmlns:a16="http://schemas.microsoft.com/office/drawing/2014/main" id="{ED614F02-5CD8-588C-25A4-BDC862BD86A3}"/>
+                </a:ext>
+              </a:extLst>
+            </p:cNvPr>
+            <p:cNvCxnSpPr>
+              <a:cxnSpLocks/>
+              <a:stCxn id="5" idx="1"/>
+            </p:cNvCxnSpPr>
+            <p:nvPr/>
+          </p:nvCxnSpPr>
+          <p:spPr>
+            <a:xfrm flipH="1">
+              <a:off x="8902253" y="1555520"/>
+              <a:ext cx="622331" cy="561838"/>
+            </a:xfrm>
+            <a:prstGeom prst="straightConnector1">
+              <a:avLst/>
+            </a:prstGeom>
+            <a:ln w="76200">
+              <a:solidFill>
+                <a:srgbClr val="3E7589"/>
+              </a:solidFill>
+              <a:tailEnd type="triangle"/>
+            </a:ln>
+          </p:spPr>
+          <p:style>
+            <a:lnRef idx="1">
+              <a:schemeClr val="accent1"/>
+            </a:lnRef>
+            <a:fillRef idx="0">
+              <a:schemeClr val="accent1"/>
+            </a:fillRef>
+            <a:effectRef idx="0">
+              <a:schemeClr val="accent1"/>
+            </a:effectRef>
+            <a:fontRef idx="minor">
+              <a:schemeClr val="tx1"/>
+            </a:fontRef>
+          </p:style>
+        </p:cxnSp>
+        <p:sp>
+          <p:nvSpPr>
+            <p:cNvPr id="37" name="Rounded Rectangle 36">
+              <a:extLst>
+                <a:ext uri="{FF2B5EF4-FFF2-40B4-BE49-F238E27FC236}">
+                  <a16:creationId xmlns:a16="http://schemas.microsoft.com/office/drawing/2014/main" id="{BB610011-3271-5F98-A4BC-A6515A43115E}"/>
+                </a:ext>
+              </a:extLst>
+            </p:cNvPr>
+            <p:cNvSpPr/>
+            <p:nvPr/>
+          </p:nvSpPr>
+          <p:spPr>
+            <a:xfrm>
+              <a:off x="2427889" y="2451523"/>
+              <a:ext cx="6621517" cy="736527"/>
+            </a:xfrm>
+            <a:prstGeom prst="roundRect">
+              <a:avLst/>
+            </a:prstGeom>
+            <a:noFill/>
+            <a:ln w="38100">
+              <a:solidFill>
+                <a:srgbClr val="3E7589"/>
+              </a:solidFill>
+            </a:ln>
+          </p:spPr>
+          <p:style>
+            <a:lnRef idx="2">
+              <a:schemeClr val="accent1">
+                <a:shade val="50000"/>
+              </a:schemeClr>
+            </a:lnRef>
+            <a:fillRef idx="1">
+              <a:schemeClr val="accent1"/>
+            </a:fillRef>
+            <a:effectRef idx="0">
+              <a:schemeClr val="accent1"/>
+            </a:effectRef>
+            <a:fontRef idx="minor">
+              <a:schemeClr val="lt1"/>
+            </a:fontRef>
+          </p:style>
+          <p:txBody>
+            <a:bodyPr rtlCol="0" anchor="ctr"/>
+            <a:lstStyle/>
+            <a:p>
+              <a:pPr algn="ctr"/>
+              <a:endParaRPr lang="en-US" sz="1600" dirty="0">
+                <a:solidFill>
+                  <a:schemeClr val="bg1"/>
+                </a:solidFill>
+                <a:latin typeface="Segoe UI" panose="020B0502040204020203" pitchFamily="34" charset="0"/>
+                <a:cs typeface="Segoe UI" panose="020B0502040204020203" pitchFamily="34" charset="0"/>
+              </a:endParaRPr>
+            </a:p>
+          </p:txBody>
+        </p:sp>
+        <p:sp>
+          <p:nvSpPr>
+            <p:cNvPr id="38" name="Rounded Rectangle 37">
+              <a:extLst>
+                <a:ext uri="{FF2B5EF4-FFF2-40B4-BE49-F238E27FC236}">
+                  <a16:creationId xmlns:a16="http://schemas.microsoft.com/office/drawing/2014/main" id="{21645B60-885A-C6BE-9FD5-DFCCFA6DF8B3}"/>
+                </a:ext>
+              </a:extLst>
+            </p:cNvPr>
+            <p:cNvSpPr/>
+            <p:nvPr/>
+          </p:nvSpPr>
+          <p:spPr>
+            <a:xfrm>
+              <a:off x="2449177" y="3247391"/>
+              <a:ext cx="2143843" cy="3248002"/>
+            </a:xfrm>
+            <a:prstGeom prst="roundRect">
+              <a:avLst/>
+            </a:prstGeom>
+            <a:noFill/>
+            <a:ln w="38100">
+              <a:solidFill>
+                <a:srgbClr val="3E7589"/>
+              </a:solidFill>
+            </a:ln>
+          </p:spPr>
+          <p:style>
+            <a:lnRef idx="2">
+              <a:schemeClr val="accent1">
+                <a:shade val="50000"/>
+              </a:schemeClr>
+            </a:lnRef>
+            <a:fillRef idx="1">
+              <a:schemeClr val="accent1"/>
+            </a:fillRef>
+            <a:effectRef idx="0">
+              <a:schemeClr val="accent1"/>
+            </a:effectRef>
+            <a:fontRef idx="minor">
+              <a:schemeClr val="lt1"/>
+            </a:fontRef>
+          </p:style>
+          <p:txBody>
+            <a:bodyPr rtlCol="0" anchor="ctr"/>
+            <a:lstStyle/>
+            <a:p>
+              <a:pPr algn="ctr"/>
+              <a:endParaRPr lang="en-US" sz="1600" dirty="0">
+                <a:solidFill>
+                  <a:schemeClr val="bg1"/>
+                </a:solidFill>
+                <a:latin typeface="Segoe UI" panose="020B0502040204020203" pitchFamily="34" charset="0"/>
+                <a:cs typeface="Segoe UI" panose="020B0502040204020203" pitchFamily="34" charset="0"/>
+              </a:endParaRPr>
+            </a:p>
+          </p:txBody>
+        </p:sp>
+        <p:sp>
+          <p:nvSpPr>
+            <p:cNvPr id="39" name="Rounded Rectangle 38">
+              <a:extLst>
+                <a:ext uri="{FF2B5EF4-FFF2-40B4-BE49-F238E27FC236}">
+                  <a16:creationId xmlns:a16="http://schemas.microsoft.com/office/drawing/2014/main" id="{75906452-660C-25C1-FB1E-775CA08CA585}"/>
+                </a:ext>
+              </a:extLst>
+            </p:cNvPr>
+            <p:cNvSpPr/>
+            <p:nvPr/>
+          </p:nvSpPr>
+          <p:spPr>
+            <a:xfrm>
+              <a:off x="4609051" y="3252648"/>
+              <a:ext cx="2143843" cy="3248002"/>
+            </a:xfrm>
+            <a:prstGeom prst="roundRect">
+              <a:avLst/>
+            </a:prstGeom>
+            <a:noFill/>
+            <a:ln w="38100">
+              <a:solidFill>
+                <a:srgbClr val="3E7589"/>
+              </a:solidFill>
+            </a:ln>
+          </p:spPr>
+          <p:style>
+            <a:lnRef idx="2">
+              <a:schemeClr val="accent1">
+                <a:shade val="50000"/>
+              </a:schemeClr>
+            </a:lnRef>
+            <a:fillRef idx="1">
+              <a:schemeClr val="accent1"/>
+            </a:fillRef>
+            <a:effectRef idx="0">
+              <a:schemeClr val="accent1"/>
+            </a:effectRef>
+            <a:fontRef idx="minor">
+              <a:schemeClr val="lt1"/>
+            </a:fontRef>
+          </p:style>
+          <p:txBody>
+            <a:bodyPr rtlCol="0" anchor="ctr"/>
+            <a:lstStyle/>
+            <a:p>
+              <a:pPr algn="ctr"/>
+              <a:endParaRPr lang="en-US" sz="1600" dirty="0">
+                <a:solidFill>
+                  <a:schemeClr val="bg1"/>
+                </a:solidFill>
+                <a:latin typeface="Segoe UI" panose="020B0502040204020203" pitchFamily="34" charset="0"/>
+                <a:cs typeface="Segoe UI" panose="020B0502040204020203" pitchFamily="34" charset="0"/>
+              </a:endParaRPr>
+            </a:p>
+          </p:txBody>
+        </p:sp>
+        <p:sp>
+          <p:nvSpPr>
+            <p:cNvPr id="40" name="Rounded Rectangle 39">
+              <a:extLst>
+                <a:ext uri="{FF2B5EF4-FFF2-40B4-BE49-F238E27FC236}">
+                  <a16:creationId xmlns:a16="http://schemas.microsoft.com/office/drawing/2014/main" id="{945DD164-3130-6C47-7926-D598A38C8F2C}"/>
+                </a:ext>
+              </a:extLst>
+            </p:cNvPr>
+            <p:cNvSpPr/>
+            <p:nvPr/>
+          </p:nvSpPr>
+          <p:spPr>
+            <a:xfrm>
+              <a:off x="6758410" y="3247393"/>
+              <a:ext cx="2143843" cy="3248002"/>
+            </a:xfrm>
+            <a:prstGeom prst="roundRect">
+              <a:avLst/>
+            </a:prstGeom>
+            <a:noFill/>
+            <a:ln w="38100">
+              <a:solidFill>
+                <a:srgbClr val="3E7589"/>
+              </a:solidFill>
+            </a:ln>
+          </p:spPr>
+          <p:style>
+            <a:lnRef idx="2">
+              <a:schemeClr val="accent1">
+                <a:shade val="50000"/>
+              </a:schemeClr>
+            </a:lnRef>
+            <a:fillRef idx="1">
+              <a:schemeClr val="accent1"/>
+            </a:fillRef>
+            <a:effectRef idx="0">
+              <a:schemeClr val="accent1"/>
+            </a:effectRef>
+            <a:fontRef idx="minor">
+              <a:schemeClr val="lt1"/>
+            </a:fontRef>
+          </p:style>
+          <p:txBody>
+            <a:bodyPr rtlCol="0" anchor="ctr"/>
+            <a:lstStyle/>
+            <a:p>
+              <a:pPr algn="ctr"/>
+              <a:endParaRPr lang="en-US" sz="1600" dirty="0">
+                <a:solidFill>
+                  <a:schemeClr val="bg1"/>
+                </a:solidFill>
+                <a:latin typeface="Segoe UI" panose="020B0502040204020203" pitchFamily="34" charset="0"/>
+                <a:cs typeface="Segoe UI" panose="020B0502040204020203" pitchFamily="34" charset="0"/>
+              </a:endParaRPr>
+            </a:p>
+          </p:txBody>
+        </p:sp>
+        <p:cxnSp>
+          <p:nvCxnSpPr>
+            <p:cNvPr id="41" name="Straight Arrow Connector 40">
+              <a:extLst>
+                <a:ext uri="{FF2B5EF4-FFF2-40B4-BE49-F238E27FC236}">
+                  <a16:creationId xmlns:a16="http://schemas.microsoft.com/office/drawing/2014/main" id="{ABD5D9A9-C656-5053-00F4-7DFFE9433B4D}"/>
+                </a:ext>
+              </a:extLst>
+            </p:cNvPr>
+            <p:cNvCxnSpPr>
+              <a:cxnSpLocks/>
+              <a:stCxn id="6" idx="1"/>
+            </p:cNvCxnSpPr>
+            <p:nvPr/>
+          </p:nvCxnSpPr>
+          <p:spPr>
+            <a:xfrm flipH="1" flipV="1">
+              <a:off x="8902253" y="2989265"/>
+              <a:ext cx="611820" cy="184849"/>
+            </a:xfrm>
+            <a:prstGeom prst="straightConnector1">
+              <a:avLst/>
+            </a:prstGeom>
+            <a:ln w="76200">
+              <a:solidFill>
+                <a:srgbClr val="3E7589"/>
+              </a:solidFill>
+              <a:tailEnd type="triangle"/>
+            </a:ln>
+          </p:spPr>
+          <p:style>
+            <a:lnRef idx="1">
+              <a:schemeClr val="accent1"/>
+            </a:lnRef>
+            <a:fillRef idx="0">
+              <a:schemeClr val="accent1"/>
+            </a:fillRef>
+            <a:effectRef idx="0">
+              <a:schemeClr val="accent1"/>
+            </a:effectRef>
+            <a:fontRef idx="minor">
+              <a:schemeClr val="tx1"/>
+            </a:fontRef>
+          </p:style>
+        </p:cxnSp>
+        <p:cxnSp>
+          <p:nvCxnSpPr>
+            <p:cNvPr id="45" name="Straight Arrow Connector 44">
+              <a:extLst>
+                <a:ext uri="{FF2B5EF4-FFF2-40B4-BE49-F238E27FC236}">
+                  <a16:creationId xmlns:a16="http://schemas.microsoft.com/office/drawing/2014/main" id="{0195C2E3-F04E-8153-7EBB-C47470CB3CC1}"/>
+                </a:ext>
+              </a:extLst>
+            </p:cNvPr>
+            <p:cNvCxnSpPr>
+              <a:cxnSpLocks/>
+            </p:cNvCxnSpPr>
+            <p:nvPr/>
+          </p:nvCxnSpPr>
+          <p:spPr>
+            <a:xfrm flipH="1" flipV="1">
+              <a:off x="8786091" y="5559982"/>
+              <a:ext cx="956732" cy="178801"/>
+            </a:xfrm>
+            <a:prstGeom prst="straightConnector1">
+              <a:avLst/>
+            </a:prstGeom>
+            <a:ln w="76200">
+              <a:solidFill>
+                <a:srgbClr val="3E7589"/>
+              </a:solidFill>
+              <a:tailEnd type="triangle"/>
+            </a:ln>
+          </p:spPr>
+          <p:style>
+            <a:lnRef idx="1">
+              <a:schemeClr val="accent1"/>
+            </a:lnRef>
+            <a:fillRef idx="0">
+              <a:schemeClr val="accent1"/>
+            </a:fillRef>
+            <a:effectRef idx="0">
+              <a:schemeClr val="accent1"/>
+            </a:effectRef>
+            <a:fontRef idx="minor">
+              <a:schemeClr val="tx1"/>
+            </a:fontRef>
+          </p:style>
+        </p:cxnSp>
+        <p:cxnSp>
+          <p:nvCxnSpPr>
+            <p:cNvPr id="50" name="Straight Arrow Connector 49">
+              <a:extLst>
+                <a:ext uri="{FF2B5EF4-FFF2-40B4-BE49-F238E27FC236}">
+                  <a16:creationId xmlns:a16="http://schemas.microsoft.com/office/drawing/2014/main" id="{2A2651C0-538D-576E-6331-31AF169F9744}"/>
+                </a:ext>
+              </a:extLst>
+            </p:cNvPr>
+            <p:cNvCxnSpPr>
+              <a:cxnSpLocks/>
+            </p:cNvCxnSpPr>
+            <p:nvPr/>
+          </p:nvCxnSpPr>
+          <p:spPr>
+            <a:xfrm flipH="1">
+              <a:off x="6652789" y="5821226"/>
+              <a:ext cx="2917144" cy="0"/>
+            </a:xfrm>
+            <a:prstGeom prst="straightConnector1">
+              <a:avLst/>
+            </a:prstGeom>
+            <a:ln w="76200">
+              <a:solidFill>
+                <a:srgbClr val="3E7589"/>
+              </a:solidFill>
+              <a:tailEnd type="triangle"/>
+            </a:ln>
+          </p:spPr>
+          <p:style>
+            <a:lnRef idx="1">
+              <a:schemeClr val="accent1"/>
+            </a:lnRef>
+            <a:fillRef idx="0">
+              <a:schemeClr val="accent1"/>
+            </a:fillRef>
+            <a:effectRef idx="0">
+              <a:schemeClr val="accent1"/>
+            </a:effectRef>
+            <a:fontRef idx="minor">
+              <a:schemeClr val="tx1"/>
+            </a:fontRef>
+          </p:style>
+        </p:cxnSp>
+        <p:cxnSp>
+          <p:nvCxnSpPr>
+            <p:cNvPr id="52" name="Straight Arrow Connector 51">
+              <a:extLst>
+                <a:ext uri="{FF2B5EF4-FFF2-40B4-BE49-F238E27FC236}">
+                  <a16:creationId xmlns:a16="http://schemas.microsoft.com/office/drawing/2014/main" id="{009CECFE-E465-03AC-E018-32ACE0C40F9B}"/>
+                </a:ext>
+              </a:extLst>
+            </p:cNvPr>
+            <p:cNvCxnSpPr>
+              <a:cxnSpLocks/>
+            </p:cNvCxnSpPr>
+            <p:nvPr/>
+          </p:nvCxnSpPr>
+          <p:spPr>
+            <a:xfrm flipH="1">
+              <a:off x="4511568" y="5930606"/>
+              <a:ext cx="5047855" cy="244372"/>
+            </a:xfrm>
+            <a:prstGeom prst="straightConnector1">
+              <a:avLst/>
+            </a:prstGeom>
+            <a:ln w="76200">
+              <a:solidFill>
+                <a:srgbClr val="3E7589"/>
+              </a:solidFill>
+              <a:tailEnd type="triangle"/>
+            </a:ln>
+          </p:spPr>
+          <p:style>
+            <a:lnRef idx="1">
+              <a:schemeClr val="accent1"/>
+            </a:lnRef>
+            <a:fillRef idx="0">
+              <a:schemeClr val="accent1"/>
+            </a:fillRef>
+            <a:effectRef idx="0">
+              <a:schemeClr val="accent1"/>
+            </a:effectRef>
+            <a:fontRef idx="minor">
+              <a:schemeClr val="tx1"/>
+            </a:fontRef>
+          </p:style>
+        </p:cxnSp>
+      </p:grpSp>
+    </p:spTree>
+    <p:extLst>
+      <p:ext uri="{BB962C8B-B14F-4D97-AF65-F5344CB8AC3E}">
+        <p14:creationId xmlns:p14="http://schemas.microsoft.com/office/powerpoint/2010/main" val="1147181169"/>
+      </p:ext>
+    </p:extLst>
+  </p:cSld>
+  <p:clrMapOvr>
+    <a:masterClrMapping/>
+  </p:clrMapOvr>
+</p:sld>
+</file>
+
 <file path=ppt/theme/theme1.xml><?xml version="1.0" encoding="utf-8"?>
 <a:theme xmlns:a="http://schemas.openxmlformats.org/drawingml/2006/main" name="Office Theme">
   <a:themeElements>

</xml_diff>

<commit_message>
Add Ui picture for index
</commit_message>
<xml_diff>
--- a/docs/2103UG.pptx
+++ b/docs/2103UG.pptx
@@ -10,6 +10,7 @@
     <p:sldId id="258" r:id="rId4"/>
     <p:sldId id="259" r:id="rId5"/>
     <p:sldId id="260" r:id="rId6"/>
+    <p:sldId id="261" r:id="rId7"/>
   </p:sldIdLst>
   <p:sldSz cx="12192000" cy="6858000"/>
   <p:notesSz cx="6858000" cy="9144000"/>
@@ -265,7 +266,7 @@
           <a:p>
             <a:fld id="{EB7151ED-93A3-4DE6-9A0B-D1B289A286F2}" type="datetimeFigureOut">
               <a:rPr lang="en-SG" smtClean="0"/>
-              <a:t>31/3/23</a:t>
+              <a:t>4/4/23</a:t>
             </a:fld>
             <a:endParaRPr lang="en-SG"/>
           </a:p>
@@ -465,7 +466,7 @@
           <a:p>
             <a:fld id="{EB7151ED-93A3-4DE6-9A0B-D1B289A286F2}" type="datetimeFigureOut">
               <a:rPr lang="en-SG" smtClean="0"/>
-              <a:t>31/3/23</a:t>
+              <a:t>4/4/23</a:t>
             </a:fld>
             <a:endParaRPr lang="en-SG"/>
           </a:p>
@@ -675,7 +676,7 @@
           <a:p>
             <a:fld id="{EB7151ED-93A3-4DE6-9A0B-D1B289A286F2}" type="datetimeFigureOut">
               <a:rPr lang="en-SG" smtClean="0"/>
-              <a:t>31/3/23</a:t>
+              <a:t>4/4/23</a:t>
             </a:fld>
             <a:endParaRPr lang="en-SG"/>
           </a:p>
@@ -875,7 +876,7 @@
           <a:p>
             <a:fld id="{EB7151ED-93A3-4DE6-9A0B-D1B289A286F2}" type="datetimeFigureOut">
               <a:rPr lang="en-SG" smtClean="0"/>
-              <a:t>31/3/23</a:t>
+              <a:t>4/4/23</a:t>
             </a:fld>
             <a:endParaRPr lang="en-SG"/>
           </a:p>
@@ -1151,7 +1152,7 @@
           <a:p>
             <a:fld id="{EB7151ED-93A3-4DE6-9A0B-D1B289A286F2}" type="datetimeFigureOut">
               <a:rPr lang="en-SG" smtClean="0"/>
-              <a:t>31/3/23</a:t>
+              <a:t>4/4/23</a:t>
             </a:fld>
             <a:endParaRPr lang="en-SG"/>
           </a:p>
@@ -1419,7 +1420,7 @@
           <a:p>
             <a:fld id="{EB7151ED-93A3-4DE6-9A0B-D1B289A286F2}" type="datetimeFigureOut">
               <a:rPr lang="en-SG" smtClean="0"/>
-              <a:t>31/3/23</a:t>
+              <a:t>4/4/23</a:t>
             </a:fld>
             <a:endParaRPr lang="en-SG"/>
           </a:p>
@@ -1834,7 +1835,7 @@
           <a:p>
             <a:fld id="{EB7151ED-93A3-4DE6-9A0B-D1B289A286F2}" type="datetimeFigureOut">
               <a:rPr lang="en-SG" smtClean="0"/>
-              <a:t>31/3/23</a:t>
+              <a:t>4/4/23</a:t>
             </a:fld>
             <a:endParaRPr lang="en-SG"/>
           </a:p>
@@ -1976,7 +1977,7 @@
           <a:p>
             <a:fld id="{EB7151ED-93A3-4DE6-9A0B-D1B289A286F2}" type="datetimeFigureOut">
               <a:rPr lang="en-SG" smtClean="0"/>
-              <a:t>31/3/23</a:t>
+              <a:t>4/4/23</a:t>
             </a:fld>
             <a:endParaRPr lang="en-SG"/>
           </a:p>
@@ -2089,7 +2090,7 @@
           <a:p>
             <a:fld id="{EB7151ED-93A3-4DE6-9A0B-D1B289A286F2}" type="datetimeFigureOut">
               <a:rPr lang="en-SG" smtClean="0"/>
-              <a:t>31/3/23</a:t>
+              <a:t>4/4/23</a:t>
             </a:fld>
             <a:endParaRPr lang="en-SG"/>
           </a:p>
@@ -2402,7 +2403,7 @@
           <a:p>
             <a:fld id="{EB7151ED-93A3-4DE6-9A0B-D1B289A286F2}" type="datetimeFigureOut">
               <a:rPr lang="en-SG" smtClean="0"/>
-              <a:t>31/3/23</a:t>
+              <a:t>4/4/23</a:t>
             </a:fld>
             <a:endParaRPr lang="en-SG"/>
           </a:p>
@@ -2691,7 +2692,7 @@
           <a:p>
             <a:fld id="{EB7151ED-93A3-4DE6-9A0B-D1B289A286F2}" type="datetimeFigureOut">
               <a:rPr lang="en-SG" smtClean="0"/>
-              <a:t>31/3/23</a:t>
+              <a:t>4/4/23</a:t>
             </a:fld>
             <a:endParaRPr lang="en-SG"/>
           </a:p>
@@ -2934,7 +2935,7 @@
           <a:p>
             <a:fld id="{EB7151ED-93A3-4DE6-9A0B-D1B289A286F2}" type="datetimeFigureOut">
               <a:rPr lang="en-SG" smtClean="0"/>
-              <a:t>31/3/23</a:t>
+              <a:t>4/4/23</a:t>
             </a:fld>
             <a:endParaRPr lang="en-SG"/>
           </a:p>
@@ -6017,6 +6018,1154 @@
 </p:sld>
 </file>
 
+<file path=ppt/slides/slide6.xml><?xml version="1.0" encoding="utf-8"?>
+<p:sld xmlns:a="http://schemas.openxmlformats.org/drawingml/2006/main" xmlns:r="http://schemas.openxmlformats.org/officeDocument/2006/relationships" xmlns:p="http://schemas.openxmlformats.org/presentationml/2006/main">
+  <p:cSld>
+    <p:spTree>
+      <p:nvGrpSpPr>
+        <p:cNvPr id="1" name=""/>
+        <p:cNvGrpSpPr/>
+        <p:nvPr/>
+      </p:nvGrpSpPr>
+      <p:grpSpPr>
+        <a:xfrm>
+          <a:off x="0" y="0"/>
+          <a:ext cx="0" cy="0"/>
+          <a:chOff x="0" y="0"/>
+          <a:chExt cx="0" cy="0"/>
+        </a:xfrm>
+      </p:grpSpPr>
+      <p:grpSp>
+        <p:nvGrpSpPr>
+          <p:cNvPr id="49" name="Group 48">
+            <a:extLst>
+              <a:ext uri="{FF2B5EF4-FFF2-40B4-BE49-F238E27FC236}">
+                <a16:creationId xmlns:a16="http://schemas.microsoft.com/office/drawing/2014/main" id="{FE6440BD-DDD4-AD8B-B34E-3858896D3459}"/>
+              </a:ext>
+            </a:extLst>
+          </p:cNvPr>
+          <p:cNvGrpSpPr/>
+          <p:nvPr/>
+        </p:nvGrpSpPr>
+        <p:grpSpPr>
+          <a:xfrm>
+            <a:off x="1194224" y="474861"/>
+            <a:ext cx="8261858" cy="6101825"/>
+            <a:chOff x="1292044" y="1298639"/>
+            <a:chExt cx="8261858" cy="6101825"/>
+          </a:xfrm>
+        </p:grpSpPr>
+        <p:pic>
+          <p:nvPicPr>
+            <p:cNvPr id="7" name="Picture 6" descr="A screenshot of a computer&#10;&#10;Description automatically generated with medium confidence">
+              <a:extLst>
+                <a:ext uri="{FF2B5EF4-FFF2-40B4-BE49-F238E27FC236}">
+                  <a16:creationId xmlns:a16="http://schemas.microsoft.com/office/drawing/2014/main" id="{B6ED7993-029F-3991-0E7F-B7FA2173BF82}"/>
+                </a:ext>
+              </a:extLst>
+            </p:cNvPr>
+            <p:cNvPicPr>
+              <a:picLocks noChangeAspect="1"/>
+            </p:cNvPicPr>
+            <p:nvPr/>
+          </p:nvPicPr>
+          <p:blipFill>
+            <a:blip r:embed="rId2">
+              <a:extLst>
+                <a:ext uri="{28A0092B-C50C-407E-A947-70E740481C1C}">
+                  <a14:useLocalDpi xmlns:a14="http://schemas.microsoft.com/office/drawing/2010/main" val="0"/>
+                </a:ext>
+              </a:extLst>
+            </a:blip>
+            <a:stretch>
+              <a:fillRect/>
+            </a:stretch>
+          </p:blipFill>
+          <p:spPr>
+            <a:xfrm>
+              <a:off x="1944950" y="1298639"/>
+              <a:ext cx="7608952" cy="6101825"/>
+            </a:xfrm>
+            <a:prstGeom prst="rect">
+              <a:avLst/>
+            </a:prstGeom>
+            <a:ln>
+              <a:noFill/>
+            </a:ln>
+          </p:spPr>
+        </p:pic>
+        <p:sp>
+          <p:nvSpPr>
+            <p:cNvPr id="38" name="Rounded Rectangle 37">
+              <a:extLst>
+                <a:ext uri="{FF2B5EF4-FFF2-40B4-BE49-F238E27FC236}">
+                  <a16:creationId xmlns:a16="http://schemas.microsoft.com/office/drawing/2014/main" id="{21645B60-885A-C6BE-9FD5-DFCCFA6DF8B3}"/>
+                </a:ext>
+              </a:extLst>
+            </p:cNvPr>
+            <p:cNvSpPr>
+              <a:spLocks noChangeAspect="1"/>
+            </p:cNvSpPr>
+            <p:nvPr/>
+          </p:nvSpPr>
+          <p:spPr>
+            <a:xfrm>
+              <a:off x="2495359" y="5636764"/>
+              <a:ext cx="432000" cy="432000"/>
+            </a:xfrm>
+            <a:prstGeom prst="roundRect">
+              <a:avLst/>
+            </a:prstGeom>
+            <a:noFill/>
+            <a:ln w="38100">
+              <a:solidFill>
+                <a:srgbClr val="3E7589"/>
+              </a:solidFill>
+            </a:ln>
+          </p:spPr>
+          <p:style>
+            <a:lnRef idx="2">
+              <a:schemeClr val="accent1">
+                <a:shade val="50000"/>
+              </a:schemeClr>
+            </a:lnRef>
+            <a:fillRef idx="1">
+              <a:schemeClr val="accent1"/>
+            </a:fillRef>
+            <a:effectRef idx="0">
+              <a:schemeClr val="accent1"/>
+            </a:effectRef>
+            <a:fontRef idx="minor">
+              <a:schemeClr val="lt1"/>
+            </a:fontRef>
+          </p:style>
+          <p:txBody>
+            <a:bodyPr rtlCol="0" anchor="ctr"/>
+            <a:lstStyle/>
+            <a:p>
+              <a:pPr algn="ctr"/>
+              <a:endParaRPr lang="en-US" sz="1600" dirty="0">
+                <a:solidFill>
+                  <a:schemeClr val="bg1"/>
+                </a:solidFill>
+                <a:latin typeface="Segoe UI" panose="020B0502040204020203" pitchFamily="34" charset="0"/>
+                <a:cs typeface="Segoe UI" panose="020B0502040204020203" pitchFamily="34" charset="0"/>
+              </a:endParaRPr>
+            </a:p>
+          </p:txBody>
+        </p:sp>
+        <p:cxnSp>
+          <p:nvCxnSpPr>
+            <p:cNvPr id="52" name="Straight Arrow Connector 51">
+              <a:extLst>
+                <a:ext uri="{FF2B5EF4-FFF2-40B4-BE49-F238E27FC236}">
+                  <a16:creationId xmlns:a16="http://schemas.microsoft.com/office/drawing/2014/main" id="{009CECFE-E465-03AC-E018-32ACE0C40F9B}"/>
+                </a:ext>
+              </a:extLst>
+            </p:cNvPr>
+            <p:cNvCxnSpPr>
+              <a:cxnSpLocks/>
+              <a:stCxn id="5" idx="2"/>
+              <a:endCxn id="11" idx="0"/>
+            </p:cNvCxnSpPr>
+            <p:nvPr/>
+          </p:nvCxnSpPr>
+          <p:spPr>
+            <a:xfrm>
+              <a:off x="4096474" y="3237451"/>
+              <a:ext cx="693600" cy="2676627"/>
+            </a:xfrm>
+            <a:prstGeom prst="straightConnector1">
+              <a:avLst/>
+            </a:prstGeom>
+            <a:ln w="76200">
+              <a:solidFill>
+                <a:srgbClr val="3E7589"/>
+              </a:solidFill>
+              <a:tailEnd type="triangle"/>
+            </a:ln>
+          </p:spPr>
+          <p:style>
+            <a:lnRef idx="1">
+              <a:schemeClr val="accent1"/>
+            </a:lnRef>
+            <a:fillRef idx="0">
+              <a:schemeClr val="accent1"/>
+            </a:fillRef>
+            <a:effectRef idx="0">
+              <a:schemeClr val="accent1"/>
+            </a:effectRef>
+            <a:fontRef idx="minor">
+              <a:schemeClr val="tx1"/>
+            </a:fontRef>
+          </p:style>
+        </p:cxnSp>
+        <p:sp>
+          <p:nvSpPr>
+            <p:cNvPr id="2" name="Rounded Rectangle 1">
+              <a:extLst>
+                <a:ext uri="{FF2B5EF4-FFF2-40B4-BE49-F238E27FC236}">
+                  <a16:creationId xmlns:a16="http://schemas.microsoft.com/office/drawing/2014/main" id="{D5E5310E-256A-6677-3246-4A916F6DFBD2}"/>
+                </a:ext>
+              </a:extLst>
+            </p:cNvPr>
+            <p:cNvSpPr>
+              <a:spLocks noChangeAspect="1"/>
+            </p:cNvSpPr>
+            <p:nvPr/>
+          </p:nvSpPr>
+          <p:spPr>
+            <a:xfrm>
+              <a:off x="2490742" y="3378477"/>
+              <a:ext cx="432000" cy="432000"/>
+            </a:xfrm>
+            <a:prstGeom prst="roundRect">
+              <a:avLst/>
+            </a:prstGeom>
+            <a:noFill/>
+            <a:ln w="38100">
+              <a:solidFill>
+                <a:srgbClr val="3E7589"/>
+              </a:solidFill>
+            </a:ln>
+          </p:spPr>
+          <p:style>
+            <a:lnRef idx="2">
+              <a:schemeClr val="accent1">
+                <a:shade val="50000"/>
+              </a:schemeClr>
+            </a:lnRef>
+            <a:fillRef idx="1">
+              <a:schemeClr val="accent1"/>
+            </a:fillRef>
+            <a:effectRef idx="0">
+              <a:schemeClr val="accent1"/>
+            </a:effectRef>
+            <a:fontRef idx="minor">
+              <a:schemeClr val="lt1"/>
+            </a:fontRef>
+          </p:style>
+          <p:txBody>
+            <a:bodyPr rtlCol="0" anchor="ctr"/>
+            <a:lstStyle/>
+            <a:p>
+              <a:pPr algn="ctr"/>
+              <a:endParaRPr lang="en-US" sz="1600" dirty="0">
+                <a:solidFill>
+                  <a:schemeClr val="bg1"/>
+                </a:solidFill>
+                <a:latin typeface="Segoe UI" panose="020B0502040204020203" pitchFamily="34" charset="0"/>
+                <a:cs typeface="Segoe UI" panose="020B0502040204020203" pitchFamily="34" charset="0"/>
+              </a:endParaRPr>
+            </a:p>
+          </p:txBody>
+        </p:sp>
+        <p:sp>
+          <p:nvSpPr>
+            <p:cNvPr id="3" name="Rounded Rectangle 2">
+              <a:extLst>
+                <a:ext uri="{FF2B5EF4-FFF2-40B4-BE49-F238E27FC236}">
+                  <a16:creationId xmlns:a16="http://schemas.microsoft.com/office/drawing/2014/main" id="{203812CD-B55B-05B4-EBA9-42C6340D84BD}"/>
+                </a:ext>
+              </a:extLst>
+            </p:cNvPr>
+            <p:cNvSpPr>
+              <a:spLocks noChangeAspect="1"/>
+            </p:cNvSpPr>
+            <p:nvPr/>
+          </p:nvSpPr>
+          <p:spPr>
+            <a:xfrm>
+              <a:off x="4576221" y="3727796"/>
+              <a:ext cx="432000" cy="432000"/>
+            </a:xfrm>
+            <a:prstGeom prst="roundRect">
+              <a:avLst/>
+            </a:prstGeom>
+            <a:noFill/>
+            <a:ln w="38100">
+              <a:solidFill>
+                <a:srgbClr val="3E7589"/>
+              </a:solidFill>
+            </a:ln>
+          </p:spPr>
+          <p:style>
+            <a:lnRef idx="2">
+              <a:schemeClr val="accent1">
+                <a:shade val="50000"/>
+              </a:schemeClr>
+            </a:lnRef>
+            <a:fillRef idx="1">
+              <a:schemeClr val="accent1"/>
+            </a:fillRef>
+            <a:effectRef idx="0">
+              <a:schemeClr val="accent1"/>
+            </a:effectRef>
+            <a:fontRef idx="minor">
+              <a:schemeClr val="lt1"/>
+            </a:fontRef>
+          </p:style>
+          <p:txBody>
+            <a:bodyPr rtlCol="0" anchor="ctr"/>
+            <a:lstStyle/>
+            <a:p>
+              <a:pPr algn="ctr"/>
+              <a:endParaRPr lang="en-US" sz="1600" dirty="0">
+                <a:solidFill>
+                  <a:schemeClr val="bg1"/>
+                </a:solidFill>
+                <a:latin typeface="Segoe UI" panose="020B0502040204020203" pitchFamily="34" charset="0"/>
+                <a:cs typeface="Segoe UI" panose="020B0502040204020203" pitchFamily="34" charset="0"/>
+              </a:endParaRPr>
+            </a:p>
+          </p:txBody>
+        </p:sp>
+        <p:sp>
+          <p:nvSpPr>
+            <p:cNvPr id="4" name="Rounded Rectangle 3">
+              <a:extLst>
+                <a:ext uri="{FF2B5EF4-FFF2-40B4-BE49-F238E27FC236}">
+                  <a16:creationId xmlns:a16="http://schemas.microsoft.com/office/drawing/2014/main" id="{DA1DB0B1-E1B5-225B-B776-F2D4F2825ACE}"/>
+                </a:ext>
+              </a:extLst>
+            </p:cNvPr>
+            <p:cNvSpPr>
+              <a:spLocks noChangeAspect="1"/>
+            </p:cNvSpPr>
+            <p:nvPr/>
+          </p:nvSpPr>
+          <p:spPr>
+            <a:xfrm>
+              <a:off x="4576220" y="4835025"/>
+              <a:ext cx="432000" cy="432000"/>
+            </a:xfrm>
+            <a:prstGeom prst="roundRect">
+              <a:avLst/>
+            </a:prstGeom>
+            <a:noFill/>
+            <a:ln w="38100">
+              <a:solidFill>
+                <a:srgbClr val="3E7589"/>
+              </a:solidFill>
+            </a:ln>
+          </p:spPr>
+          <p:style>
+            <a:lnRef idx="2">
+              <a:schemeClr val="accent1">
+                <a:shade val="50000"/>
+              </a:schemeClr>
+            </a:lnRef>
+            <a:fillRef idx="1">
+              <a:schemeClr val="accent1"/>
+            </a:fillRef>
+            <a:effectRef idx="0">
+              <a:schemeClr val="accent1"/>
+            </a:effectRef>
+            <a:fontRef idx="minor">
+              <a:schemeClr val="lt1"/>
+            </a:fontRef>
+          </p:style>
+          <p:txBody>
+            <a:bodyPr rtlCol="0" anchor="ctr"/>
+            <a:lstStyle/>
+            <a:p>
+              <a:pPr algn="ctr"/>
+              <a:endParaRPr lang="en-US" sz="1600" dirty="0">
+                <a:solidFill>
+                  <a:schemeClr val="bg1"/>
+                </a:solidFill>
+                <a:latin typeface="Segoe UI" panose="020B0502040204020203" pitchFamily="34" charset="0"/>
+                <a:cs typeface="Segoe UI" panose="020B0502040204020203" pitchFamily="34" charset="0"/>
+              </a:endParaRPr>
+            </a:p>
+          </p:txBody>
+        </p:sp>
+        <p:sp>
+          <p:nvSpPr>
+            <p:cNvPr id="11" name="Rounded Rectangle 10">
+              <a:extLst>
+                <a:ext uri="{FF2B5EF4-FFF2-40B4-BE49-F238E27FC236}">
+                  <a16:creationId xmlns:a16="http://schemas.microsoft.com/office/drawing/2014/main" id="{3355245C-8D0E-1F4F-8907-3F82D1C4FE7E}"/>
+                </a:ext>
+              </a:extLst>
+            </p:cNvPr>
+            <p:cNvSpPr>
+              <a:spLocks noChangeAspect="1"/>
+            </p:cNvSpPr>
+            <p:nvPr/>
+          </p:nvSpPr>
+          <p:spPr>
+            <a:xfrm>
+              <a:off x="4574074" y="5914078"/>
+              <a:ext cx="432000" cy="432000"/>
+            </a:xfrm>
+            <a:prstGeom prst="roundRect">
+              <a:avLst/>
+            </a:prstGeom>
+            <a:noFill/>
+            <a:ln w="38100">
+              <a:solidFill>
+                <a:srgbClr val="3E7589"/>
+              </a:solidFill>
+            </a:ln>
+          </p:spPr>
+          <p:style>
+            <a:lnRef idx="2">
+              <a:schemeClr val="accent1">
+                <a:shade val="50000"/>
+              </a:schemeClr>
+            </a:lnRef>
+            <a:fillRef idx="1">
+              <a:schemeClr val="accent1"/>
+            </a:fillRef>
+            <a:effectRef idx="0">
+              <a:schemeClr val="accent1"/>
+            </a:effectRef>
+            <a:fontRef idx="minor">
+              <a:schemeClr val="lt1"/>
+            </a:fontRef>
+          </p:style>
+          <p:txBody>
+            <a:bodyPr rtlCol="0" anchor="ctr"/>
+            <a:lstStyle/>
+            <a:p>
+              <a:pPr algn="ctr"/>
+              <a:endParaRPr lang="en-US" sz="1600" dirty="0">
+                <a:solidFill>
+                  <a:schemeClr val="bg1"/>
+                </a:solidFill>
+                <a:latin typeface="Segoe UI" panose="020B0502040204020203" pitchFamily="34" charset="0"/>
+                <a:cs typeface="Segoe UI" panose="020B0502040204020203" pitchFamily="34" charset="0"/>
+              </a:endParaRPr>
+            </a:p>
+          </p:txBody>
+        </p:sp>
+        <p:cxnSp>
+          <p:nvCxnSpPr>
+            <p:cNvPr id="14" name="Straight Arrow Connector 13">
+              <a:extLst>
+                <a:ext uri="{FF2B5EF4-FFF2-40B4-BE49-F238E27FC236}">
+                  <a16:creationId xmlns:a16="http://schemas.microsoft.com/office/drawing/2014/main" id="{D3D4748D-6C00-74B5-D868-2CDA9070402C}"/>
+                </a:ext>
+              </a:extLst>
+            </p:cNvPr>
+            <p:cNvCxnSpPr>
+              <a:cxnSpLocks/>
+              <a:stCxn id="5" idx="2"/>
+              <a:endCxn id="4" idx="0"/>
+            </p:cNvCxnSpPr>
+            <p:nvPr/>
+          </p:nvCxnSpPr>
+          <p:spPr>
+            <a:xfrm>
+              <a:off x="4096474" y="3237451"/>
+              <a:ext cx="695746" cy="1597574"/>
+            </a:xfrm>
+            <a:prstGeom prst="straightConnector1">
+              <a:avLst/>
+            </a:prstGeom>
+            <a:ln w="76200">
+              <a:solidFill>
+                <a:srgbClr val="3E7589"/>
+              </a:solidFill>
+              <a:tailEnd type="triangle"/>
+            </a:ln>
+          </p:spPr>
+          <p:style>
+            <a:lnRef idx="1">
+              <a:schemeClr val="accent1"/>
+            </a:lnRef>
+            <a:fillRef idx="0">
+              <a:schemeClr val="accent1"/>
+            </a:fillRef>
+            <a:effectRef idx="0">
+              <a:schemeClr val="accent1"/>
+            </a:effectRef>
+            <a:fontRef idx="minor">
+              <a:schemeClr val="tx1"/>
+            </a:fontRef>
+          </p:style>
+        </p:cxnSp>
+        <p:cxnSp>
+          <p:nvCxnSpPr>
+            <p:cNvPr id="22" name="Straight Arrow Connector 21">
+              <a:extLst>
+                <a:ext uri="{FF2B5EF4-FFF2-40B4-BE49-F238E27FC236}">
+                  <a16:creationId xmlns:a16="http://schemas.microsoft.com/office/drawing/2014/main" id="{F5252364-5011-F8D9-A179-A587A8DEC677}"/>
+                </a:ext>
+              </a:extLst>
+            </p:cNvPr>
+            <p:cNvCxnSpPr>
+              <a:cxnSpLocks/>
+              <a:stCxn id="5" idx="2"/>
+              <a:endCxn id="3" idx="1"/>
+            </p:cNvCxnSpPr>
+            <p:nvPr/>
+          </p:nvCxnSpPr>
+          <p:spPr>
+            <a:xfrm>
+              <a:off x="4096474" y="3237451"/>
+              <a:ext cx="479747" cy="706345"/>
+            </a:xfrm>
+            <a:prstGeom prst="straightConnector1">
+              <a:avLst/>
+            </a:prstGeom>
+            <a:ln w="76200">
+              <a:solidFill>
+                <a:srgbClr val="3E7589"/>
+              </a:solidFill>
+              <a:tailEnd type="triangle"/>
+            </a:ln>
+          </p:spPr>
+          <p:style>
+            <a:lnRef idx="1">
+              <a:schemeClr val="accent1"/>
+            </a:lnRef>
+            <a:fillRef idx="0">
+              <a:schemeClr val="accent1"/>
+            </a:fillRef>
+            <a:effectRef idx="0">
+              <a:schemeClr val="accent1"/>
+            </a:effectRef>
+            <a:fontRef idx="minor">
+              <a:schemeClr val="tx1"/>
+            </a:fontRef>
+          </p:style>
+        </p:cxnSp>
+        <p:sp>
+          <p:nvSpPr>
+            <p:cNvPr id="5" name="Rounded Rectangle 4">
+              <a:extLst>
+                <a:ext uri="{FF2B5EF4-FFF2-40B4-BE49-F238E27FC236}">
+                  <a16:creationId xmlns:a16="http://schemas.microsoft.com/office/drawing/2014/main" id="{4C53B0D9-FD4C-9DB0-7278-5FB52F165392}"/>
+                </a:ext>
+              </a:extLst>
+            </p:cNvPr>
+            <p:cNvSpPr/>
+            <p:nvPr/>
+          </p:nvSpPr>
+          <p:spPr>
+            <a:xfrm>
+              <a:off x="3214474" y="2501221"/>
+              <a:ext cx="1764000" cy="736230"/>
+            </a:xfrm>
+            <a:prstGeom prst="roundRect">
+              <a:avLst/>
+            </a:prstGeom>
+            <a:solidFill>
+              <a:srgbClr val="3E7589"/>
+            </a:solidFill>
+            <a:ln w="38100">
+              <a:solidFill>
+                <a:srgbClr val="3E7589"/>
+              </a:solidFill>
+            </a:ln>
+          </p:spPr>
+          <p:style>
+            <a:lnRef idx="2">
+              <a:schemeClr val="accent1">
+                <a:shade val="50000"/>
+              </a:schemeClr>
+            </a:lnRef>
+            <a:fillRef idx="1">
+              <a:schemeClr val="accent1"/>
+            </a:fillRef>
+            <a:effectRef idx="0">
+              <a:schemeClr val="accent1"/>
+            </a:effectRef>
+            <a:fontRef idx="minor">
+              <a:schemeClr val="lt1"/>
+            </a:fontRef>
+          </p:style>
+          <p:txBody>
+            <a:bodyPr rtlCol="0" anchor="ctr"/>
+            <a:lstStyle/>
+            <a:p>
+              <a:pPr algn="ctr"/>
+              <a:r>
+                <a:rPr lang="en-US" sz="1600" b="1" dirty="0">
+                  <a:solidFill>
+                    <a:schemeClr val="bg1"/>
+                  </a:solidFill>
+                  <a:latin typeface="Segoe UI" panose="020B0502040204020203" pitchFamily="34" charset="0"/>
+                  <a:cs typeface="Segoe UI" panose="020B0502040204020203" pitchFamily="34" charset="0"/>
+                </a:rPr>
+                <a:t>Fish Index</a:t>
+              </a:r>
+              <a:endParaRPr lang="en-US" sz="1600" dirty="0">
+                <a:solidFill>
+                  <a:schemeClr val="bg1"/>
+                </a:solidFill>
+                <a:latin typeface="Segoe UI" panose="020B0502040204020203" pitchFamily="34" charset="0"/>
+                <a:cs typeface="Segoe UI" panose="020B0502040204020203" pitchFamily="34" charset="0"/>
+              </a:endParaRPr>
+            </a:p>
+          </p:txBody>
+        </p:sp>
+        <p:cxnSp>
+          <p:nvCxnSpPr>
+            <p:cNvPr id="27" name="Straight Arrow Connector 26">
+              <a:extLst>
+                <a:ext uri="{FF2B5EF4-FFF2-40B4-BE49-F238E27FC236}">
+                  <a16:creationId xmlns:a16="http://schemas.microsoft.com/office/drawing/2014/main" id="{DC96937D-7EB8-59CF-B9DD-88C46077260B}"/>
+                </a:ext>
+              </a:extLst>
+            </p:cNvPr>
+            <p:cNvCxnSpPr>
+              <a:cxnSpLocks/>
+              <a:stCxn id="33" idx="2"/>
+              <a:endCxn id="30" idx="0"/>
+            </p:cNvCxnSpPr>
+            <p:nvPr/>
+          </p:nvCxnSpPr>
+          <p:spPr>
+            <a:xfrm>
+              <a:off x="6042690" y="3237451"/>
+              <a:ext cx="1044392" cy="2791216"/>
+            </a:xfrm>
+            <a:prstGeom prst="straightConnector1">
+              <a:avLst/>
+            </a:prstGeom>
+            <a:ln w="76200">
+              <a:solidFill>
+                <a:srgbClr val="3E7589"/>
+              </a:solidFill>
+              <a:tailEnd type="triangle"/>
+            </a:ln>
+          </p:spPr>
+          <p:style>
+            <a:lnRef idx="1">
+              <a:schemeClr val="accent1"/>
+            </a:lnRef>
+            <a:fillRef idx="0">
+              <a:schemeClr val="accent1"/>
+            </a:fillRef>
+            <a:effectRef idx="0">
+              <a:schemeClr val="accent1"/>
+            </a:effectRef>
+            <a:fontRef idx="minor">
+              <a:schemeClr val="tx1"/>
+            </a:fontRef>
+          </p:style>
+        </p:cxnSp>
+        <p:sp>
+          <p:nvSpPr>
+            <p:cNvPr id="28" name="Rounded Rectangle 27">
+              <a:extLst>
+                <a:ext uri="{FF2B5EF4-FFF2-40B4-BE49-F238E27FC236}">
+                  <a16:creationId xmlns:a16="http://schemas.microsoft.com/office/drawing/2014/main" id="{071F1DC4-C0B5-4532-93C4-B13061DEDA97}"/>
+                </a:ext>
+              </a:extLst>
+            </p:cNvPr>
+            <p:cNvSpPr>
+              <a:spLocks noChangeAspect="1"/>
+            </p:cNvSpPr>
+            <p:nvPr/>
+          </p:nvSpPr>
+          <p:spPr>
+            <a:xfrm>
+              <a:off x="6873229" y="3804285"/>
+              <a:ext cx="432000" cy="432000"/>
+            </a:xfrm>
+            <a:prstGeom prst="roundRect">
+              <a:avLst/>
+            </a:prstGeom>
+            <a:noFill/>
+            <a:ln w="38100">
+              <a:solidFill>
+                <a:srgbClr val="3E7589"/>
+              </a:solidFill>
+            </a:ln>
+          </p:spPr>
+          <p:style>
+            <a:lnRef idx="2">
+              <a:schemeClr val="accent1">
+                <a:shade val="50000"/>
+              </a:schemeClr>
+            </a:lnRef>
+            <a:fillRef idx="1">
+              <a:schemeClr val="accent1"/>
+            </a:fillRef>
+            <a:effectRef idx="0">
+              <a:schemeClr val="accent1"/>
+            </a:effectRef>
+            <a:fontRef idx="minor">
+              <a:schemeClr val="lt1"/>
+            </a:fontRef>
+          </p:style>
+          <p:txBody>
+            <a:bodyPr rtlCol="0" anchor="ctr"/>
+            <a:lstStyle/>
+            <a:p>
+              <a:pPr algn="ctr"/>
+              <a:endParaRPr lang="en-US" sz="1600" dirty="0">
+                <a:solidFill>
+                  <a:schemeClr val="bg1"/>
+                </a:solidFill>
+                <a:latin typeface="Segoe UI" panose="020B0502040204020203" pitchFamily="34" charset="0"/>
+                <a:cs typeface="Segoe UI" panose="020B0502040204020203" pitchFamily="34" charset="0"/>
+              </a:endParaRPr>
+            </a:p>
+          </p:txBody>
+        </p:sp>
+        <p:sp>
+          <p:nvSpPr>
+            <p:cNvPr id="29" name="Rounded Rectangle 28">
+              <a:extLst>
+                <a:ext uri="{FF2B5EF4-FFF2-40B4-BE49-F238E27FC236}">
+                  <a16:creationId xmlns:a16="http://schemas.microsoft.com/office/drawing/2014/main" id="{D87E7A29-1792-CF46-BD09-C2542353C93D}"/>
+                </a:ext>
+              </a:extLst>
+            </p:cNvPr>
+            <p:cNvSpPr>
+              <a:spLocks noChangeAspect="1"/>
+            </p:cNvSpPr>
+            <p:nvPr/>
+          </p:nvSpPr>
+          <p:spPr>
+            <a:xfrm>
+              <a:off x="6873228" y="5092489"/>
+              <a:ext cx="432000" cy="432000"/>
+            </a:xfrm>
+            <a:prstGeom prst="roundRect">
+              <a:avLst/>
+            </a:prstGeom>
+            <a:noFill/>
+            <a:ln w="38100">
+              <a:solidFill>
+                <a:srgbClr val="3E7589"/>
+              </a:solidFill>
+            </a:ln>
+          </p:spPr>
+          <p:style>
+            <a:lnRef idx="2">
+              <a:schemeClr val="accent1">
+                <a:shade val="50000"/>
+              </a:schemeClr>
+            </a:lnRef>
+            <a:fillRef idx="1">
+              <a:schemeClr val="accent1"/>
+            </a:fillRef>
+            <a:effectRef idx="0">
+              <a:schemeClr val="accent1"/>
+            </a:effectRef>
+            <a:fontRef idx="minor">
+              <a:schemeClr val="lt1"/>
+            </a:fontRef>
+          </p:style>
+          <p:txBody>
+            <a:bodyPr rtlCol="0" anchor="ctr"/>
+            <a:lstStyle/>
+            <a:p>
+              <a:pPr algn="ctr"/>
+              <a:endParaRPr lang="en-US" sz="1600" dirty="0">
+                <a:solidFill>
+                  <a:schemeClr val="bg1"/>
+                </a:solidFill>
+                <a:latin typeface="Segoe UI" panose="020B0502040204020203" pitchFamily="34" charset="0"/>
+                <a:cs typeface="Segoe UI" panose="020B0502040204020203" pitchFamily="34" charset="0"/>
+              </a:endParaRPr>
+            </a:p>
+          </p:txBody>
+        </p:sp>
+        <p:sp>
+          <p:nvSpPr>
+            <p:cNvPr id="30" name="Rounded Rectangle 29">
+              <a:extLst>
+                <a:ext uri="{FF2B5EF4-FFF2-40B4-BE49-F238E27FC236}">
+                  <a16:creationId xmlns:a16="http://schemas.microsoft.com/office/drawing/2014/main" id="{79AE89F1-5301-3A60-CB05-BFB2E223D48A}"/>
+                </a:ext>
+              </a:extLst>
+            </p:cNvPr>
+            <p:cNvSpPr>
+              <a:spLocks noChangeAspect="1"/>
+            </p:cNvSpPr>
+            <p:nvPr/>
+          </p:nvSpPr>
+          <p:spPr>
+            <a:xfrm>
+              <a:off x="6871082" y="6028667"/>
+              <a:ext cx="432000" cy="432000"/>
+            </a:xfrm>
+            <a:prstGeom prst="roundRect">
+              <a:avLst/>
+            </a:prstGeom>
+            <a:noFill/>
+            <a:ln w="38100">
+              <a:solidFill>
+                <a:srgbClr val="3E7589"/>
+              </a:solidFill>
+            </a:ln>
+          </p:spPr>
+          <p:style>
+            <a:lnRef idx="2">
+              <a:schemeClr val="accent1">
+                <a:shade val="50000"/>
+              </a:schemeClr>
+            </a:lnRef>
+            <a:fillRef idx="1">
+              <a:schemeClr val="accent1"/>
+            </a:fillRef>
+            <a:effectRef idx="0">
+              <a:schemeClr val="accent1"/>
+            </a:effectRef>
+            <a:fontRef idx="minor">
+              <a:schemeClr val="lt1"/>
+            </a:fontRef>
+          </p:style>
+          <p:txBody>
+            <a:bodyPr rtlCol="0" anchor="ctr"/>
+            <a:lstStyle/>
+            <a:p>
+              <a:pPr algn="ctr"/>
+              <a:endParaRPr lang="en-US" sz="1600" dirty="0">
+                <a:solidFill>
+                  <a:schemeClr val="bg1"/>
+                </a:solidFill>
+                <a:latin typeface="Segoe UI" panose="020B0502040204020203" pitchFamily="34" charset="0"/>
+                <a:cs typeface="Segoe UI" panose="020B0502040204020203" pitchFamily="34" charset="0"/>
+              </a:endParaRPr>
+            </a:p>
+          </p:txBody>
+        </p:sp>
+        <p:cxnSp>
+          <p:nvCxnSpPr>
+            <p:cNvPr id="31" name="Straight Arrow Connector 30">
+              <a:extLst>
+                <a:ext uri="{FF2B5EF4-FFF2-40B4-BE49-F238E27FC236}">
+                  <a16:creationId xmlns:a16="http://schemas.microsoft.com/office/drawing/2014/main" id="{9DD6C7E9-B5F8-E33D-52A1-E09366ECA7E8}"/>
+                </a:ext>
+              </a:extLst>
+            </p:cNvPr>
+            <p:cNvCxnSpPr>
+              <a:cxnSpLocks/>
+              <a:stCxn id="33" idx="2"/>
+              <a:endCxn id="29" idx="0"/>
+            </p:cNvCxnSpPr>
+            <p:nvPr/>
+          </p:nvCxnSpPr>
+          <p:spPr>
+            <a:xfrm>
+              <a:off x="6042690" y="3237451"/>
+              <a:ext cx="1046538" cy="1855038"/>
+            </a:xfrm>
+            <a:prstGeom prst="straightConnector1">
+              <a:avLst/>
+            </a:prstGeom>
+            <a:ln w="76200">
+              <a:solidFill>
+                <a:srgbClr val="3E7589"/>
+              </a:solidFill>
+              <a:tailEnd type="triangle"/>
+            </a:ln>
+          </p:spPr>
+          <p:style>
+            <a:lnRef idx="1">
+              <a:schemeClr val="accent1"/>
+            </a:lnRef>
+            <a:fillRef idx="0">
+              <a:schemeClr val="accent1"/>
+            </a:fillRef>
+            <a:effectRef idx="0">
+              <a:schemeClr val="accent1"/>
+            </a:effectRef>
+            <a:fontRef idx="minor">
+              <a:schemeClr val="tx1"/>
+            </a:fontRef>
+          </p:style>
+        </p:cxnSp>
+        <p:cxnSp>
+          <p:nvCxnSpPr>
+            <p:cNvPr id="32" name="Straight Arrow Connector 31">
+              <a:extLst>
+                <a:ext uri="{FF2B5EF4-FFF2-40B4-BE49-F238E27FC236}">
+                  <a16:creationId xmlns:a16="http://schemas.microsoft.com/office/drawing/2014/main" id="{2F861B16-6914-6C3C-40AA-7C44A56AB431}"/>
+                </a:ext>
+              </a:extLst>
+            </p:cNvPr>
+            <p:cNvCxnSpPr>
+              <a:cxnSpLocks/>
+              <a:stCxn id="33" idx="2"/>
+              <a:endCxn id="28" idx="1"/>
+            </p:cNvCxnSpPr>
+            <p:nvPr/>
+          </p:nvCxnSpPr>
+          <p:spPr>
+            <a:xfrm>
+              <a:off x="6042690" y="3237451"/>
+              <a:ext cx="830539" cy="782834"/>
+            </a:xfrm>
+            <a:prstGeom prst="straightConnector1">
+              <a:avLst/>
+            </a:prstGeom>
+            <a:ln w="76200">
+              <a:solidFill>
+                <a:srgbClr val="3E7589"/>
+              </a:solidFill>
+              <a:tailEnd type="triangle"/>
+            </a:ln>
+          </p:spPr>
+          <p:style>
+            <a:lnRef idx="1">
+              <a:schemeClr val="accent1"/>
+            </a:lnRef>
+            <a:fillRef idx="0">
+              <a:schemeClr val="accent1"/>
+            </a:fillRef>
+            <a:effectRef idx="0">
+              <a:schemeClr val="accent1"/>
+            </a:effectRef>
+            <a:fontRef idx="minor">
+              <a:schemeClr val="tx1"/>
+            </a:fontRef>
+          </p:style>
+        </p:cxnSp>
+        <p:sp>
+          <p:nvSpPr>
+            <p:cNvPr id="33" name="Rounded Rectangle 32">
+              <a:extLst>
+                <a:ext uri="{FF2B5EF4-FFF2-40B4-BE49-F238E27FC236}">
+                  <a16:creationId xmlns:a16="http://schemas.microsoft.com/office/drawing/2014/main" id="{32C6E639-86F3-D89A-5452-A749CFD56125}"/>
+                </a:ext>
+              </a:extLst>
+            </p:cNvPr>
+            <p:cNvSpPr/>
+            <p:nvPr/>
+          </p:nvSpPr>
+          <p:spPr>
+            <a:xfrm>
+              <a:off x="5160690" y="2501221"/>
+              <a:ext cx="1764000" cy="736230"/>
+            </a:xfrm>
+            <a:prstGeom prst="roundRect">
+              <a:avLst/>
+            </a:prstGeom>
+            <a:solidFill>
+              <a:srgbClr val="3E7589"/>
+            </a:solidFill>
+            <a:ln w="38100">
+              <a:solidFill>
+                <a:srgbClr val="3E7589"/>
+              </a:solidFill>
+            </a:ln>
+          </p:spPr>
+          <p:style>
+            <a:lnRef idx="2">
+              <a:schemeClr val="accent1">
+                <a:shade val="50000"/>
+              </a:schemeClr>
+            </a:lnRef>
+            <a:fillRef idx="1">
+              <a:schemeClr val="accent1"/>
+            </a:fillRef>
+            <a:effectRef idx="0">
+              <a:schemeClr val="accent1"/>
+            </a:effectRef>
+            <a:fontRef idx="minor">
+              <a:schemeClr val="lt1"/>
+            </a:fontRef>
+          </p:style>
+          <p:txBody>
+            <a:bodyPr rtlCol="0" anchor="ctr"/>
+            <a:lstStyle/>
+            <a:p>
+              <a:pPr algn="ctr"/>
+              <a:r>
+                <a:rPr lang="en-US" sz="1600" b="1" dirty="0">
+                  <a:solidFill>
+                    <a:schemeClr val="bg1"/>
+                  </a:solidFill>
+                  <a:latin typeface="Segoe UI" panose="020B0502040204020203" pitchFamily="34" charset="0"/>
+                  <a:cs typeface="Segoe UI" panose="020B0502040204020203" pitchFamily="34" charset="0"/>
+                </a:rPr>
+                <a:t>Task Index</a:t>
+              </a:r>
+              <a:endParaRPr lang="en-US" sz="1600" dirty="0">
+                <a:solidFill>
+                  <a:schemeClr val="bg1"/>
+                </a:solidFill>
+                <a:latin typeface="Segoe UI" panose="020B0502040204020203" pitchFamily="34" charset="0"/>
+                <a:cs typeface="Segoe UI" panose="020B0502040204020203" pitchFamily="34" charset="0"/>
+              </a:endParaRPr>
+            </a:p>
+          </p:txBody>
+        </p:sp>
+        <p:cxnSp>
+          <p:nvCxnSpPr>
+            <p:cNvPr id="43" name="Straight Arrow Connector 42">
+              <a:extLst>
+                <a:ext uri="{FF2B5EF4-FFF2-40B4-BE49-F238E27FC236}">
+                  <a16:creationId xmlns:a16="http://schemas.microsoft.com/office/drawing/2014/main" id="{29E8B53B-C03C-4A0F-4C94-F02535A0294C}"/>
+                </a:ext>
+              </a:extLst>
+            </p:cNvPr>
+            <p:cNvCxnSpPr>
+              <a:cxnSpLocks/>
+              <a:stCxn id="46" idx="2"/>
+              <a:endCxn id="38" idx="0"/>
+            </p:cNvCxnSpPr>
+            <p:nvPr/>
+          </p:nvCxnSpPr>
+          <p:spPr>
+            <a:xfrm>
+              <a:off x="2174044" y="3237451"/>
+              <a:ext cx="537315" cy="2399313"/>
+            </a:xfrm>
+            <a:prstGeom prst="straightConnector1">
+              <a:avLst/>
+            </a:prstGeom>
+            <a:ln w="76200">
+              <a:solidFill>
+                <a:srgbClr val="3E7589"/>
+              </a:solidFill>
+              <a:tailEnd type="triangle"/>
+            </a:ln>
+          </p:spPr>
+          <p:style>
+            <a:lnRef idx="1">
+              <a:schemeClr val="accent1"/>
+            </a:lnRef>
+            <a:fillRef idx="0">
+              <a:schemeClr val="accent1"/>
+            </a:fillRef>
+            <a:effectRef idx="0">
+              <a:schemeClr val="accent1"/>
+            </a:effectRef>
+            <a:fontRef idx="minor">
+              <a:schemeClr val="tx1"/>
+            </a:fontRef>
+          </p:style>
+        </p:cxnSp>
+        <p:cxnSp>
+          <p:nvCxnSpPr>
+            <p:cNvPr id="44" name="Straight Arrow Connector 43">
+              <a:extLst>
+                <a:ext uri="{FF2B5EF4-FFF2-40B4-BE49-F238E27FC236}">
+                  <a16:creationId xmlns:a16="http://schemas.microsoft.com/office/drawing/2014/main" id="{C024EB83-0961-87F9-55E3-9173CBD317C9}"/>
+                </a:ext>
+              </a:extLst>
+            </p:cNvPr>
+            <p:cNvCxnSpPr>
+              <a:cxnSpLocks/>
+              <a:stCxn id="46" idx="2"/>
+              <a:endCxn id="2" idx="1"/>
+            </p:cNvCxnSpPr>
+            <p:nvPr/>
+          </p:nvCxnSpPr>
+          <p:spPr>
+            <a:xfrm>
+              <a:off x="2174044" y="3237451"/>
+              <a:ext cx="316698" cy="357026"/>
+            </a:xfrm>
+            <a:prstGeom prst="straightConnector1">
+              <a:avLst/>
+            </a:prstGeom>
+            <a:ln w="76200">
+              <a:solidFill>
+                <a:srgbClr val="3E7589"/>
+              </a:solidFill>
+              <a:tailEnd type="triangle"/>
+            </a:ln>
+          </p:spPr>
+          <p:style>
+            <a:lnRef idx="1">
+              <a:schemeClr val="accent1"/>
+            </a:lnRef>
+            <a:fillRef idx="0">
+              <a:schemeClr val="accent1"/>
+            </a:fillRef>
+            <a:effectRef idx="0">
+              <a:schemeClr val="accent1"/>
+            </a:effectRef>
+            <a:fontRef idx="minor">
+              <a:schemeClr val="tx1"/>
+            </a:fontRef>
+          </p:style>
+        </p:cxnSp>
+        <p:sp>
+          <p:nvSpPr>
+            <p:cNvPr id="46" name="Rounded Rectangle 45">
+              <a:extLst>
+                <a:ext uri="{FF2B5EF4-FFF2-40B4-BE49-F238E27FC236}">
+                  <a16:creationId xmlns:a16="http://schemas.microsoft.com/office/drawing/2014/main" id="{E2DE8832-A941-F38B-CB1F-FDBE274198DF}"/>
+                </a:ext>
+              </a:extLst>
+            </p:cNvPr>
+            <p:cNvSpPr/>
+            <p:nvPr/>
+          </p:nvSpPr>
+          <p:spPr>
+            <a:xfrm>
+              <a:off x="1292044" y="2501221"/>
+              <a:ext cx="1764000" cy="736230"/>
+            </a:xfrm>
+            <a:prstGeom prst="roundRect">
+              <a:avLst/>
+            </a:prstGeom>
+            <a:solidFill>
+              <a:srgbClr val="3E7589"/>
+            </a:solidFill>
+            <a:ln w="38100">
+              <a:solidFill>
+                <a:srgbClr val="3E7589"/>
+              </a:solidFill>
+            </a:ln>
+          </p:spPr>
+          <p:style>
+            <a:lnRef idx="2">
+              <a:schemeClr val="accent1">
+                <a:shade val="50000"/>
+              </a:schemeClr>
+            </a:lnRef>
+            <a:fillRef idx="1">
+              <a:schemeClr val="accent1"/>
+            </a:fillRef>
+            <a:effectRef idx="0">
+              <a:schemeClr val="accent1"/>
+            </a:effectRef>
+            <a:fontRef idx="minor">
+              <a:schemeClr val="lt1"/>
+            </a:fontRef>
+          </p:style>
+          <p:txBody>
+            <a:bodyPr rtlCol="0" anchor="ctr"/>
+            <a:lstStyle/>
+            <a:p>
+              <a:pPr algn="ctr"/>
+              <a:r>
+                <a:rPr lang="en-US" sz="1600" b="1" dirty="0">
+                  <a:solidFill>
+                    <a:schemeClr val="bg1"/>
+                  </a:solidFill>
+                  <a:latin typeface="Segoe UI" panose="020B0502040204020203" pitchFamily="34" charset="0"/>
+                  <a:cs typeface="Segoe UI" panose="020B0502040204020203" pitchFamily="34" charset="0"/>
+                </a:rPr>
+                <a:t>Tank Index</a:t>
+              </a:r>
+              <a:endParaRPr lang="en-US" sz="1600" dirty="0">
+                <a:solidFill>
+                  <a:schemeClr val="bg1"/>
+                </a:solidFill>
+                <a:latin typeface="Segoe UI" panose="020B0502040204020203" pitchFamily="34" charset="0"/>
+                <a:cs typeface="Segoe UI" panose="020B0502040204020203" pitchFamily="34" charset="0"/>
+              </a:endParaRPr>
+            </a:p>
+          </p:txBody>
+        </p:sp>
+      </p:grpSp>
+    </p:spTree>
+    <p:extLst>
+      <p:ext uri="{BB962C8B-B14F-4D97-AF65-F5344CB8AC3E}">
+        <p14:creationId xmlns:p14="http://schemas.microsoft.com/office/powerpoint/2010/main" val="3853040472"/>
+      </p:ext>
+    </p:extLst>
+  </p:cSld>
+  <p:clrMapOvr>
+    <a:masterClrMapping/>
+  </p:clrMapOvr>
+</p:sld>
+</file>
+
 <file path=ppt/theme/theme1.xml><?xml version="1.0" encoding="utf-8"?>
 <a:theme xmlns:a="http://schemas.openxmlformats.org/drawingml/2006/main" name="Office Theme">
   <a:themeElements>

</xml_diff>

<commit_message>
Add Ui explanations on Fish and Tank
</commit_message>
<xml_diff>
--- a/docs/2103UG.pptx
+++ b/docs/2103UG.pptx
@@ -11,6 +11,8 @@
     <p:sldId id="259" r:id="rId5"/>
     <p:sldId id="260" r:id="rId6"/>
     <p:sldId id="261" r:id="rId7"/>
+    <p:sldId id="263" r:id="rId8"/>
+    <p:sldId id="262" r:id="rId9"/>
   </p:sldIdLst>
   <p:sldSz cx="12192000" cy="6858000"/>
   <p:notesSz cx="6858000" cy="9144000"/>
@@ -266,7 +268,7 @@
           <a:p>
             <a:fld id="{EB7151ED-93A3-4DE6-9A0B-D1B289A286F2}" type="datetimeFigureOut">
               <a:rPr lang="en-SG" smtClean="0"/>
-              <a:t>4/4/23</a:t>
+              <a:t>6/4/2023</a:t>
             </a:fld>
             <a:endParaRPr lang="en-SG"/>
           </a:p>
@@ -466,7 +468,7 @@
           <a:p>
             <a:fld id="{EB7151ED-93A3-4DE6-9A0B-D1B289A286F2}" type="datetimeFigureOut">
               <a:rPr lang="en-SG" smtClean="0"/>
-              <a:t>4/4/23</a:t>
+              <a:t>6/4/2023</a:t>
             </a:fld>
             <a:endParaRPr lang="en-SG"/>
           </a:p>
@@ -676,7 +678,7 @@
           <a:p>
             <a:fld id="{EB7151ED-93A3-4DE6-9A0B-D1B289A286F2}" type="datetimeFigureOut">
               <a:rPr lang="en-SG" smtClean="0"/>
-              <a:t>4/4/23</a:t>
+              <a:t>6/4/2023</a:t>
             </a:fld>
             <a:endParaRPr lang="en-SG"/>
           </a:p>
@@ -876,7 +878,7 @@
           <a:p>
             <a:fld id="{EB7151ED-93A3-4DE6-9A0B-D1B289A286F2}" type="datetimeFigureOut">
               <a:rPr lang="en-SG" smtClean="0"/>
-              <a:t>4/4/23</a:t>
+              <a:t>6/4/2023</a:t>
             </a:fld>
             <a:endParaRPr lang="en-SG"/>
           </a:p>
@@ -1152,7 +1154,7 @@
           <a:p>
             <a:fld id="{EB7151ED-93A3-4DE6-9A0B-D1B289A286F2}" type="datetimeFigureOut">
               <a:rPr lang="en-SG" smtClean="0"/>
-              <a:t>4/4/23</a:t>
+              <a:t>6/4/2023</a:t>
             </a:fld>
             <a:endParaRPr lang="en-SG"/>
           </a:p>
@@ -1420,7 +1422,7 @@
           <a:p>
             <a:fld id="{EB7151ED-93A3-4DE6-9A0B-D1B289A286F2}" type="datetimeFigureOut">
               <a:rPr lang="en-SG" smtClean="0"/>
-              <a:t>4/4/23</a:t>
+              <a:t>6/4/2023</a:t>
             </a:fld>
             <a:endParaRPr lang="en-SG"/>
           </a:p>
@@ -1835,7 +1837,7 @@
           <a:p>
             <a:fld id="{EB7151ED-93A3-4DE6-9A0B-D1B289A286F2}" type="datetimeFigureOut">
               <a:rPr lang="en-SG" smtClean="0"/>
-              <a:t>4/4/23</a:t>
+              <a:t>6/4/2023</a:t>
             </a:fld>
             <a:endParaRPr lang="en-SG"/>
           </a:p>
@@ -1977,7 +1979,7 @@
           <a:p>
             <a:fld id="{EB7151ED-93A3-4DE6-9A0B-D1B289A286F2}" type="datetimeFigureOut">
               <a:rPr lang="en-SG" smtClean="0"/>
-              <a:t>4/4/23</a:t>
+              <a:t>6/4/2023</a:t>
             </a:fld>
             <a:endParaRPr lang="en-SG"/>
           </a:p>
@@ -2090,7 +2092,7 @@
           <a:p>
             <a:fld id="{EB7151ED-93A3-4DE6-9A0B-D1B289A286F2}" type="datetimeFigureOut">
               <a:rPr lang="en-SG" smtClean="0"/>
-              <a:t>4/4/23</a:t>
+              <a:t>6/4/2023</a:t>
             </a:fld>
             <a:endParaRPr lang="en-SG"/>
           </a:p>
@@ -2403,7 +2405,7 @@
           <a:p>
             <a:fld id="{EB7151ED-93A3-4DE6-9A0B-D1B289A286F2}" type="datetimeFigureOut">
               <a:rPr lang="en-SG" smtClean="0"/>
-              <a:t>4/4/23</a:t>
+              <a:t>6/4/2023</a:t>
             </a:fld>
             <a:endParaRPr lang="en-SG"/>
           </a:p>
@@ -2692,7 +2694,7 @@
           <a:p>
             <a:fld id="{EB7151ED-93A3-4DE6-9A0B-D1B289A286F2}" type="datetimeFigureOut">
               <a:rPr lang="en-SG" smtClean="0"/>
-              <a:t>4/4/23</a:t>
+              <a:t>6/4/2023</a:t>
             </a:fld>
             <a:endParaRPr lang="en-SG"/>
           </a:p>
@@ -2935,7 +2937,7 @@
           <a:p>
             <a:fld id="{EB7151ED-93A3-4DE6-9A0B-D1B289A286F2}" type="datetimeFigureOut">
               <a:rPr lang="en-SG" smtClean="0"/>
-              <a:t>4/4/23</a:t>
+              <a:t>6/4/2023</a:t>
             </a:fld>
             <a:endParaRPr lang="en-SG"/>
           </a:p>
@@ -7166,6 +7168,2663 @@
 </p:sld>
 </file>
 
+<file path=ppt/slides/slide7.xml><?xml version="1.0" encoding="utf-8"?>
+<p:sld xmlns:a="http://schemas.openxmlformats.org/drawingml/2006/main" xmlns:r="http://schemas.openxmlformats.org/officeDocument/2006/relationships" xmlns:p="http://schemas.openxmlformats.org/presentationml/2006/main">
+  <p:cSld>
+    <p:spTree>
+      <p:nvGrpSpPr>
+        <p:cNvPr id="1" name=""/>
+        <p:cNvGrpSpPr/>
+        <p:nvPr/>
+      </p:nvGrpSpPr>
+      <p:grpSpPr>
+        <a:xfrm>
+          <a:off x="0" y="0"/>
+          <a:ext cx="0" cy="0"/>
+          <a:chOff x="0" y="0"/>
+          <a:chExt cx="0" cy="0"/>
+        </a:xfrm>
+      </p:grpSpPr>
+      <p:grpSp>
+        <p:nvGrpSpPr>
+          <p:cNvPr id="105" name="Group 104">
+            <a:extLst>
+              <a:ext uri="{FF2B5EF4-FFF2-40B4-BE49-F238E27FC236}">
+                <a16:creationId xmlns:a16="http://schemas.microsoft.com/office/drawing/2014/main" id="{F065FB20-9078-65EB-5886-A5663437846F}"/>
+              </a:ext>
+            </a:extLst>
+          </p:cNvPr>
+          <p:cNvGrpSpPr/>
+          <p:nvPr/>
+        </p:nvGrpSpPr>
+        <p:grpSpPr>
+          <a:xfrm>
+            <a:off x="1308030" y="479013"/>
+            <a:ext cx="9224386" cy="6101825"/>
+            <a:chOff x="1308030" y="479013"/>
+            <a:chExt cx="9224386" cy="6101825"/>
+          </a:xfrm>
+        </p:grpSpPr>
+        <p:sp>
+          <p:nvSpPr>
+            <p:cNvPr id="104" name="Rectangle 103">
+              <a:extLst>
+                <a:ext uri="{FF2B5EF4-FFF2-40B4-BE49-F238E27FC236}">
+                  <a16:creationId xmlns:a16="http://schemas.microsoft.com/office/drawing/2014/main" id="{EFE97ABE-00E2-6E98-502B-F28E4A185729}"/>
+                </a:ext>
+              </a:extLst>
+            </p:cNvPr>
+            <p:cNvSpPr/>
+            <p:nvPr/>
+          </p:nvSpPr>
+          <p:spPr>
+            <a:xfrm>
+              <a:off x="1308030" y="479013"/>
+              <a:ext cx="9224386" cy="6101825"/>
+            </a:xfrm>
+            <a:prstGeom prst="rect">
+              <a:avLst/>
+            </a:prstGeom>
+            <a:noFill/>
+            <a:ln>
+              <a:noFill/>
+            </a:ln>
+          </p:spPr>
+          <p:style>
+            <a:lnRef idx="2">
+              <a:schemeClr val="accent1">
+                <a:shade val="50000"/>
+              </a:schemeClr>
+            </a:lnRef>
+            <a:fillRef idx="1">
+              <a:schemeClr val="accent1"/>
+            </a:fillRef>
+            <a:effectRef idx="0">
+              <a:schemeClr val="accent1"/>
+            </a:effectRef>
+            <a:fontRef idx="minor">
+              <a:schemeClr val="lt1"/>
+            </a:fontRef>
+          </p:style>
+          <p:txBody>
+            <a:bodyPr rtlCol="0" anchor="ctr"/>
+            <a:lstStyle/>
+            <a:p>
+              <a:pPr algn="ctr"/>
+              <a:endParaRPr lang="en-SG"/>
+            </a:p>
+          </p:txBody>
+        </p:sp>
+        <p:grpSp>
+          <p:nvGrpSpPr>
+            <p:cNvPr id="99" name="Group 98">
+              <a:extLst>
+                <a:ext uri="{FF2B5EF4-FFF2-40B4-BE49-F238E27FC236}">
+                  <a16:creationId xmlns:a16="http://schemas.microsoft.com/office/drawing/2014/main" id="{578A5AFA-049C-9566-3346-A5E073B84C37}"/>
+                </a:ext>
+              </a:extLst>
+            </p:cNvPr>
+            <p:cNvGrpSpPr>
+              <a:grpSpLocks noChangeAspect="1"/>
+            </p:cNvGrpSpPr>
+            <p:nvPr/>
+          </p:nvGrpSpPr>
+          <p:grpSpPr>
+            <a:xfrm>
+              <a:off x="2081862" y="1816811"/>
+              <a:ext cx="7670805" cy="2879541"/>
+              <a:chOff x="834600" y="784279"/>
+              <a:chExt cx="9847830" cy="3696774"/>
+            </a:xfrm>
+          </p:grpSpPr>
+          <p:pic>
+            <p:nvPicPr>
+              <p:cNvPr id="7" name="Picture 6" descr="A screenshot of a computer&#10;&#10;Description automatically generated with medium confidence">
+                <a:extLst>
+                  <a:ext uri="{FF2B5EF4-FFF2-40B4-BE49-F238E27FC236}">
+                    <a16:creationId xmlns:a16="http://schemas.microsoft.com/office/drawing/2014/main" id="{B6ED7993-029F-3991-0E7F-B7FA2173BF82}"/>
+                  </a:ext>
+                </a:extLst>
+              </p:cNvPr>
+              <p:cNvPicPr>
+                <a:picLocks noChangeAspect="1"/>
+              </p:cNvPicPr>
+              <p:nvPr/>
+            </p:nvPicPr>
+            <p:blipFill rotWithShape="1">
+              <a:blip r:embed="rId2">
+                <a:extLst>
+                  <a:ext uri="{BEBA8EAE-BF5A-486C-A8C5-ECC9F3942E4B}">
+                    <a14:imgProps xmlns:a14="http://schemas.microsoft.com/office/drawing/2010/main">
+                      <a14:imgLayer r:embed="rId3">
+                        <a14:imgEffect>
+                          <a14:backgroundRemoval t="33979" b="51402" l="36617" r="61831">
+                            <a14:foregroundMark x1="38062" y1="38919" x2="52141" y2="40721"/>
+                            <a14:foregroundMark x1="52141" y1="40721" x2="53640" y2="40587"/>
+                            <a14:foregroundMark x1="61188" y1="38785" x2="44914" y2="36782"/>
+                            <a14:foregroundMark x1="58887" y1="41188" x2="58512" y2="47463"/>
+                            <a14:foregroundMark x1="58512" y1="47463" x2="47430" y2="49599"/>
+                            <a14:foregroundMark x1="47430" y1="49599" x2="39775" y2="49599"/>
+                            <a14:foregroundMark x1="37420" y1="38585" x2="51392" y2="38985"/>
+                            <a14:foregroundMark x1="37955" y1="36182" x2="52891" y2="40120"/>
+                            <a14:foregroundMark x1="37741" y1="36182" x2="51981" y2="37250"/>
+                            <a14:foregroundMark x1="51981" y1="37250" x2="57334" y2="36716"/>
+                            <a14:foregroundMark x1="57334" y1="36716" x2="61296" y2="42790"/>
+                            <a14:foregroundMark x1="61296" y1="42790" x2="61081" y2="49533"/>
+                            <a14:foregroundMark x1="61081" y1="49533" x2="39347" y2="48865"/>
+                            <a14:foregroundMark x1="37527" y1="37517" x2="37848" y2="48665"/>
+                            <a14:foregroundMark x1="36938" y1="36782" x2="37259" y2="50668"/>
+                            <a14:foregroundMark x1="37259" y1="50668" x2="51660" y2="51335"/>
+                            <a14:foregroundMark x1="51660" y1="51335" x2="60814" y2="51001"/>
+                            <a14:foregroundMark x1="56745" y1="47263" x2="39989" y2="47530"/>
+                            <a14:foregroundMark x1="40043" y1="50267" x2="55086" y2="49666"/>
+                            <a14:foregroundMark x1="40685" y1="45928" x2="52302" y2="47997"/>
+                            <a14:foregroundMark x1="42827" y1="47597" x2="48822" y2="48331"/>
+                            <a14:foregroundMark x1="37955" y1="41656" x2="38062" y2="46128"/>
+                            <a14:foregroundMark x1="37634" y1="43124" x2="36831" y2="42790"/>
+                            <a14:foregroundMark x1="36670" y1="36182" x2="36670" y2="36182"/>
+                            <a14:foregroundMark x1="36670" y1="35981" x2="36670" y2="35981"/>
+                            <a14:foregroundMark x1="36617" y1="35247" x2="36617" y2="35247"/>
+                            <a14:foregroundMark x1="57495" y1="35981" x2="61510" y2="37450"/>
+                            <a14:foregroundMark x1="61510" y1="37450" x2="61777" y2="40521"/>
+                            <a14:foregroundMark x1="61831" y1="35447" x2="60439" y2="38385"/>
+                            <a14:foregroundMark x1="61563" y1="51202" x2="58887" y2="47530"/>
+                            <a14:foregroundMark x1="36617" y1="51402" x2="43362" y2="47530"/>
+                            <a14:foregroundMark x1="61777" y1="51402" x2="61777" y2="51402"/>
+                            <a14:foregroundMark x1="37099" y1="44059" x2="40525" y2="39519"/>
+                            <a14:foregroundMark x1="40525" y1="39519" x2="47109" y2="38451"/>
+                            <a14:foregroundMark x1="47109" y1="38451" x2="55835" y2="40254"/>
+                          </a14:backgroundRemoval>
+                        </a14:imgEffect>
+                      </a14:imgLayer>
+                    </a14:imgProps>
+                  </a:ext>
+                  <a:ext uri="{28A0092B-C50C-407E-A947-70E740481C1C}">
+                    <a14:useLocalDpi xmlns:a14="http://schemas.microsoft.com/office/drawing/2010/main" val="0"/>
+                  </a:ext>
+                </a:extLst>
+              </a:blip>
+              <a:srcRect l="35990" t="34701" r="37645" b="48064"/>
+              <a:stretch/>
+            </p:blipFill>
+            <p:spPr>
+              <a:xfrm>
+                <a:off x="3783008" y="1932498"/>
+                <a:ext cx="3958611" cy="2075223"/>
+              </a:xfrm>
+              <a:prstGeom prst="rect">
+                <a:avLst/>
+              </a:prstGeom>
+              <a:ln>
+                <a:noFill/>
+              </a:ln>
+            </p:spPr>
+          </p:pic>
+          <p:cxnSp>
+            <p:nvCxnSpPr>
+              <p:cNvPr id="22" name="Straight Arrow Connector 21">
+                <a:extLst>
+                  <a:ext uri="{FF2B5EF4-FFF2-40B4-BE49-F238E27FC236}">
+                    <a16:creationId xmlns:a16="http://schemas.microsoft.com/office/drawing/2014/main" id="{F5252364-5011-F8D9-A179-A587A8DEC677}"/>
+                  </a:ext>
+                </a:extLst>
+              </p:cNvPr>
+              <p:cNvCxnSpPr>
+                <a:cxnSpLocks/>
+                <a:stCxn id="5" idx="3"/>
+              </p:cNvCxnSpPr>
+              <p:nvPr/>
+            </p:nvCxnSpPr>
+            <p:spPr>
+              <a:xfrm>
+                <a:off x="3480600" y="1783398"/>
+                <a:ext cx="939149" cy="984191"/>
+              </a:xfrm>
+              <a:prstGeom prst="straightConnector1">
+                <a:avLst/>
+              </a:prstGeom>
+              <a:ln w="57150">
+                <a:solidFill>
+                  <a:srgbClr val="3E7589"/>
+                </a:solidFill>
+                <a:tailEnd type="triangle"/>
+              </a:ln>
+            </p:spPr>
+            <p:style>
+              <a:lnRef idx="1">
+                <a:schemeClr val="accent1"/>
+              </a:lnRef>
+              <a:fillRef idx="0">
+                <a:schemeClr val="accent1"/>
+              </a:fillRef>
+              <a:effectRef idx="0">
+                <a:schemeClr val="accent1"/>
+              </a:effectRef>
+              <a:fontRef idx="minor">
+                <a:schemeClr val="tx1"/>
+              </a:fontRef>
+            </p:style>
+          </p:cxnSp>
+          <p:sp>
+            <p:nvSpPr>
+              <p:cNvPr id="5" name="Rounded Rectangle 4">
+                <a:extLst>
+                  <a:ext uri="{FF2B5EF4-FFF2-40B4-BE49-F238E27FC236}">
+                    <a16:creationId xmlns:a16="http://schemas.microsoft.com/office/drawing/2014/main" id="{4C53B0D9-FD4C-9DB0-7278-5FB52F165392}"/>
+                  </a:ext>
+                </a:extLst>
+              </p:cNvPr>
+              <p:cNvSpPr/>
+              <p:nvPr/>
+            </p:nvSpPr>
+            <p:spPr>
+              <a:xfrm>
+                <a:off x="1716600" y="1415283"/>
+                <a:ext cx="1764000" cy="736230"/>
+              </a:xfrm>
+              <a:prstGeom prst="roundRect">
+                <a:avLst/>
+              </a:prstGeom>
+              <a:solidFill>
+                <a:srgbClr val="3E7589"/>
+              </a:solidFill>
+              <a:ln w="38100">
+                <a:solidFill>
+                  <a:srgbClr val="3E7589"/>
+                </a:solidFill>
+              </a:ln>
+            </p:spPr>
+            <p:style>
+              <a:lnRef idx="2">
+                <a:schemeClr val="accent1">
+                  <a:shade val="50000"/>
+                </a:schemeClr>
+              </a:lnRef>
+              <a:fillRef idx="1">
+                <a:schemeClr val="accent1"/>
+              </a:fillRef>
+              <a:effectRef idx="0">
+                <a:schemeClr val="accent1"/>
+              </a:effectRef>
+              <a:fontRef idx="minor">
+                <a:schemeClr val="lt1"/>
+              </a:fontRef>
+            </p:style>
+            <p:txBody>
+              <a:bodyPr rtlCol="0" anchor="ctr"/>
+              <a:lstStyle/>
+              <a:p>
+                <a:pPr algn="ctr"/>
+                <a:r>
+                  <a:rPr lang="en-US" sz="1200" b="1" dirty="0">
+                    <a:solidFill>
+                      <a:schemeClr val="bg1"/>
+                    </a:solidFill>
+                    <a:latin typeface="Segoe UI" panose="020B0502040204020203" pitchFamily="34" charset="0"/>
+                    <a:cs typeface="Segoe UI" panose="020B0502040204020203" pitchFamily="34" charset="0"/>
+                  </a:rPr>
+                  <a:t>Species</a:t>
+                </a:r>
+                <a:endParaRPr lang="en-US" sz="1200" dirty="0">
+                  <a:solidFill>
+                    <a:schemeClr val="bg1"/>
+                  </a:solidFill>
+                  <a:latin typeface="Segoe UI" panose="020B0502040204020203" pitchFamily="34" charset="0"/>
+                  <a:cs typeface="Segoe UI" panose="020B0502040204020203" pitchFamily="34" charset="0"/>
+                </a:endParaRPr>
+              </a:p>
+            </p:txBody>
+          </p:sp>
+          <p:sp>
+            <p:nvSpPr>
+              <p:cNvPr id="10" name="Rounded Rectangle 2">
+                <a:extLst>
+                  <a:ext uri="{FF2B5EF4-FFF2-40B4-BE49-F238E27FC236}">
+                    <a16:creationId xmlns:a16="http://schemas.microsoft.com/office/drawing/2014/main" id="{0ADCEF18-F19D-E2D3-CF29-8F6E7001526B}"/>
+                  </a:ext>
+                </a:extLst>
+              </p:cNvPr>
+              <p:cNvSpPr>
+                <a:spLocks noChangeAspect="1"/>
+              </p:cNvSpPr>
+              <p:nvPr/>
+            </p:nvSpPr>
+            <p:spPr>
+              <a:xfrm>
+                <a:off x="3783009" y="2767588"/>
+                <a:ext cx="432000" cy="432000"/>
+              </a:xfrm>
+              <a:prstGeom prst="roundRect">
+                <a:avLst/>
+              </a:prstGeom>
+              <a:noFill/>
+              <a:ln w="28575">
+                <a:solidFill>
+                  <a:srgbClr val="3E7589"/>
+                </a:solidFill>
+              </a:ln>
+            </p:spPr>
+            <p:style>
+              <a:lnRef idx="2">
+                <a:schemeClr val="accent1">
+                  <a:shade val="50000"/>
+                </a:schemeClr>
+              </a:lnRef>
+              <a:fillRef idx="1">
+                <a:schemeClr val="accent1"/>
+              </a:fillRef>
+              <a:effectRef idx="0">
+                <a:schemeClr val="accent1"/>
+              </a:effectRef>
+              <a:fontRef idx="minor">
+                <a:schemeClr val="lt1"/>
+              </a:fontRef>
+            </p:style>
+            <p:txBody>
+              <a:bodyPr rtlCol="0" anchor="ctr"/>
+              <a:lstStyle/>
+              <a:p>
+                <a:pPr algn="ctr"/>
+                <a:endParaRPr lang="en-US" sz="1200" dirty="0"/>
+              </a:p>
+            </p:txBody>
+          </p:sp>
+          <p:cxnSp>
+            <p:nvCxnSpPr>
+              <p:cNvPr id="12" name="Straight Arrow Connector 11">
+                <a:extLst>
+                  <a:ext uri="{FF2B5EF4-FFF2-40B4-BE49-F238E27FC236}">
+                    <a16:creationId xmlns:a16="http://schemas.microsoft.com/office/drawing/2014/main" id="{E2CACBE9-5FF8-E901-4188-64C75C3C5139}"/>
+                  </a:ext>
+                </a:extLst>
+              </p:cNvPr>
+              <p:cNvCxnSpPr>
+                <a:cxnSpLocks/>
+                <a:stCxn id="13" idx="3"/>
+                <a:endCxn id="10" idx="1"/>
+              </p:cNvCxnSpPr>
+              <p:nvPr/>
+            </p:nvCxnSpPr>
+            <p:spPr>
+              <a:xfrm>
+                <a:off x="2598600" y="2949099"/>
+                <a:ext cx="1184409" cy="34489"/>
+              </a:xfrm>
+              <a:prstGeom prst="straightConnector1">
+                <a:avLst/>
+              </a:prstGeom>
+              <a:ln w="57150">
+                <a:solidFill>
+                  <a:srgbClr val="3E7589"/>
+                </a:solidFill>
+                <a:tailEnd type="triangle"/>
+              </a:ln>
+            </p:spPr>
+            <p:style>
+              <a:lnRef idx="1">
+                <a:schemeClr val="accent1"/>
+              </a:lnRef>
+              <a:fillRef idx="0">
+                <a:schemeClr val="accent1"/>
+              </a:fillRef>
+              <a:effectRef idx="0">
+                <a:schemeClr val="accent1"/>
+              </a:effectRef>
+              <a:fontRef idx="minor">
+                <a:schemeClr val="tx1"/>
+              </a:fontRef>
+            </p:style>
+          </p:cxnSp>
+          <p:sp>
+            <p:nvSpPr>
+              <p:cNvPr id="13" name="Rounded Rectangle 4">
+                <a:extLst>
+                  <a:ext uri="{FF2B5EF4-FFF2-40B4-BE49-F238E27FC236}">
+                    <a16:creationId xmlns:a16="http://schemas.microsoft.com/office/drawing/2014/main" id="{B94E9810-6929-1AA3-0516-603F642F28B1}"/>
+                  </a:ext>
+                </a:extLst>
+              </p:cNvPr>
+              <p:cNvSpPr/>
+              <p:nvPr/>
+            </p:nvSpPr>
+            <p:spPr>
+              <a:xfrm>
+                <a:off x="834600" y="2580984"/>
+                <a:ext cx="1764000" cy="736230"/>
+              </a:xfrm>
+              <a:prstGeom prst="roundRect">
+                <a:avLst/>
+              </a:prstGeom>
+              <a:solidFill>
+                <a:srgbClr val="3E7589"/>
+              </a:solidFill>
+              <a:ln w="38100">
+                <a:solidFill>
+                  <a:srgbClr val="3E7589"/>
+                </a:solidFill>
+              </a:ln>
+            </p:spPr>
+            <p:style>
+              <a:lnRef idx="2">
+                <a:schemeClr val="accent1">
+                  <a:shade val="50000"/>
+                </a:schemeClr>
+              </a:lnRef>
+              <a:fillRef idx="1">
+                <a:schemeClr val="accent1"/>
+              </a:fillRef>
+              <a:effectRef idx="0">
+                <a:schemeClr val="accent1"/>
+              </a:effectRef>
+              <a:fontRef idx="minor">
+                <a:schemeClr val="lt1"/>
+              </a:fontRef>
+            </p:style>
+            <p:txBody>
+              <a:bodyPr rtlCol="0" anchor="ctr"/>
+              <a:lstStyle/>
+              <a:p>
+                <a:pPr algn="ctr"/>
+                <a:r>
+                  <a:rPr lang="en-US" sz="1200" b="1" dirty="0">
+                    <a:solidFill>
+                      <a:schemeClr val="bg1"/>
+                    </a:solidFill>
+                    <a:latin typeface="Segoe UI" panose="020B0502040204020203" pitchFamily="34" charset="0"/>
+                    <a:cs typeface="Segoe UI" panose="020B0502040204020203" pitchFamily="34" charset="0"/>
+                  </a:rPr>
+                  <a:t>Fish Index</a:t>
+                </a:r>
+                <a:endParaRPr lang="en-US" sz="1200" dirty="0">
+                  <a:solidFill>
+                    <a:schemeClr val="bg1"/>
+                  </a:solidFill>
+                  <a:latin typeface="Segoe UI" panose="020B0502040204020203" pitchFamily="34" charset="0"/>
+                  <a:cs typeface="Segoe UI" panose="020B0502040204020203" pitchFamily="34" charset="0"/>
+                </a:endParaRPr>
+              </a:p>
+            </p:txBody>
+          </p:sp>
+          <p:sp>
+            <p:nvSpPr>
+              <p:cNvPr id="15" name="Rounded Rectangle 2">
+                <a:extLst>
+                  <a:ext uri="{FF2B5EF4-FFF2-40B4-BE49-F238E27FC236}">
+                    <a16:creationId xmlns:a16="http://schemas.microsoft.com/office/drawing/2014/main" id="{F21360F6-8B77-947F-E0BA-162CDF26FD51}"/>
+                  </a:ext>
+                </a:extLst>
+              </p:cNvPr>
+              <p:cNvSpPr>
+                <a:spLocks noChangeAspect="1"/>
+              </p:cNvSpPr>
+              <p:nvPr/>
+            </p:nvSpPr>
+            <p:spPr>
+              <a:xfrm>
+                <a:off x="5104970" y="2174373"/>
+                <a:ext cx="1055800" cy="432000"/>
+              </a:xfrm>
+              <a:prstGeom prst="roundRect">
+                <a:avLst/>
+              </a:prstGeom>
+              <a:noFill/>
+              <a:ln w="28575">
+                <a:solidFill>
+                  <a:srgbClr val="3E7589"/>
+                </a:solidFill>
+              </a:ln>
+            </p:spPr>
+            <p:style>
+              <a:lnRef idx="2">
+                <a:schemeClr val="accent1">
+                  <a:shade val="50000"/>
+                </a:schemeClr>
+              </a:lnRef>
+              <a:fillRef idx="1">
+                <a:schemeClr val="accent1"/>
+              </a:fillRef>
+              <a:effectRef idx="0">
+                <a:schemeClr val="accent1"/>
+              </a:effectRef>
+              <a:fontRef idx="minor">
+                <a:schemeClr val="lt1"/>
+              </a:fontRef>
+            </p:style>
+            <p:txBody>
+              <a:bodyPr rtlCol="0" anchor="ctr"/>
+              <a:lstStyle/>
+              <a:p>
+                <a:pPr algn="ctr"/>
+                <a:endParaRPr lang="en-US" sz="1200" dirty="0"/>
+              </a:p>
+            </p:txBody>
+          </p:sp>
+          <p:cxnSp>
+            <p:nvCxnSpPr>
+              <p:cNvPr id="16" name="Straight Arrow Connector 15">
+                <a:extLst>
+                  <a:ext uri="{FF2B5EF4-FFF2-40B4-BE49-F238E27FC236}">
+                    <a16:creationId xmlns:a16="http://schemas.microsoft.com/office/drawing/2014/main" id="{9CF974D6-CB0E-5722-816B-2A52215B44EA}"/>
+                  </a:ext>
+                </a:extLst>
+              </p:cNvPr>
+              <p:cNvCxnSpPr>
+                <a:cxnSpLocks/>
+                <a:stCxn id="17" idx="2"/>
+                <a:endCxn id="15" idx="3"/>
+              </p:cNvCxnSpPr>
+              <p:nvPr/>
+            </p:nvCxnSpPr>
+            <p:spPr>
+              <a:xfrm flipH="1">
+                <a:off x="6160769" y="1520509"/>
+                <a:ext cx="651050" cy="869865"/>
+              </a:xfrm>
+              <a:prstGeom prst="straightConnector1">
+                <a:avLst/>
+              </a:prstGeom>
+              <a:ln w="57150">
+                <a:solidFill>
+                  <a:srgbClr val="3E7589"/>
+                </a:solidFill>
+                <a:tailEnd type="triangle"/>
+              </a:ln>
+            </p:spPr>
+            <p:style>
+              <a:lnRef idx="1">
+                <a:schemeClr val="accent1"/>
+              </a:lnRef>
+              <a:fillRef idx="0">
+                <a:schemeClr val="accent1"/>
+              </a:fillRef>
+              <a:effectRef idx="0">
+                <a:schemeClr val="accent1"/>
+              </a:effectRef>
+              <a:fontRef idx="minor">
+                <a:schemeClr val="tx1"/>
+              </a:fontRef>
+            </p:style>
+          </p:cxnSp>
+          <p:sp>
+            <p:nvSpPr>
+              <p:cNvPr id="17" name="Rounded Rectangle 4">
+                <a:extLst>
+                  <a:ext uri="{FF2B5EF4-FFF2-40B4-BE49-F238E27FC236}">
+                    <a16:creationId xmlns:a16="http://schemas.microsoft.com/office/drawing/2014/main" id="{9069533C-2A11-DC24-2D22-8F4C1BC9B4F0}"/>
+                  </a:ext>
+                </a:extLst>
+              </p:cNvPr>
+              <p:cNvSpPr/>
+              <p:nvPr/>
+            </p:nvSpPr>
+            <p:spPr>
+              <a:xfrm>
+                <a:off x="5929819" y="784279"/>
+                <a:ext cx="1764000" cy="736230"/>
+              </a:xfrm>
+              <a:prstGeom prst="roundRect">
+                <a:avLst/>
+              </a:prstGeom>
+              <a:solidFill>
+                <a:srgbClr val="3E7589"/>
+              </a:solidFill>
+              <a:ln w="38100">
+                <a:solidFill>
+                  <a:srgbClr val="3E7589"/>
+                </a:solidFill>
+              </a:ln>
+            </p:spPr>
+            <p:style>
+              <a:lnRef idx="2">
+                <a:schemeClr val="accent1">
+                  <a:shade val="50000"/>
+                </a:schemeClr>
+              </a:lnRef>
+              <a:fillRef idx="1">
+                <a:schemeClr val="accent1"/>
+              </a:fillRef>
+              <a:effectRef idx="0">
+                <a:schemeClr val="accent1"/>
+              </a:effectRef>
+              <a:fontRef idx="minor">
+                <a:schemeClr val="lt1"/>
+              </a:fontRef>
+            </p:style>
+            <p:txBody>
+              <a:bodyPr rtlCol="0" anchor="ctr"/>
+              <a:lstStyle/>
+              <a:p>
+                <a:pPr algn="ctr"/>
+                <a:r>
+                  <a:rPr lang="en-US" sz="1200" b="1" dirty="0">
+                    <a:solidFill>
+                      <a:schemeClr val="bg1"/>
+                    </a:solidFill>
+                    <a:latin typeface="Segoe UI" panose="020B0502040204020203" pitchFamily="34" charset="0"/>
+                    <a:cs typeface="Segoe UI" panose="020B0502040204020203" pitchFamily="34" charset="0"/>
+                  </a:rPr>
+                  <a:t>Name</a:t>
+                </a:r>
+                <a:endParaRPr lang="en-US" sz="1200" dirty="0">
+                  <a:solidFill>
+                    <a:schemeClr val="bg1"/>
+                  </a:solidFill>
+                  <a:latin typeface="Segoe UI" panose="020B0502040204020203" pitchFamily="34" charset="0"/>
+                  <a:cs typeface="Segoe UI" panose="020B0502040204020203" pitchFamily="34" charset="0"/>
+                </a:endParaRPr>
+              </a:p>
+            </p:txBody>
+          </p:sp>
+          <p:sp>
+            <p:nvSpPr>
+              <p:cNvPr id="18" name="Rounded Rectangle 2">
+                <a:extLst>
+                  <a:ext uri="{FF2B5EF4-FFF2-40B4-BE49-F238E27FC236}">
+                    <a16:creationId xmlns:a16="http://schemas.microsoft.com/office/drawing/2014/main" id="{E92041AD-5109-ABF6-5DB4-0639CCBD143A}"/>
+                  </a:ext>
+                </a:extLst>
+              </p:cNvPr>
+              <p:cNvSpPr>
+                <a:spLocks noChangeAspect="1"/>
+              </p:cNvSpPr>
+              <p:nvPr/>
+            </p:nvSpPr>
+            <p:spPr>
+              <a:xfrm>
+                <a:off x="4419750" y="2174373"/>
+                <a:ext cx="685220" cy="432000"/>
+              </a:xfrm>
+              <a:prstGeom prst="roundRect">
+                <a:avLst/>
+              </a:prstGeom>
+              <a:noFill/>
+              <a:ln w="28575">
+                <a:solidFill>
+                  <a:srgbClr val="3E7589"/>
+                </a:solidFill>
+              </a:ln>
+            </p:spPr>
+            <p:style>
+              <a:lnRef idx="2">
+                <a:schemeClr val="accent1">
+                  <a:shade val="50000"/>
+                </a:schemeClr>
+              </a:lnRef>
+              <a:fillRef idx="1">
+                <a:schemeClr val="accent1"/>
+              </a:fillRef>
+              <a:effectRef idx="0">
+                <a:schemeClr val="accent1"/>
+              </a:effectRef>
+              <a:fontRef idx="minor">
+                <a:schemeClr val="lt1"/>
+              </a:fontRef>
+            </p:style>
+            <p:txBody>
+              <a:bodyPr rtlCol="0" anchor="ctr"/>
+              <a:lstStyle/>
+              <a:p>
+                <a:pPr algn="ctr"/>
+                <a:endParaRPr lang="en-US" sz="1200" dirty="0"/>
+              </a:p>
+            </p:txBody>
+          </p:sp>
+          <p:cxnSp>
+            <p:nvCxnSpPr>
+              <p:cNvPr id="19" name="Straight Arrow Connector 18">
+                <a:extLst>
+                  <a:ext uri="{FF2B5EF4-FFF2-40B4-BE49-F238E27FC236}">
+                    <a16:creationId xmlns:a16="http://schemas.microsoft.com/office/drawing/2014/main" id="{2C4A373A-6694-E686-3F54-8E7049C205B5}"/>
+                  </a:ext>
+                </a:extLst>
+              </p:cNvPr>
+              <p:cNvCxnSpPr>
+                <a:cxnSpLocks/>
+                <a:stCxn id="20" idx="2"/>
+                <a:endCxn id="18" idx="0"/>
+              </p:cNvCxnSpPr>
+              <p:nvPr/>
+            </p:nvCxnSpPr>
+            <p:spPr>
+              <a:xfrm>
+                <a:off x="4705210" y="1520509"/>
+                <a:ext cx="57151" cy="653865"/>
+              </a:xfrm>
+              <a:prstGeom prst="straightConnector1">
+                <a:avLst/>
+              </a:prstGeom>
+              <a:ln w="57150">
+                <a:solidFill>
+                  <a:srgbClr val="3E7589"/>
+                </a:solidFill>
+                <a:tailEnd type="triangle"/>
+              </a:ln>
+            </p:spPr>
+            <p:style>
+              <a:lnRef idx="1">
+                <a:schemeClr val="accent1"/>
+              </a:lnRef>
+              <a:fillRef idx="0">
+                <a:schemeClr val="accent1"/>
+              </a:fillRef>
+              <a:effectRef idx="0">
+                <a:schemeClr val="accent1"/>
+              </a:effectRef>
+              <a:fontRef idx="minor">
+                <a:schemeClr val="tx1"/>
+              </a:fontRef>
+            </p:style>
+          </p:cxnSp>
+          <p:sp>
+            <p:nvSpPr>
+              <p:cNvPr id="20" name="Rounded Rectangle 4">
+                <a:extLst>
+                  <a:ext uri="{FF2B5EF4-FFF2-40B4-BE49-F238E27FC236}">
+                    <a16:creationId xmlns:a16="http://schemas.microsoft.com/office/drawing/2014/main" id="{7F188EA7-60D5-7C22-36E3-C6D39F055850}"/>
+                  </a:ext>
+                </a:extLst>
+              </p:cNvPr>
+              <p:cNvSpPr/>
+              <p:nvPr/>
+            </p:nvSpPr>
+            <p:spPr>
+              <a:xfrm>
+                <a:off x="3823209" y="784279"/>
+                <a:ext cx="1764000" cy="736230"/>
+              </a:xfrm>
+              <a:prstGeom prst="roundRect">
+                <a:avLst/>
+              </a:prstGeom>
+              <a:solidFill>
+                <a:srgbClr val="3E7589"/>
+              </a:solidFill>
+              <a:ln w="38100">
+                <a:solidFill>
+                  <a:srgbClr val="3E7589"/>
+                </a:solidFill>
+              </a:ln>
+            </p:spPr>
+            <p:style>
+              <a:lnRef idx="2">
+                <a:schemeClr val="accent1">
+                  <a:shade val="50000"/>
+                </a:schemeClr>
+              </a:lnRef>
+              <a:fillRef idx="1">
+                <a:schemeClr val="accent1"/>
+              </a:fillRef>
+              <a:effectRef idx="0">
+                <a:schemeClr val="accent1"/>
+              </a:effectRef>
+              <a:fontRef idx="minor">
+                <a:schemeClr val="lt1"/>
+              </a:fontRef>
+            </p:style>
+            <p:txBody>
+              <a:bodyPr rtlCol="0" anchor="ctr"/>
+              <a:lstStyle/>
+              <a:p>
+                <a:pPr algn="ctr"/>
+                <a:r>
+                  <a:rPr lang="en-US" sz="1200" b="1" dirty="0">
+                    <a:solidFill>
+                      <a:schemeClr val="bg1"/>
+                    </a:solidFill>
+                    <a:latin typeface="Segoe UI" panose="020B0502040204020203" pitchFamily="34" charset="0"/>
+                    <a:cs typeface="Segoe UI" panose="020B0502040204020203" pitchFamily="34" charset="0"/>
+                  </a:rPr>
+                  <a:t>Fish Icon</a:t>
+                </a:r>
+                <a:endParaRPr lang="en-US" sz="1200" dirty="0">
+                  <a:solidFill>
+                    <a:schemeClr val="bg1"/>
+                  </a:solidFill>
+                  <a:latin typeface="Segoe UI" panose="020B0502040204020203" pitchFamily="34" charset="0"/>
+                  <a:cs typeface="Segoe UI" panose="020B0502040204020203" pitchFamily="34" charset="0"/>
+                </a:endParaRPr>
+              </a:p>
+            </p:txBody>
+          </p:sp>
+          <p:cxnSp>
+            <p:nvCxnSpPr>
+              <p:cNvPr id="23" name="Straight Arrow Connector 22">
+                <a:extLst>
+                  <a:ext uri="{FF2B5EF4-FFF2-40B4-BE49-F238E27FC236}">
+                    <a16:creationId xmlns:a16="http://schemas.microsoft.com/office/drawing/2014/main" id="{E468AB78-4CCD-A227-CD3E-3DEC17B98D3F}"/>
+                  </a:ext>
+                </a:extLst>
+              </p:cNvPr>
+              <p:cNvCxnSpPr>
+                <a:cxnSpLocks/>
+                <a:stCxn id="24" idx="1"/>
+              </p:cNvCxnSpPr>
+              <p:nvPr/>
+            </p:nvCxnSpPr>
+            <p:spPr>
+              <a:xfrm flipH="1">
+                <a:off x="6435090" y="1847440"/>
+                <a:ext cx="1601340" cy="1021490"/>
+              </a:xfrm>
+              <a:prstGeom prst="straightConnector1">
+                <a:avLst/>
+              </a:prstGeom>
+              <a:ln w="57150">
+                <a:solidFill>
+                  <a:srgbClr val="3E7589"/>
+                </a:solidFill>
+                <a:tailEnd type="triangle"/>
+              </a:ln>
+            </p:spPr>
+            <p:style>
+              <a:lnRef idx="1">
+                <a:schemeClr val="accent1"/>
+              </a:lnRef>
+              <a:fillRef idx="0">
+                <a:schemeClr val="accent1"/>
+              </a:fillRef>
+              <a:effectRef idx="0">
+                <a:schemeClr val="accent1"/>
+              </a:effectRef>
+              <a:fontRef idx="minor">
+                <a:schemeClr val="tx1"/>
+              </a:fontRef>
+            </p:style>
+          </p:cxnSp>
+          <p:sp>
+            <p:nvSpPr>
+              <p:cNvPr id="24" name="Rounded Rectangle 4">
+                <a:extLst>
+                  <a:ext uri="{FF2B5EF4-FFF2-40B4-BE49-F238E27FC236}">
+                    <a16:creationId xmlns:a16="http://schemas.microsoft.com/office/drawing/2014/main" id="{CC78A82C-FA73-F7CB-EAB1-FFD721CA5858}"/>
+                  </a:ext>
+                </a:extLst>
+              </p:cNvPr>
+              <p:cNvSpPr/>
+              <p:nvPr/>
+            </p:nvSpPr>
+            <p:spPr>
+              <a:xfrm>
+                <a:off x="8036430" y="1479325"/>
+                <a:ext cx="1764000" cy="736230"/>
+              </a:xfrm>
+              <a:prstGeom prst="roundRect">
+                <a:avLst/>
+              </a:prstGeom>
+              <a:solidFill>
+                <a:srgbClr val="3E7589"/>
+              </a:solidFill>
+              <a:ln w="38100">
+                <a:solidFill>
+                  <a:srgbClr val="3E7589"/>
+                </a:solidFill>
+              </a:ln>
+            </p:spPr>
+            <p:style>
+              <a:lnRef idx="2">
+                <a:schemeClr val="accent1">
+                  <a:shade val="50000"/>
+                </a:schemeClr>
+              </a:lnRef>
+              <a:fillRef idx="1">
+                <a:schemeClr val="accent1"/>
+              </a:fillRef>
+              <a:effectRef idx="0">
+                <a:schemeClr val="accent1"/>
+              </a:effectRef>
+              <a:fontRef idx="minor">
+                <a:schemeClr val="lt1"/>
+              </a:fontRef>
+            </p:style>
+            <p:txBody>
+              <a:bodyPr rtlCol="0" anchor="ctr"/>
+              <a:lstStyle/>
+              <a:p>
+                <a:pPr algn="ctr"/>
+                <a:r>
+                  <a:rPr lang="en-US" sz="1200" b="1" dirty="0">
+                    <a:solidFill>
+                      <a:schemeClr val="bg1"/>
+                    </a:solidFill>
+                    <a:latin typeface="Segoe UI" panose="020B0502040204020203" pitchFamily="34" charset="0"/>
+                    <a:cs typeface="Segoe UI" panose="020B0502040204020203" pitchFamily="34" charset="0"/>
+                  </a:rPr>
+                  <a:t>Tank</a:t>
+                </a:r>
+                <a:endParaRPr lang="en-US" sz="1200" dirty="0">
+                  <a:solidFill>
+                    <a:schemeClr val="bg1"/>
+                  </a:solidFill>
+                  <a:latin typeface="Segoe UI" panose="020B0502040204020203" pitchFamily="34" charset="0"/>
+                  <a:cs typeface="Segoe UI" panose="020B0502040204020203" pitchFamily="34" charset="0"/>
+                </a:endParaRPr>
+              </a:p>
+            </p:txBody>
+          </p:sp>
+          <p:cxnSp>
+            <p:nvCxnSpPr>
+              <p:cNvPr id="68" name="Straight Arrow Connector 67">
+                <a:extLst>
+                  <a:ext uri="{FF2B5EF4-FFF2-40B4-BE49-F238E27FC236}">
+                    <a16:creationId xmlns:a16="http://schemas.microsoft.com/office/drawing/2014/main" id="{2CD1865A-4DF7-02D0-CE50-E544A24DBE3C}"/>
+                  </a:ext>
+                </a:extLst>
+              </p:cNvPr>
+              <p:cNvCxnSpPr>
+                <a:cxnSpLocks/>
+                <a:stCxn id="69" idx="3"/>
+              </p:cNvCxnSpPr>
+              <p:nvPr/>
+            </p:nvCxnSpPr>
+            <p:spPr>
+              <a:xfrm flipV="1">
+                <a:off x="3480600" y="3261629"/>
+                <a:ext cx="939150" cy="851309"/>
+              </a:xfrm>
+              <a:prstGeom prst="straightConnector1">
+                <a:avLst/>
+              </a:prstGeom>
+              <a:ln w="57150">
+                <a:solidFill>
+                  <a:srgbClr val="3E7589"/>
+                </a:solidFill>
+                <a:tailEnd type="triangle"/>
+              </a:ln>
+            </p:spPr>
+            <p:style>
+              <a:lnRef idx="1">
+                <a:schemeClr val="accent1"/>
+              </a:lnRef>
+              <a:fillRef idx="0">
+                <a:schemeClr val="accent1"/>
+              </a:fillRef>
+              <a:effectRef idx="0">
+                <a:schemeClr val="accent1"/>
+              </a:effectRef>
+              <a:fontRef idx="minor">
+                <a:schemeClr val="tx1"/>
+              </a:fontRef>
+            </p:style>
+          </p:cxnSp>
+          <p:sp>
+            <p:nvSpPr>
+              <p:cNvPr id="69" name="Rounded Rectangle 4">
+                <a:extLst>
+                  <a:ext uri="{FF2B5EF4-FFF2-40B4-BE49-F238E27FC236}">
+                    <a16:creationId xmlns:a16="http://schemas.microsoft.com/office/drawing/2014/main" id="{585C0B3F-F8F6-5A56-5DA2-81CD27AB6CFC}"/>
+                  </a:ext>
+                </a:extLst>
+              </p:cNvPr>
+              <p:cNvSpPr/>
+              <p:nvPr/>
+            </p:nvSpPr>
+            <p:spPr>
+              <a:xfrm>
+                <a:off x="1716600" y="3744823"/>
+                <a:ext cx="1764000" cy="736230"/>
+              </a:xfrm>
+              <a:prstGeom prst="roundRect">
+                <a:avLst/>
+              </a:prstGeom>
+              <a:solidFill>
+                <a:srgbClr val="3E7589"/>
+              </a:solidFill>
+              <a:ln w="38100">
+                <a:solidFill>
+                  <a:srgbClr val="3E7589"/>
+                </a:solidFill>
+              </a:ln>
+            </p:spPr>
+            <p:style>
+              <a:lnRef idx="2">
+                <a:schemeClr val="accent1">
+                  <a:shade val="50000"/>
+                </a:schemeClr>
+              </a:lnRef>
+              <a:fillRef idx="1">
+                <a:schemeClr val="accent1"/>
+              </a:fillRef>
+              <a:effectRef idx="0">
+                <a:schemeClr val="accent1"/>
+              </a:effectRef>
+              <a:fontRef idx="minor">
+                <a:schemeClr val="lt1"/>
+              </a:fontRef>
+            </p:style>
+            <p:txBody>
+              <a:bodyPr rtlCol="0" anchor="ctr"/>
+              <a:lstStyle/>
+              <a:p>
+                <a:pPr algn="ctr"/>
+                <a:r>
+                  <a:rPr lang="en-US" sz="1200" b="1" dirty="0">
+                    <a:solidFill>
+                      <a:schemeClr val="bg1"/>
+                    </a:solidFill>
+                    <a:latin typeface="Segoe UI" panose="020B0502040204020203" pitchFamily="34" charset="0"/>
+                    <a:cs typeface="Segoe UI" panose="020B0502040204020203" pitchFamily="34" charset="0"/>
+                  </a:rPr>
+                  <a:t>Tags</a:t>
+                </a:r>
+                <a:endParaRPr lang="en-US" sz="1200" dirty="0">
+                  <a:solidFill>
+                    <a:schemeClr val="bg1"/>
+                  </a:solidFill>
+                  <a:latin typeface="Segoe UI" panose="020B0502040204020203" pitchFamily="34" charset="0"/>
+                  <a:cs typeface="Segoe UI" panose="020B0502040204020203" pitchFamily="34" charset="0"/>
+                </a:endParaRPr>
+              </a:p>
+            </p:txBody>
+          </p:sp>
+          <p:sp>
+            <p:nvSpPr>
+              <p:cNvPr id="72" name="Rounded Rectangle 4">
+                <a:extLst>
+                  <a:ext uri="{FF2B5EF4-FFF2-40B4-BE49-F238E27FC236}">
+                    <a16:creationId xmlns:a16="http://schemas.microsoft.com/office/drawing/2014/main" id="{2FD1C772-4B2B-05A5-B69D-6947C2758C17}"/>
+                  </a:ext>
+                </a:extLst>
+              </p:cNvPr>
+              <p:cNvSpPr/>
+              <p:nvPr/>
+            </p:nvSpPr>
+            <p:spPr>
+              <a:xfrm>
+                <a:off x="8025227" y="3744823"/>
+                <a:ext cx="1764000" cy="736230"/>
+              </a:xfrm>
+              <a:prstGeom prst="roundRect">
+                <a:avLst/>
+              </a:prstGeom>
+              <a:solidFill>
+                <a:srgbClr val="3E7589"/>
+              </a:solidFill>
+              <a:ln w="38100">
+                <a:solidFill>
+                  <a:srgbClr val="3E7589"/>
+                </a:solidFill>
+              </a:ln>
+            </p:spPr>
+            <p:style>
+              <a:lnRef idx="2">
+                <a:schemeClr val="accent1">
+                  <a:shade val="50000"/>
+                </a:schemeClr>
+              </a:lnRef>
+              <a:fillRef idx="1">
+                <a:schemeClr val="accent1"/>
+              </a:fillRef>
+              <a:effectRef idx="0">
+                <a:schemeClr val="accent1"/>
+              </a:effectRef>
+              <a:fontRef idx="minor">
+                <a:schemeClr val="lt1"/>
+              </a:fontRef>
+            </p:style>
+            <p:txBody>
+              <a:bodyPr rtlCol="0" anchor="ctr"/>
+              <a:lstStyle/>
+              <a:p>
+                <a:pPr algn="ctr"/>
+                <a:r>
+                  <a:rPr lang="en-US" sz="1200" b="1" dirty="0">
+                    <a:solidFill>
+                      <a:schemeClr val="bg1"/>
+                    </a:solidFill>
+                    <a:latin typeface="Segoe UI" panose="020B0502040204020203" pitchFamily="34" charset="0"/>
+                    <a:cs typeface="Segoe UI" panose="020B0502040204020203" pitchFamily="34" charset="0"/>
+                  </a:rPr>
+                  <a:t>Feeding Interval</a:t>
+                </a:r>
+                <a:endParaRPr lang="en-US" sz="1200" dirty="0">
+                  <a:solidFill>
+                    <a:schemeClr val="bg1"/>
+                  </a:solidFill>
+                  <a:latin typeface="Segoe UI" panose="020B0502040204020203" pitchFamily="34" charset="0"/>
+                  <a:cs typeface="Segoe UI" panose="020B0502040204020203" pitchFamily="34" charset="0"/>
+                </a:endParaRPr>
+              </a:p>
+            </p:txBody>
+          </p:sp>
+          <p:sp>
+            <p:nvSpPr>
+              <p:cNvPr id="73" name="Rounded Rectangle 2">
+                <a:extLst>
+                  <a:ext uri="{FF2B5EF4-FFF2-40B4-BE49-F238E27FC236}">
+                    <a16:creationId xmlns:a16="http://schemas.microsoft.com/office/drawing/2014/main" id="{CF7D7D5C-BC64-7FF6-7DAE-E2E64A2EEB29}"/>
+                  </a:ext>
+                </a:extLst>
+              </p:cNvPr>
+              <p:cNvSpPr>
+                <a:spLocks noChangeAspect="1"/>
+              </p:cNvSpPr>
+              <p:nvPr/>
+            </p:nvSpPr>
+            <p:spPr>
+              <a:xfrm>
+                <a:off x="4423179" y="3362971"/>
+                <a:ext cx="2800581" cy="283199"/>
+              </a:xfrm>
+              <a:prstGeom prst="roundRect">
+                <a:avLst/>
+              </a:prstGeom>
+              <a:noFill/>
+              <a:ln w="28575">
+                <a:solidFill>
+                  <a:srgbClr val="3E7589"/>
+                </a:solidFill>
+              </a:ln>
+            </p:spPr>
+            <p:style>
+              <a:lnRef idx="2">
+                <a:schemeClr val="accent1">
+                  <a:shade val="50000"/>
+                </a:schemeClr>
+              </a:lnRef>
+              <a:fillRef idx="1">
+                <a:schemeClr val="accent1"/>
+              </a:fillRef>
+              <a:effectRef idx="0">
+                <a:schemeClr val="accent1"/>
+              </a:effectRef>
+              <a:fontRef idx="minor">
+                <a:schemeClr val="lt1"/>
+              </a:fontRef>
+            </p:style>
+            <p:txBody>
+              <a:bodyPr rtlCol="0" anchor="ctr"/>
+              <a:lstStyle/>
+              <a:p>
+                <a:pPr algn="ctr"/>
+                <a:endParaRPr lang="en-US" sz="1200" dirty="0"/>
+              </a:p>
+            </p:txBody>
+          </p:sp>
+          <p:cxnSp>
+            <p:nvCxnSpPr>
+              <p:cNvPr id="74" name="Straight Arrow Connector 73">
+                <a:extLst>
+                  <a:ext uri="{FF2B5EF4-FFF2-40B4-BE49-F238E27FC236}">
+                    <a16:creationId xmlns:a16="http://schemas.microsoft.com/office/drawing/2014/main" id="{72F75DB2-CBC1-EF66-56F7-5CDC5557191E}"/>
+                  </a:ext>
+                </a:extLst>
+              </p:cNvPr>
+              <p:cNvCxnSpPr>
+                <a:cxnSpLocks/>
+                <a:stCxn id="75" idx="1"/>
+                <a:endCxn id="73" idx="3"/>
+              </p:cNvCxnSpPr>
+              <p:nvPr/>
+            </p:nvCxnSpPr>
+            <p:spPr>
+              <a:xfrm flipH="1">
+                <a:off x="7223760" y="2949099"/>
+                <a:ext cx="1694670" cy="555472"/>
+              </a:xfrm>
+              <a:prstGeom prst="straightConnector1">
+                <a:avLst/>
+              </a:prstGeom>
+              <a:ln w="57150">
+                <a:solidFill>
+                  <a:srgbClr val="3E7589"/>
+                </a:solidFill>
+                <a:tailEnd type="triangle"/>
+              </a:ln>
+            </p:spPr>
+            <p:style>
+              <a:lnRef idx="1">
+                <a:schemeClr val="accent1"/>
+              </a:lnRef>
+              <a:fillRef idx="0">
+                <a:schemeClr val="accent1"/>
+              </a:fillRef>
+              <a:effectRef idx="0">
+                <a:schemeClr val="accent1"/>
+              </a:effectRef>
+              <a:fontRef idx="minor">
+                <a:schemeClr val="tx1"/>
+              </a:fontRef>
+            </p:style>
+          </p:cxnSp>
+          <p:sp>
+            <p:nvSpPr>
+              <p:cNvPr id="75" name="Rounded Rectangle 4">
+                <a:extLst>
+                  <a:ext uri="{FF2B5EF4-FFF2-40B4-BE49-F238E27FC236}">
+                    <a16:creationId xmlns:a16="http://schemas.microsoft.com/office/drawing/2014/main" id="{DA1EF6FE-41D8-5C89-7371-9DCEF69A0FE3}"/>
+                  </a:ext>
+                </a:extLst>
+              </p:cNvPr>
+              <p:cNvSpPr/>
+              <p:nvPr/>
+            </p:nvSpPr>
+            <p:spPr>
+              <a:xfrm>
+                <a:off x="8918430" y="2580984"/>
+                <a:ext cx="1764000" cy="736230"/>
+              </a:xfrm>
+              <a:prstGeom prst="roundRect">
+                <a:avLst/>
+              </a:prstGeom>
+              <a:solidFill>
+                <a:srgbClr val="3E7589"/>
+              </a:solidFill>
+              <a:ln w="38100">
+                <a:solidFill>
+                  <a:srgbClr val="3E7589"/>
+                </a:solidFill>
+              </a:ln>
+            </p:spPr>
+            <p:style>
+              <a:lnRef idx="2">
+                <a:schemeClr val="accent1">
+                  <a:shade val="50000"/>
+                </a:schemeClr>
+              </a:lnRef>
+              <a:fillRef idx="1">
+                <a:schemeClr val="accent1"/>
+              </a:fillRef>
+              <a:effectRef idx="0">
+                <a:schemeClr val="accent1"/>
+              </a:effectRef>
+              <a:fontRef idx="minor">
+                <a:schemeClr val="lt1"/>
+              </a:fontRef>
+            </p:style>
+            <p:txBody>
+              <a:bodyPr rtlCol="0" anchor="ctr"/>
+              <a:lstStyle/>
+              <a:p>
+                <a:pPr algn="ctr"/>
+                <a:r>
+                  <a:rPr lang="en-US" sz="1200" b="1" dirty="0">
+                    <a:solidFill>
+                      <a:schemeClr val="bg1"/>
+                    </a:solidFill>
+                    <a:latin typeface="Segoe UI" panose="020B0502040204020203" pitchFamily="34" charset="0"/>
+                    <a:cs typeface="Segoe UI" panose="020B0502040204020203" pitchFamily="34" charset="0"/>
+                  </a:rPr>
+                  <a:t>Last Fed Date</a:t>
+                </a:r>
+                <a:endParaRPr lang="en-US" sz="1200" dirty="0">
+                  <a:solidFill>
+                    <a:schemeClr val="bg1"/>
+                  </a:solidFill>
+                  <a:latin typeface="Segoe UI" panose="020B0502040204020203" pitchFamily="34" charset="0"/>
+                  <a:cs typeface="Segoe UI" panose="020B0502040204020203" pitchFamily="34" charset="0"/>
+                </a:endParaRPr>
+              </a:p>
+            </p:txBody>
+          </p:sp>
+          <p:sp>
+            <p:nvSpPr>
+              <p:cNvPr id="87" name="Rounded Rectangle 2">
+                <a:extLst>
+                  <a:ext uri="{FF2B5EF4-FFF2-40B4-BE49-F238E27FC236}">
+                    <a16:creationId xmlns:a16="http://schemas.microsoft.com/office/drawing/2014/main" id="{150712A8-3FAD-482B-72D5-1CDAA35CD467}"/>
+                  </a:ext>
+                </a:extLst>
+              </p:cNvPr>
+              <p:cNvSpPr>
+                <a:spLocks noChangeAspect="1"/>
+              </p:cNvSpPr>
+              <p:nvPr/>
+            </p:nvSpPr>
+            <p:spPr>
+              <a:xfrm>
+                <a:off x="4423063" y="3633718"/>
+                <a:ext cx="2000598" cy="290493"/>
+              </a:xfrm>
+              <a:prstGeom prst="roundRect">
+                <a:avLst/>
+              </a:prstGeom>
+              <a:noFill/>
+              <a:ln w="28575">
+                <a:solidFill>
+                  <a:srgbClr val="3E7589"/>
+                </a:solidFill>
+              </a:ln>
+            </p:spPr>
+            <p:style>
+              <a:lnRef idx="2">
+                <a:schemeClr val="accent1">
+                  <a:shade val="50000"/>
+                </a:schemeClr>
+              </a:lnRef>
+              <a:fillRef idx="1">
+                <a:schemeClr val="accent1"/>
+              </a:fillRef>
+              <a:effectRef idx="0">
+                <a:schemeClr val="accent1"/>
+              </a:effectRef>
+              <a:fontRef idx="minor">
+                <a:schemeClr val="lt1"/>
+              </a:fontRef>
+            </p:style>
+            <p:txBody>
+              <a:bodyPr rtlCol="0" anchor="ctr"/>
+              <a:lstStyle/>
+              <a:p>
+                <a:pPr algn="ctr"/>
+                <a:endParaRPr lang="en-US" sz="1200" dirty="0"/>
+              </a:p>
+            </p:txBody>
+          </p:sp>
+          <p:cxnSp>
+            <p:nvCxnSpPr>
+              <p:cNvPr id="88" name="Straight Arrow Connector 87">
+                <a:extLst>
+                  <a:ext uri="{FF2B5EF4-FFF2-40B4-BE49-F238E27FC236}">
+                    <a16:creationId xmlns:a16="http://schemas.microsoft.com/office/drawing/2014/main" id="{243B6B12-CE05-2668-7B87-27E4B6384C62}"/>
+                  </a:ext>
+                </a:extLst>
+              </p:cNvPr>
+              <p:cNvCxnSpPr>
+                <a:cxnSpLocks/>
+                <a:stCxn id="72" idx="1"/>
+                <a:endCxn id="87" idx="3"/>
+              </p:cNvCxnSpPr>
+              <p:nvPr/>
+            </p:nvCxnSpPr>
+            <p:spPr>
+              <a:xfrm flipH="1" flipV="1">
+                <a:off x="6423661" y="3778965"/>
+                <a:ext cx="1601566" cy="333973"/>
+              </a:xfrm>
+              <a:prstGeom prst="straightConnector1">
+                <a:avLst/>
+              </a:prstGeom>
+              <a:ln w="57150">
+                <a:solidFill>
+                  <a:srgbClr val="3E7589"/>
+                </a:solidFill>
+                <a:tailEnd type="triangle"/>
+              </a:ln>
+            </p:spPr>
+            <p:style>
+              <a:lnRef idx="1">
+                <a:schemeClr val="accent1"/>
+              </a:lnRef>
+              <a:fillRef idx="0">
+                <a:schemeClr val="accent1"/>
+              </a:fillRef>
+              <a:effectRef idx="0">
+                <a:schemeClr val="accent1"/>
+              </a:effectRef>
+              <a:fontRef idx="minor">
+                <a:schemeClr val="tx1"/>
+              </a:fontRef>
+            </p:style>
+          </p:cxnSp>
+        </p:grpSp>
+      </p:grpSp>
+    </p:spTree>
+    <p:extLst>
+      <p:ext uri="{BB962C8B-B14F-4D97-AF65-F5344CB8AC3E}">
+        <p14:creationId xmlns:p14="http://schemas.microsoft.com/office/powerpoint/2010/main" val="3400976736"/>
+      </p:ext>
+    </p:extLst>
+  </p:cSld>
+  <p:clrMapOvr>
+    <a:masterClrMapping/>
+  </p:clrMapOvr>
+</p:sld>
+</file>
+
+<file path=ppt/slides/slide8.xml><?xml version="1.0" encoding="utf-8"?>
+<p:sld xmlns:a="http://schemas.openxmlformats.org/drawingml/2006/main" xmlns:r="http://schemas.openxmlformats.org/officeDocument/2006/relationships" xmlns:p="http://schemas.openxmlformats.org/presentationml/2006/main">
+  <p:cSld>
+    <p:spTree>
+      <p:nvGrpSpPr>
+        <p:cNvPr id="1" name=""/>
+        <p:cNvGrpSpPr/>
+        <p:nvPr/>
+      </p:nvGrpSpPr>
+      <p:grpSpPr>
+        <a:xfrm>
+          <a:off x="0" y="0"/>
+          <a:ext cx="0" cy="0"/>
+          <a:chOff x="0" y="0"/>
+          <a:chExt cx="0" cy="0"/>
+        </a:xfrm>
+      </p:grpSpPr>
+      <p:grpSp>
+        <p:nvGrpSpPr>
+          <p:cNvPr id="78" name="Group 77">
+            <a:extLst>
+              <a:ext uri="{FF2B5EF4-FFF2-40B4-BE49-F238E27FC236}">
+                <a16:creationId xmlns:a16="http://schemas.microsoft.com/office/drawing/2014/main" id="{A266DE29-8F9E-0615-4DD1-D265CAB9B2FB}"/>
+              </a:ext>
+            </a:extLst>
+          </p:cNvPr>
+          <p:cNvGrpSpPr/>
+          <p:nvPr/>
+        </p:nvGrpSpPr>
+        <p:grpSpPr>
+          <a:xfrm>
+            <a:off x="1215624" y="222953"/>
+            <a:ext cx="9224386" cy="6101825"/>
+            <a:chOff x="1215624" y="222953"/>
+            <a:chExt cx="9224386" cy="6101825"/>
+          </a:xfrm>
+        </p:grpSpPr>
+        <p:grpSp>
+          <p:nvGrpSpPr>
+            <p:cNvPr id="76" name="Group 75">
+              <a:extLst>
+                <a:ext uri="{FF2B5EF4-FFF2-40B4-BE49-F238E27FC236}">
+                  <a16:creationId xmlns:a16="http://schemas.microsoft.com/office/drawing/2014/main" id="{533A0F37-83FE-6076-67DB-5F285B030DE3}"/>
+                </a:ext>
+              </a:extLst>
+            </p:cNvPr>
+            <p:cNvGrpSpPr>
+              <a:grpSpLocks noChangeAspect="1"/>
+            </p:cNvGrpSpPr>
+            <p:nvPr/>
+          </p:nvGrpSpPr>
+          <p:grpSpPr>
+            <a:xfrm>
+              <a:off x="2803879" y="1112515"/>
+              <a:ext cx="6174750" cy="3764197"/>
+              <a:chOff x="1879752" y="528856"/>
+              <a:chExt cx="8193736" cy="4994993"/>
+            </a:xfrm>
+          </p:grpSpPr>
+          <p:pic>
+            <p:nvPicPr>
+              <p:cNvPr id="7" name="Picture 6" descr="A screenshot of a computer&#10;&#10;Description automatically generated with medium confidence">
+                <a:extLst>
+                  <a:ext uri="{FF2B5EF4-FFF2-40B4-BE49-F238E27FC236}">
+                    <a16:creationId xmlns:a16="http://schemas.microsoft.com/office/drawing/2014/main" id="{B6ED7993-029F-3991-0E7F-B7FA2173BF82}"/>
+                  </a:ext>
+                </a:extLst>
+              </p:cNvPr>
+              <p:cNvPicPr>
+                <a:picLocks noChangeAspect="1"/>
+              </p:cNvPicPr>
+              <p:nvPr/>
+            </p:nvPicPr>
+            <p:blipFill rotWithShape="1">
+              <a:blip r:embed="rId2">
+                <a:extLst>
+                  <a:ext uri="{BEBA8EAE-BF5A-486C-A8C5-ECC9F3942E4B}">
+                    <a14:imgProps xmlns:a14="http://schemas.microsoft.com/office/drawing/2010/main">
+                      <a14:imgLayer r:embed="rId3">
+                        <a14:imgEffect>
+                          <a14:backgroundRemoval t="35981" b="69760" l="7923" r="33512">
+                            <a14:foregroundMark x1="8405" y1="35714" x2="12901" y2="38451"/>
+                            <a14:foregroundMark x1="12901" y1="38451" x2="25696" y2="40454"/>
+                            <a14:foregroundMark x1="25696" y1="40454" x2="17131" y2="38518"/>
+                            <a14:foregroundMark x1="17131" y1="38518" x2="11456" y2="39319"/>
+                            <a14:foregroundMark x1="11456" y1="39319" x2="19433" y2="55274"/>
+                            <a14:foregroundMark x1="19433" y1="55274" x2="17077" y2="64686"/>
+                            <a14:foregroundMark x1="17077" y1="64686" x2="14133" y2="67423"/>
+                            <a14:foregroundMark x1="14133" y1="67423" x2="9850" y2="69025"/>
+                            <a14:foregroundMark x1="9850" y1="69025" x2="17452" y2="68758"/>
+                            <a14:foregroundMark x1="17452" y1="68758" x2="21520" y2="69025"/>
+                            <a14:foregroundMark x1="21520" y1="69025" x2="27891" y2="67290"/>
+                            <a14:foregroundMark x1="27891" y1="67290" x2="30514" y2="63618"/>
+                            <a14:foregroundMark x1="30514" y1="63618" x2="32869" y2="49266"/>
+                            <a14:foregroundMark x1="32869" y1="49266" x2="31638" y2="40254"/>
+                            <a14:foregroundMark x1="31638" y1="40254" x2="30300" y2="38652"/>
+                            <a14:foregroundMark x1="21681" y1="61215" x2="29604" y2="59813"/>
+                            <a14:foregroundMark x1="28158" y1="68692" x2="31370" y2="68425"/>
+                            <a14:foregroundMark x1="32388" y1="60481" x2="32173" y2="68892"/>
+                            <a14:foregroundMark x1="26606" y1="69826" x2="25803" y2="58278"/>
+                            <a14:foregroundMark x1="30300" y1="41656" x2="19325" y2="36382"/>
+                            <a14:foregroundMark x1="19325" y1="36382" x2="9154" y2="36048"/>
+                            <a14:foregroundMark x1="9154" y1="36048" x2="7923" y2="42190"/>
+                            <a14:foregroundMark x1="18737" y1="36916" x2="27141" y2="36849"/>
+                            <a14:foregroundMark x1="27141" y1="36849" x2="32602" y2="38718"/>
+                            <a14:foregroundMark x1="32602" y1="38718" x2="33194" y2="41065"/>
+                            <a14:foregroundMark x1="10332" y1="40320" x2="10867" y2="40587"/>
+                            <a14:backgroundMark x1="33994" y1="41989" x2="33779" y2="42190"/>
+                          </a14:backgroundRemoval>
+                        </a14:imgEffect>
+                      </a14:imgLayer>
+                    </a14:imgProps>
+                  </a:ext>
+                  <a:ext uri="{28A0092B-C50C-407E-A947-70E740481C1C}">
+                    <a14:useLocalDpi xmlns:a14="http://schemas.microsoft.com/office/drawing/2010/main" val="0"/>
+                  </a:ext>
+                </a:extLst>
+              </a:blip>
+              <a:srcRect l="5678" t="33262" r="64664" b="28418"/>
+              <a:stretch/>
+            </p:blipFill>
+            <p:spPr>
+              <a:xfrm>
+                <a:off x="3928321" y="1334152"/>
+                <a:ext cx="4043493" cy="4189697"/>
+              </a:xfrm>
+              <a:prstGeom prst="rect">
+                <a:avLst/>
+              </a:prstGeom>
+              <a:ln>
+                <a:noFill/>
+              </a:ln>
+            </p:spPr>
+          </p:pic>
+          <p:sp>
+            <p:nvSpPr>
+              <p:cNvPr id="2" name="Rounded Rectangle 1">
+                <a:extLst>
+                  <a:ext uri="{FF2B5EF4-FFF2-40B4-BE49-F238E27FC236}">
+                    <a16:creationId xmlns:a16="http://schemas.microsoft.com/office/drawing/2014/main" id="{D5E5310E-256A-6677-3246-4A916F6DFBD2}"/>
+                  </a:ext>
+                </a:extLst>
+              </p:cNvPr>
+              <p:cNvSpPr>
+                <a:spLocks noChangeAspect="1"/>
+              </p:cNvSpPr>
+              <p:nvPr/>
+            </p:nvSpPr>
+            <p:spPr>
+              <a:xfrm>
+                <a:off x="4280088" y="1546388"/>
+                <a:ext cx="432001" cy="432000"/>
+              </a:xfrm>
+              <a:prstGeom prst="roundRect">
+                <a:avLst/>
+              </a:prstGeom>
+              <a:noFill/>
+              <a:ln w="28575">
+                <a:solidFill>
+                  <a:srgbClr val="3E7589"/>
+                </a:solidFill>
+              </a:ln>
+            </p:spPr>
+            <p:style>
+              <a:lnRef idx="2">
+                <a:schemeClr val="accent1">
+                  <a:shade val="50000"/>
+                </a:schemeClr>
+              </a:lnRef>
+              <a:fillRef idx="1">
+                <a:schemeClr val="accent1"/>
+              </a:fillRef>
+              <a:effectRef idx="0">
+                <a:schemeClr val="accent1"/>
+              </a:effectRef>
+              <a:fontRef idx="minor">
+                <a:schemeClr val="lt1"/>
+              </a:fontRef>
+            </p:style>
+            <p:txBody>
+              <a:bodyPr rtlCol="0" anchor="ctr"/>
+              <a:lstStyle/>
+              <a:p>
+                <a:pPr algn="ctr"/>
+                <a:endParaRPr lang="en-US" sz="1200" dirty="0">
+                  <a:solidFill>
+                    <a:schemeClr val="bg1"/>
+                  </a:solidFill>
+                  <a:latin typeface="Segoe UI" panose="020B0502040204020203" pitchFamily="34" charset="0"/>
+                  <a:cs typeface="Segoe UI" panose="020B0502040204020203" pitchFamily="34" charset="0"/>
+                </a:endParaRPr>
+              </a:p>
+            </p:txBody>
+          </p:sp>
+          <p:cxnSp>
+            <p:nvCxnSpPr>
+              <p:cNvPr id="44" name="Straight Arrow Connector 43">
+                <a:extLst>
+                  <a:ext uri="{FF2B5EF4-FFF2-40B4-BE49-F238E27FC236}">
+                    <a16:creationId xmlns:a16="http://schemas.microsoft.com/office/drawing/2014/main" id="{C024EB83-0961-87F9-55E3-9173CBD317C9}"/>
+                  </a:ext>
+                </a:extLst>
+              </p:cNvPr>
+              <p:cNvCxnSpPr>
+                <a:cxnSpLocks/>
+                <a:stCxn id="46" idx="2"/>
+                <a:endCxn id="2" idx="1"/>
+              </p:cNvCxnSpPr>
+              <p:nvPr/>
+            </p:nvCxnSpPr>
+            <p:spPr>
+              <a:xfrm>
+                <a:off x="3643752" y="1265087"/>
+                <a:ext cx="636336" cy="497302"/>
+              </a:xfrm>
+              <a:prstGeom prst="straightConnector1">
+                <a:avLst/>
+              </a:prstGeom>
+              <a:ln w="57150">
+                <a:solidFill>
+                  <a:srgbClr val="3E7589"/>
+                </a:solidFill>
+                <a:tailEnd type="triangle"/>
+              </a:ln>
+            </p:spPr>
+            <p:style>
+              <a:lnRef idx="1">
+                <a:schemeClr val="accent1"/>
+              </a:lnRef>
+              <a:fillRef idx="0">
+                <a:schemeClr val="accent1"/>
+              </a:fillRef>
+              <a:effectRef idx="0">
+                <a:schemeClr val="accent1"/>
+              </a:effectRef>
+              <a:fontRef idx="minor">
+                <a:schemeClr val="tx1"/>
+              </a:fontRef>
+            </p:style>
+          </p:cxnSp>
+          <p:sp>
+            <p:nvSpPr>
+              <p:cNvPr id="46" name="Rounded Rectangle 45">
+                <a:extLst>
+                  <a:ext uri="{FF2B5EF4-FFF2-40B4-BE49-F238E27FC236}">
+                    <a16:creationId xmlns:a16="http://schemas.microsoft.com/office/drawing/2014/main" id="{E2DE8832-A941-F38B-CB1F-FDBE274198DF}"/>
+                  </a:ext>
+                </a:extLst>
+              </p:cNvPr>
+              <p:cNvSpPr/>
+              <p:nvPr/>
+            </p:nvSpPr>
+            <p:spPr>
+              <a:xfrm>
+                <a:off x="2761752" y="528856"/>
+                <a:ext cx="1764000" cy="736230"/>
+              </a:xfrm>
+              <a:prstGeom prst="roundRect">
+                <a:avLst/>
+              </a:prstGeom>
+              <a:solidFill>
+                <a:srgbClr val="3E7589"/>
+              </a:solidFill>
+              <a:ln w="38100">
+                <a:solidFill>
+                  <a:srgbClr val="3E7589"/>
+                </a:solidFill>
+              </a:ln>
+            </p:spPr>
+            <p:style>
+              <a:lnRef idx="2">
+                <a:schemeClr val="accent1">
+                  <a:shade val="50000"/>
+                </a:schemeClr>
+              </a:lnRef>
+              <a:fillRef idx="1">
+                <a:schemeClr val="accent1"/>
+              </a:fillRef>
+              <a:effectRef idx="0">
+                <a:schemeClr val="accent1"/>
+              </a:effectRef>
+              <a:fontRef idx="minor">
+                <a:schemeClr val="lt1"/>
+              </a:fontRef>
+            </p:style>
+            <p:txBody>
+              <a:bodyPr rtlCol="0" anchor="ctr"/>
+              <a:lstStyle/>
+              <a:p>
+                <a:pPr algn="ctr"/>
+                <a:r>
+                  <a:rPr lang="en-US" sz="1200" b="1" dirty="0">
+                    <a:solidFill>
+                      <a:schemeClr val="bg1"/>
+                    </a:solidFill>
+                    <a:latin typeface="Segoe UI" panose="020B0502040204020203" pitchFamily="34" charset="0"/>
+                    <a:cs typeface="Segoe UI" panose="020B0502040204020203" pitchFamily="34" charset="0"/>
+                  </a:rPr>
+                  <a:t>Tank Index</a:t>
+                </a:r>
+                <a:endParaRPr lang="en-US" sz="1200" dirty="0">
+                  <a:solidFill>
+                    <a:schemeClr val="bg1"/>
+                  </a:solidFill>
+                  <a:latin typeface="Segoe UI" panose="020B0502040204020203" pitchFamily="34" charset="0"/>
+                  <a:cs typeface="Segoe UI" panose="020B0502040204020203" pitchFamily="34" charset="0"/>
+                </a:endParaRPr>
+              </a:p>
+            </p:txBody>
+          </p:sp>
+          <p:sp>
+            <p:nvSpPr>
+              <p:cNvPr id="12" name="Rounded Rectangle 1">
+                <a:extLst>
+                  <a:ext uri="{FF2B5EF4-FFF2-40B4-BE49-F238E27FC236}">
+                    <a16:creationId xmlns:a16="http://schemas.microsoft.com/office/drawing/2014/main" id="{E8DEADC2-57EC-39D0-3ECB-447758F7C60F}"/>
+                  </a:ext>
+                </a:extLst>
+              </p:cNvPr>
+              <p:cNvSpPr>
+                <a:spLocks noChangeAspect="1"/>
+              </p:cNvSpPr>
+              <p:nvPr/>
+            </p:nvSpPr>
+            <p:spPr>
+              <a:xfrm>
+                <a:off x="4715842" y="1545089"/>
+                <a:ext cx="2171340" cy="432000"/>
+              </a:xfrm>
+              <a:prstGeom prst="roundRect">
+                <a:avLst/>
+              </a:prstGeom>
+              <a:noFill/>
+              <a:ln w="28575">
+                <a:solidFill>
+                  <a:srgbClr val="3E7589"/>
+                </a:solidFill>
+              </a:ln>
+            </p:spPr>
+            <p:style>
+              <a:lnRef idx="2">
+                <a:schemeClr val="accent1">
+                  <a:shade val="50000"/>
+                </a:schemeClr>
+              </a:lnRef>
+              <a:fillRef idx="1">
+                <a:schemeClr val="accent1"/>
+              </a:fillRef>
+              <a:effectRef idx="0">
+                <a:schemeClr val="accent1"/>
+              </a:effectRef>
+              <a:fontRef idx="minor">
+                <a:schemeClr val="lt1"/>
+              </a:fontRef>
+            </p:style>
+            <p:txBody>
+              <a:bodyPr rtlCol="0" anchor="ctr"/>
+              <a:lstStyle/>
+              <a:p>
+                <a:pPr algn="ctr"/>
+                <a:endParaRPr lang="en-US" sz="1200" dirty="0">
+                  <a:solidFill>
+                    <a:schemeClr val="bg1"/>
+                  </a:solidFill>
+                  <a:latin typeface="Segoe UI" panose="020B0502040204020203" pitchFamily="34" charset="0"/>
+                  <a:cs typeface="Segoe UI" panose="020B0502040204020203" pitchFamily="34" charset="0"/>
+                </a:endParaRPr>
+              </a:p>
+            </p:txBody>
+          </p:sp>
+          <p:cxnSp>
+            <p:nvCxnSpPr>
+              <p:cNvPr id="13" name="Straight Arrow Connector 12">
+                <a:extLst>
+                  <a:ext uri="{FF2B5EF4-FFF2-40B4-BE49-F238E27FC236}">
+                    <a16:creationId xmlns:a16="http://schemas.microsoft.com/office/drawing/2014/main" id="{229C6159-8E9B-920A-C361-EA866A07225B}"/>
+                  </a:ext>
+                </a:extLst>
+              </p:cNvPr>
+              <p:cNvCxnSpPr>
+                <a:cxnSpLocks/>
+                <a:stCxn id="15" idx="2"/>
+                <a:endCxn id="12" idx="3"/>
+              </p:cNvCxnSpPr>
+              <p:nvPr/>
+            </p:nvCxnSpPr>
+            <p:spPr>
+              <a:xfrm flipH="1">
+                <a:off x="6887182" y="1265087"/>
+                <a:ext cx="1532888" cy="496003"/>
+              </a:xfrm>
+              <a:prstGeom prst="straightConnector1">
+                <a:avLst/>
+              </a:prstGeom>
+              <a:ln w="57150">
+                <a:solidFill>
+                  <a:srgbClr val="3E7589"/>
+                </a:solidFill>
+                <a:tailEnd type="triangle"/>
+              </a:ln>
+            </p:spPr>
+            <p:style>
+              <a:lnRef idx="1">
+                <a:schemeClr val="accent1"/>
+              </a:lnRef>
+              <a:fillRef idx="0">
+                <a:schemeClr val="accent1"/>
+              </a:fillRef>
+              <a:effectRef idx="0">
+                <a:schemeClr val="accent1"/>
+              </a:effectRef>
+              <a:fontRef idx="minor">
+                <a:schemeClr val="tx1"/>
+              </a:fontRef>
+            </p:style>
+          </p:cxnSp>
+          <p:sp>
+            <p:nvSpPr>
+              <p:cNvPr id="15" name="Rounded Rectangle 45">
+                <a:extLst>
+                  <a:ext uri="{FF2B5EF4-FFF2-40B4-BE49-F238E27FC236}">
+                    <a16:creationId xmlns:a16="http://schemas.microsoft.com/office/drawing/2014/main" id="{636BBC7F-C7A3-DD11-6A0E-016D2AF684C7}"/>
+                  </a:ext>
+                </a:extLst>
+              </p:cNvPr>
+              <p:cNvSpPr/>
+              <p:nvPr/>
+            </p:nvSpPr>
+            <p:spPr>
+              <a:xfrm>
+                <a:off x="7538070" y="528856"/>
+                <a:ext cx="1764000" cy="736230"/>
+              </a:xfrm>
+              <a:prstGeom prst="roundRect">
+                <a:avLst/>
+              </a:prstGeom>
+              <a:solidFill>
+                <a:srgbClr val="3E7589"/>
+              </a:solidFill>
+              <a:ln w="38100">
+                <a:solidFill>
+                  <a:srgbClr val="3E7589"/>
+                </a:solidFill>
+              </a:ln>
+            </p:spPr>
+            <p:style>
+              <a:lnRef idx="2">
+                <a:schemeClr val="accent1">
+                  <a:shade val="50000"/>
+                </a:schemeClr>
+              </a:lnRef>
+              <a:fillRef idx="1">
+                <a:schemeClr val="accent1"/>
+              </a:fillRef>
+              <a:effectRef idx="0">
+                <a:schemeClr val="accent1"/>
+              </a:effectRef>
+              <a:fontRef idx="minor">
+                <a:schemeClr val="lt1"/>
+              </a:fontRef>
+            </p:style>
+            <p:txBody>
+              <a:bodyPr rtlCol="0" anchor="ctr"/>
+              <a:lstStyle/>
+              <a:p>
+                <a:pPr algn="ctr"/>
+                <a:r>
+                  <a:rPr lang="en-US" sz="1200" b="1" dirty="0">
+                    <a:solidFill>
+                      <a:schemeClr val="bg1"/>
+                    </a:solidFill>
+                    <a:latin typeface="Segoe UI" panose="020B0502040204020203" pitchFamily="34" charset="0"/>
+                    <a:cs typeface="Segoe UI" panose="020B0502040204020203" pitchFamily="34" charset="0"/>
+                  </a:rPr>
+                  <a:t>Description</a:t>
+                </a:r>
+                <a:endParaRPr lang="en-US" sz="1200" dirty="0">
+                  <a:solidFill>
+                    <a:schemeClr val="bg1"/>
+                  </a:solidFill>
+                  <a:latin typeface="Segoe UI" panose="020B0502040204020203" pitchFamily="34" charset="0"/>
+                  <a:cs typeface="Segoe UI" panose="020B0502040204020203" pitchFamily="34" charset="0"/>
+                </a:endParaRPr>
+              </a:p>
+            </p:txBody>
+          </p:sp>
+          <p:sp>
+            <p:nvSpPr>
+              <p:cNvPr id="26" name="Rounded Rectangle 1">
+                <a:extLst>
+                  <a:ext uri="{FF2B5EF4-FFF2-40B4-BE49-F238E27FC236}">
+                    <a16:creationId xmlns:a16="http://schemas.microsoft.com/office/drawing/2014/main" id="{2F0F35A6-108E-125F-9389-D6FAA4E4AFF4}"/>
+                  </a:ext>
+                </a:extLst>
+              </p:cNvPr>
+              <p:cNvSpPr>
+                <a:spLocks/>
+              </p:cNvSpPr>
+              <p:nvPr/>
+            </p:nvSpPr>
+            <p:spPr>
+              <a:xfrm>
+                <a:off x="4357557" y="1977088"/>
+                <a:ext cx="706298" cy="322005"/>
+              </a:xfrm>
+              <a:prstGeom prst="roundRect">
+                <a:avLst/>
+              </a:prstGeom>
+              <a:noFill/>
+              <a:ln w="28575">
+                <a:solidFill>
+                  <a:srgbClr val="3E7589"/>
+                </a:solidFill>
+              </a:ln>
+            </p:spPr>
+            <p:style>
+              <a:lnRef idx="2">
+                <a:schemeClr val="accent1">
+                  <a:shade val="50000"/>
+                </a:schemeClr>
+              </a:lnRef>
+              <a:fillRef idx="1">
+                <a:schemeClr val="accent1"/>
+              </a:fillRef>
+              <a:effectRef idx="0">
+                <a:schemeClr val="accent1"/>
+              </a:effectRef>
+              <a:fontRef idx="minor">
+                <a:schemeClr val="lt1"/>
+              </a:fontRef>
+            </p:style>
+            <p:txBody>
+              <a:bodyPr rtlCol="0" anchor="ctr"/>
+              <a:lstStyle/>
+              <a:p>
+                <a:pPr algn="ctr"/>
+                <a:endParaRPr lang="en-US" sz="1200" dirty="0">
+                  <a:solidFill>
+                    <a:schemeClr val="bg1"/>
+                  </a:solidFill>
+                  <a:latin typeface="Segoe UI" panose="020B0502040204020203" pitchFamily="34" charset="0"/>
+                  <a:cs typeface="Segoe UI" panose="020B0502040204020203" pitchFamily="34" charset="0"/>
+                </a:endParaRPr>
+              </a:p>
+            </p:txBody>
+          </p:sp>
+          <p:cxnSp>
+            <p:nvCxnSpPr>
+              <p:cNvPr id="34" name="Straight Arrow Connector 33">
+                <a:extLst>
+                  <a:ext uri="{FF2B5EF4-FFF2-40B4-BE49-F238E27FC236}">
+                    <a16:creationId xmlns:a16="http://schemas.microsoft.com/office/drawing/2014/main" id="{0088ECB2-3747-2361-921A-2B7171C47BD2}"/>
+                  </a:ext>
+                </a:extLst>
+              </p:cNvPr>
+              <p:cNvCxnSpPr>
+                <a:cxnSpLocks/>
+                <a:stCxn id="35" idx="3"/>
+                <a:endCxn id="26" idx="1"/>
+              </p:cNvCxnSpPr>
+              <p:nvPr/>
+            </p:nvCxnSpPr>
+            <p:spPr>
+              <a:xfrm flipV="1">
+                <a:off x="3655979" y="2138091"/>
+                <a:ext cx="701578" cy="34845"/>
+              </a:xfrm>
+              <a:prstGeom prst="straightConnector1">
+                <a:avLst/>
+              </a:prstGeom>
+              <a:ln w="57150">
+                <a:solidFill>
+                  <a:srgbClr val="3E7589"/>
+                </a:solidFill>
+                <a:tailEnd type="triangle"/>
+              </a:ln>
+            </p:spPr>
+            <p:style>
+              <a:lnRef idx="1">
+                <a:schemeClr val="accent1"/>
+              </a:lnRef>
+              <a:fillRef idx="0">
+                <a:schemeClr val="accent1"/>
+              </a:fillRef>
+              <a:effectRef idx="0">
+                <a:schemeClr val="accent1"/>
+              </a:effectRef>
+              <a:fontRef idx="minor">
+                <a:schemeClr val="tx1"/>
+              </a:fontRef>
+            </p:style>
+          </p:cxnSp>
+          <p:sp>
+            <p:nvSpPr>
+              <p:cNvPr id="35" name="Rounded Rectangle 45">
+                <a:extLst>
+                  <a:ext uri="{FF2B5EF4-FFF2-40B4-BE49-F238E27FC236}">
+                    <a16:creationId xmlns:a16="http://schemas.microsoft.com/office/drawing/2014/main" id="{3CC099F9-1CA6-C46F-E0FE-7DECC398FEE9}"/>
+                  </a:ext>
+                </a:extLst>
+              </p:cNvPr>
+              <p:cNvSpPr/>
+              <p:nvPr/>
+            </p:nvSpPr>
+            <p:spPr>
+              <a:xfrm>
+                <a:off x="1891979" y="1804820"/>
+                <a:ext cx="1764000" cy="736230"/>
+              </a:xfrm>
+              <a:prstGeom prst="roundRect">
+                <a:avLst/>
+              </a:prstGeom>
+              <a:solidFill>
+                <a:srgbClr val="3E7589"/>
+              </a:solidFill>
+              <a:ln w="38100">
+                <a:solidFill>
+                  <a:srgbClr val="3E7589"/>
+                </a:solidFill>
+              </a:ln>
+            </p:spPr>
+            <p:style>
+              <a:lnRef idx="2">
+                <a:schemeClr val="accent1">
+                  <a:shade val="50000"/>
+                </a:schemeClr>
+              </a:lnRef>
+              <a:fillRef idx="1">
+                <a:schemeClr val="accent1"/>
+              </a:fillRef>
+              <a:effectRef idx="0">
+                <a:schemeClr val="accent1"/>
+              </a:effectRef>
+              <a:fontRef idx="minor">
+                <a:schemeClr val="lt1"/>
+              </a:fontRef>
+            </p:style>
+            <p:txBody>
+              <a:bodyPr rtlCol="0" anchor="ctr"/>
+              <a:lstStyle/>
+              <a:p>
+                <a:pPr algn="ctr"/>
+                <a:r>
+                  <a:rPr lang="en-US" sz="1200" b="1" dirty="0">
+                    <a:solidFill>
+                      <a:schemeClr val="bg1"/>
+                    </a:solidFill>
+                    <a:latin typeface="Segoe UI" panose="020B0502040204020203" pitchFamily="34" charset="0"/>
+                    <a:cs typeface="Segoe UI" panose="020B0502040204020203" pitchFamily="34" charset="0"/>
+                  </a:rPr>
+                  <a:t>Number of fish</a:t>
+                </a:r>
+                <a:endParaRPr lang="en-US" sz="1200" dirty="0">
+                  <a:solidFill>
+                    <a:schemeClr val="bg1"/>
+                  </a:solidFill>
+                  <a:latin typeface="Segoe UI" panose="020B0502040204020203" pitchFamily="34" charset="0"/>
+                  <a:cs typeface="Segoe UI" panose="020B0502040204020203" pitchFamily="34" charset="0"/>
+                </a:endParaRPr>
+              </a:p>
+            </p:txBody>
+          </p:sp>
+          <p:sp>
+            <p:nvSpPr>
+              <p:cNvPr id="47" name="Rounded Rectangle 1">
+                <a:extLst>
+                  <a:ext uri="{FF2B5EF4-FFF2-40B4-BE49-F238E27FC236}">
+                    <a16:creationId xmlns:a16="http://schemas.microsoft.com/office/drawing/2014/main" id="{4D9542DD-88CE-C0DF-42BD-5F20A7CF5C4A}"/>
+                  </a:ext>
+                </a:extLst>
+              </p:cNvPr>
+              <p:cNvSpPr>
+                <a:spLocks noChangeAspect="1"/>
+              </p:cNvSpPr>
+              <p:nvPr/>
+            </p:nvSpPr>
+            <p:spPr>
+              <a:xfrm>
+                <a:off x="4572825" y="2392730"/>
+                <a:ext cx="1333463" cy="1333463"/>
+              </a:xfrm>
+              <a:prstGeom prst="roundRect">
+                <a:avLst/>
+              </a:prstGeom>
+              <a:noFill/>
+              <a:ln w="28575">
+                <a:solidFill>
+                  <a:srgbClr val="3E7589"/>
+                </a:solidFill>
+              </a:ln>
+            </p:spPr>
+            <p:style>
+              <a:lnRef idx="2">
+                <a:schemeClr val="accent1">
+                  <a:shade val="50000"/>
+                </a:schemeClr>
+              </a:lnRef>
+              <a:fillRef idx="1">
+                <a:schemeClr val="accent1"/>
+              </a:fillRef>
+              <a:effectRef idx="0">
+                <a:schemeClr val="accent1"/>
+              </a:effectRef>
+              <a:fontRef idx="minor">
+                <a:schemeClr val="lt1"/>
+              </a:fontRef>
+            </p:style>
+            <p:txBody>
+              <a:bodyPr rtlCol="0" anchor="ctr"/>
+              <a:lstStyle/>
+              <a:p>
+                <a:pPr algn="ctr"/>
+                <a:endParaRPr lang="en-US" sz="1200" dirty="0">
+                  <a:solidFill>
+                    <a:schemeClr val="bg1"/>
+                  </a:solidFill>
+                  <a:latin typeface="Segoe UI" panose="020B0502040204020203" pitchFamily="34" charset="0"/>
+                  <a:cs typeface="Segoe UI" panose="020B0502040204020203" pitchFamily="34" charset="0"/>
+                </a:endParaRPr>
+              </a:p>
+            </p:txBody>
+          </p:sp>
+          <p:cxnSp>
+            <p:nvCxnSpPr>
+              <p:cNvPr id="48" name="Straight Arrow Connector 47">
+                <a:extLst>
+                  <a:ext uri="{FF2B5EF4-FFF2-40B4-BE49-F238E27FC236}">
+                    <a16:creationId xmlns:a16="http://schemas.microsoft.com/office/drawing/2014/main" id="{71C4DCC6-987E-2017-A930-B6C82D0E855A}"/>
+                  </a:ext>
+                </a:extLst>
+              </p:cNvPr>
+              <p:cNvCxnSpPr>
+                <a:cxnSpLocks/>
+                <a:stCxn id="50" idx="3"/>
+                <a:endCxn id="47" idx="1"/>
+              </p:cNvCxnSpPr>
+              <p:nvPr/>
+            </p:nvCxnSpPr>
+            <p:spPr>
+              <a:xfrm flipV="1">
+                <a:off x="3643752" y="3059462"/>
+                <a:ext cx="929073" cy="3460"/>
+              </a:xfrm>
+              <a:prstGeom prst="straightConnector1">
+                <a:avLst/>
+              </a:prstGeom>
+              <a:ln w="57150">
+                <a:solidFill>
+                  <a:srgbClr val="3E7589"/>
+                </a:solidFill>
+                <a:tailEnd type="triangle"/>
+              </a:ln>
+            </p:spPr>
+            <p:style>
+              <a:lnRef idx="1">
+                <a:schemeClr val="accent1"/>
+              </a:lnRef>
+              <a:fillRef idx="0">
+                <a:schemeClr val="accent1"/>
+              </a:fillRef>
+              <a:effectRef idx="0">
+                <a:schemeClr val="accent1"/>
+              </a:effectRef>
+              <a:fontRef idx="minor">
+                <a:schemeClr val="tx1"/>
+              </a:fontRef>
+            </p:style>
+          </p:cxnSp>
+          <p:sp>
+            <p:nvSpPr>
+              <p:cNvPr id="50" name="Rounded Rectangle 45">
+                <a:extLst>
+                  <a:ext uri="{FF2B5EF4-FFF2-40B4-BE49-F238E27FC236}">
+                    <a16:creationId xmlns:a16="http://schemas.microsoft.com/office/drawing/2014/main" id="{4CC0B4C2-1229-4748-7035-ED23D8A4483A}"/>
+                  </a:ext>
+                </a:extLst>
+              </p:cNvPr>
+              <p:cNvSpPr/>
+              <p:nvPr/>
+            </p:nvSpPr>
+            <p:spPr>
+              <a:xfrm>
+                <a:off x="1879752" y="2694807"/>
+                <a:ext cx="1764000" cy="736230"/>
+              </a:xfrm>
+              <a:prstGeom prst="roundRect">
+                <a:avLst/>
+              </a:prstGeom>
+              <a:solidFill>
+                <a:srgbClr val="3E7589"/>
+              </a:solidFill>
+              <a:ln w="38100">
+                <a:solidFill>
+                  <a:srgbClr val="3E7589"/>
+                </a:solidFill>
+              </a:ln>
+            </p:spPr>
+            <p:style>
+              <a:lnRef idx="2">
+                <a:schemeClr val="accent1">
+                  <a:shade val="50000"/>
+                </a:schemeClr>
+              </a:lnRef>
+              <a:fillRef idx="1">
+                <a:schemeClr val="accent1"/>
+              </a:fillRef>
+              <a:effectRef idx="0">
+                <a:schemeClr val="accent1"/>
+              </a:effectRef>
+              <a:fontRef idx="minor">
+                <a:schemeClr val="lt1"/>
+              </a:fontRef>
+            </p:style>
+            <p:txBody>
+              <a:bodyPr rtlCol="0" anchor="ctr"/>
+              <a:lstStyle/>
+              <a:p>
+                <a:pPr algn="ctr"/>
+                <a:r>
+                  <a:rPr lang="en-US" sz="1200" b="1" dirty="0">
+                    <a:solidFill>
+                      <a:schemeClr val="bg1"/>
+                    </a:solidFill>
+                    <a:latin typeface="Segoe UI" panose="020B0502040204020203" pitchFamily="34" charset="0"/>
+                    <a:cs typeface="Segoe UI" panose="020B0502040204020203" pitchFamily="34" charset="0"/>
+                  </a:rPr>
+                  <a:t>Ammonia</a:t>
+                </a:r>
+                <a:endParaRPr lang="en-US" sz="1200" dirty="0">
+                  <a:solidFill>
+                    <a:schemeClr val="bg1"/>
+                  </a:solidFill>
+                  <a:latin typeface="Segoe UI" panose="020B0502040204020203" pitchFamily="34" charset="0"/>
+                  <a:cs typeface="Segoe UI" panose="020B0502040204020203" pitchFamily="34" charset="0"/>
+                </a:endParaRPr>
+              </a:p>
+            </p:txBody>
+          </p:sp>
+          <p:sp>
+            <p:nvSpPr>
+              <p:cNvPr id="62" name="Rounded Rectangle 1">
+                <a:extLst>
+                  <a:ext uri="{FF2B5EF4-FFF2-40B4-BE49-F238E27FC236}">
+                    <a16:creationId xmlns:a16="http://schemas.microsoft.com/office/drawing/2014/main" id="{66B966F6-5BEF-C32A-6BA4-83C358904FC7}"/>
+                  </a:ext>
+                </a:extLst>
+              </p:cNvPr>
+              <p:cNvSpPr>
+                <a:spLocks noChangeAspect="1"/>
+              </p:cNvSpPr>
+              <p:nvPr/>
+            </p:nvSpPr>
+            <p:spPr>
+              <a:xfrm>
+                <a:off x="4558977" y="3883345"/>
+                <a:ext cx="1333463" cy="1333463"/>
+              </a:xfrm>
+              <a:prstGeom prst="roundRect">
+                <a:avLst/>
+              </a:prstGeom>
+              <a:noFill/>
+              <a:ln w="28575">
+                <a:solidFill>
+                  <a:srgbClr val="3E7589"/>
+                </a:solidFill>
+              </a:ln>
+            </p:spPr>
+            <p:style>
+              <a:lnRef idx="2">
+                <a:schemeClr val="accent1">
+                  <a:shade val="50000"/>
+                </a:schemeClr>
+              </a:lnRef>
+              <a:fillRef idx="1">
+                <a:schemeClr val="accent1"/>
+              </a:fillRef>
+              <a:effectRef idx="0">
+                <a:schemeClr val="accent1"/>
+              </a:effectRef>
+              <a:fontRef idx="minor">
+                <a:schemeClr val="lt1"/>
+              </a:fontRef>
+            </p:style>
+            <p:txBody>
+              <a:bodyPr rtlCol="0" anchor="ctr"/>
+              <a:lstStyle/>
+              <a:p>
+                <a:pPr algn="ctr"/>
+                <a:endParaRPr lang="en-US" sz="1200" dirty="0">
+                  <a:solidFill>
+                    <a:schemeClr val="bg1"/>
+                  </a:solidFill>
+                  <a:latin typeface="Segoe UI" panose="020B0502040204020203" pitchFamily="34" charset="0"/>
+                  <a:cs typeface="Segoe UI" panose="020B0502040204020203" pitchFamily="34" charset="0"/>
+                </a:endParaRPr>
+              </a:p>
+            </p:txBody>
+          </p:sp>
+          <p:cxnSp>
+            <p:nvCxnSpPr>
+              <p:cNvPr id="63" name="Straight Arrow Connector 62">
+                <a:extLst>
+                  <a:ext uri="{FF2B5EF4-FFF2-40B4-BE49-F238E27FC236}">
+                    <a16:creationId xmlns:a16="http://schemas.microsoft.com/office/drawing/2014/main" id="{DFAED5BB-72D7-8F97-254E-9A2CDAAFC324}"/>
+                  </a:ext>
+                </a:extLst>
+              </p:cNvPr>
+              <p:cNvCxnSpPr>
+                <a:cxnSpLocks/>
+                <a:stCxn id="64" idx="3"/>
+                <a:endCxn id="62" idx="1"/>
+              </p:cNvCxnSpPr>
+              <p:nvPr/>
+            </p:nvCxnSpPr>
+            <p:spPr>
+              <a:xfrm flipV="1">
+                <a:off x="3643752" y="4550077"/>
+                <a:ext cx="915225" cy="15685"/>
+              </a:xfrm>
+              <a:prstGeom prst="straightConnector1">
+                <a:avLst/>
+              </a:prstGeom>
+              <a:ln w="57150">
+                <a:solidFill>
+                  <a:srgbClr val="3E7589"/>
+                </a:solidFill>
+                <a:tailEnd type="triangle"/>
+              </a:ln>
+            </p:spPr>
+            <p:style>
+              <a:lnRef idx="1">
+                <a:schemeClr val="accent1"/>
+              </a:lnRef>
+              <a:fillRef idx="0">
+                <a:schemeClr val="accent1"/>
+              </a:fillRef>
+              <a:effectRef idx="0">
+                <a:schemeClr val="accent1"/>
+              </a:effectRef>
+              <a:fontRef idx="minor">
+                <a:schemeClr val="tx1"/>
+              </a:fontRef>
+            </p:style>
+          </p:cxnSp>
+          <p:sp>
+            <p:nvSpPr>
+              <p:cNvPr id="64" name="Rounded Rectangle 45">
+                <a:extLst>
+                  <a:ext uri="{FF2B5EF4-FFF2-40B4-BE49-F238E27FC236}">
+                    <a16:creationId xmlns:a16="http://schemas.microsoft.com/office/drawing/2014/main" id="{3110E6BC-83C2-46F7-5261-45888F78B23A}"/>
+                  </a:ext>
+                </a:extLst>
+              </p:cNvPr>
+              <p:cNvSpPr/>
+              <p:nvPr/>
+            </p:nvSpPr>
+            <p:spPr>
+              <a:xfrm>
+                <a:off x="1879752" y="4197647"/>
+                <a:ext cx="1764000" cy="736230"/>
+              </a:xfrm>
+              <a:prstGeom prst="roundRect">
+                <a:avLst/>
+              </a:prstGeom>
+              <a:solidFill>
+                <a:srgbClr val="3E7589"/>
+              </a:solidFill>
+              <a:ln w="38100">
+                <a:solidFill>
+                  <a:srgbClr val="3E7589"/>
+                </a:solidFill>
+              </a:ln>
+            </p:spPr>
+            <p:style>
+              <a:lnRef idx="2">
+                <a:schemeClr val="accent1">
+                  <a:shade val="50000"/>
+                </a:schemeClr>
+              </a:lnRef>
+              <a:fillRef idx="1">
+                <a:schemeClr val="accent1"/>
+              </a:fillRef>
+              <a:effectRef idx="0">
+                <a:schemeClr val="accent1"/>
+              </a:effectRef>
+              <a:fontRef idx="minor">
+                <a:schemeClr val="lt1"/>
+              </a:fontRef>
+            </p:style>
+            <p:txBody>
+              <a:bodyPr rtlCol="0" anchor="ctr"/>
+              <a:lstStyle/>
+              <a:p>
+                <a:pPr algn="ctr"/>
+                <a:r>
+                  <a:rPr lang="en-US" sz="1200" b="1" dirty="0">
+                    <a:solidFill>
+                      <a:schemeClr val="bg1"/>
+                    </a:solidFill>
+                    <a:latin typeface="Segoe UI" panose="020B0502040204020203" pitchFamily="34" charset="0"/>
+                    <a:cs typeface="Segoe UI" panose="020B0502040204020203" pitchFamily="34" charset="0"/>
+                  </a:rPr>
+                  <a:t>pH </a:t>
+                </a:r>
+                <a:endParaRPr lang="en-US" sz="1200" dirty="0">
+                  <a:solidFill>
+                    <a:schemeClr val="bg1"/>
+                  </a:solidFill>
+                  <a:latin typeface="Segoe UI" panose="020B0502040204020203" pitchFamily="34" charset="0"/>
+                  <a:cs typeface="Segoe UI" panose="020B0502040204020203" pitchFamily="34" charset="0"/>
+                </a:endParaRPr>
+              </a:p>
+            </p:txBody>
+          </p:sp>
+          <p:sp>
+            <p:nvSpPr>
+              <p:cNvPr id="69" name="Rounded Rectangle 1">
+                <a:extLst>
+                  <a:ext uri="{FF2B5EF4-FFF2-40B4-BE49-F238E27FC236}">
+                    <a16:creationId xmlns:a16="http://schemas.microsoft.com/office/drawing/2014/main" id="{27F15308-E9EB-2555-FA49-81262EF64E24}"/>
+                  </a:ext>
+                </a:extLst>
+              </p:cNvPr>
+              <p:cNvSpPr>
+                <a:spLocks noChangeAspect="1"/>
+              </p:cNvSpPr>
+              <p:nvPr/>
+            </p:nvSpPr>
+            <p:spPr>
+              <a:xfrm>
+                <a:off x="6117519" y="2380157"/>
+                <a:ext cx="1333463" cy="1333463"/>
+              </a:xfrm>
+              <a:prstGeom prst="roundRect">
+                <a:avLst/>
+              </a:prstGeom>
+              <a:noFill/>
+              <a:ln w="28575">
+                <a:solidFill>
+                  <a:srgbClr val="3E7589"/>
+                </a:solidFill>
+              </a:ln>
+            </p:spPr>
+            <p:style>
+              <a:lnRef idx="2">
+                <a:schemeClr val="accent1">
+                  <a:shade val="50000"/>
+                </a:schemeClr>
+              </a:lnRef>
+              <a:fillRef idx="1">
+                <a:schemeClr val="accent1"/>
+              </a:fillRef>
+              <a:effectRef idx="0">
+                <a:schemeClr val="accent1"/>
+              </a:effectRef>
+              <a:fontRef idx="minor">
+                <a:schemeClr val="lt1"/>
+              </a:fontRef>
+            </p:style>
+            <p:txBody>
+              <a:bodyPr rtlCol="0" anchor="ctr"/>
+              <a:lstStyle/>
+              <a:p>
+                <a:pPr algn="ctr"/>
+                <a:endParaRPr lang="en-US" sz="1200" dirty="0">
+                  <a:solidFill>
+                    <a:schemeClr val="bg1"/>
+                  </a:solidFill>
+                  <a:latin typeface="Segoe UI" panose="020B0502040204020203" pitchFamily="34" charset="0"/>
+                  <a:cs typeface="Segoe UI" panose="020B0502040204020203" pitchFamily="34" charset="0"/>
+                </a:endParaRPr>
+              </a:p>
+            </p:txBody>
+          </p:sp>
+          <p:cxnSp>
+            <p:nvCxnSpPr>
+              <p:cNvPr id="70" name="Straight Arrow Connector 69">
+                <a:extLst>
+                  <a:ext uri="{FF2B5EF4-FFF2-40B4-BE49-F238E27FC236}">
+                    <a16:creationId xmlns:a16="http://schemas.microsoft.com/office/drawing/2014/main" id="{5807421E-594F-8753-D1CE-D9A58FD3B2D0}"/>
+                  </a:ext>
+                </a:extLst>
+              </p:cNvPr>
+              <p:cNvCxnSpPr>
+                <a:cxnSpLocks/>
+                <a:stCxn id="71" idx="1"/>
+                <a:endCxn id="69" idx="3"/>
+              </p:cNvCxnSpPr>
+              <p:nvPr/>
+            </p:nvCxnSpPr>
+            <p:spPr>
+              <a:xfrm flipH="1">
+                <a:off x="7450982" y="3028798"/>
+                <a:ext cx="858506" cy="18091"/>
+              </a:xfrm>
+              <a:prstGeom prst="straightConnector1">
+                <a:avLst/>
+              </a:prstGeom>
+              <a:ln w="57150">
+                <a:solidFill>
+                  <a:srgbClr val="3E7589"/>
+                </a:solidFill>
+                <a:tailEnd type="triangle"/>
+              </a:ln>
+            </p:spPr>
+            <p:style>
+              <a:lnRef idx="1">
+                <a:schemeClr val="accent1"/>
+              </a:lnRef>
+              <a:fillRef idx="0">
+                <a:schemeClr val="accent1"/>
+              </a:fillRef>
+              <a:effectRef idx="0">
+                <a:schemeClr val="accent1"/>
+              </a:effectRef>
+              <a:fontRef idx="minor">
+                <a:schemeClr val="tx1"/>
+              </a:fontRef>
+            </p:style>
+          </p:cxnSp>
+          <p:sp>
+            <p:nvSpPr>
+              <p:cNvPr id="71" name="Rounded Rectangle 45">
+                <a:extLst>
+                  <a:ext uri="{FF2B5EF4-FFF2-40B4-BE49-F238E27FC236}">
+                    <a16:creationId xmlns:a16="http://schemas.microsoft.com/office/drawing/2014/main" id="{4A0638B9-C47B-D8DC-8810-7213FF879CA9}"/>
+                  </a:ext>
+                </a:extLst>
+              </p:cNvPr>
+              <p:cNvSpPr/>
+              <p:nvPr/>
+            </p:nvSpPr>
+            <p:spPr>
+              <a:xfrm>
+                <a:off x="8309488" y="2660683"/>
+                <a:ext cx="1764000" cy="736230"/>
+              </a:xfrm>
+              <a:prstGeom prst="roundRect">
+                <a:avLst/>
+              </a:prstGeom>
+              <a:solidFill>
+                <a:srgbClr val="3E7589"/>
+              </a:solidFill>
+              <a:ln w="38100">
+                <a:solidFill>
+                  <a:srgbClr val="3E7589"/>
+                </a:solidFill>
+              </a:ln>
+            </p:spPr>
+            <p:style>
+              <a:lnRef idx="2">
+                <a:schemeClr val="accent1">
+                  <a:shade val="50000"/>
+                </a:schemeClr>
+              </a:lnRef>
+              <a:fillRef idx="1">
+                <a:schemeClr val="accent1"/>
+              </a:fillRef>
+              <a:effectRef idx="0">
+                <a:schemeClr val="accent1"/>
+              </a:effectRef>
+              <a:fontRef idx="minor">
+                <a:schemeClr val="lt1"/>
+              </a:fontRef>
+            </p:style>
+            <p:txBody>
+              <a:bodyPr rtlCol="0" anchor="ctr"/>
+              <a:lstStyle/>
+              <a:p>
+                <a:pPr algn="ctr"/>
+                <a:r>
+                  <a:rPr lang="en-US" sz="1200" b="1" dirty="0">
+                    <a:solidFill>
+                      <a:schemeClr val="bg1"/>
+                    </a:solidFill>
+                    <a:latin typeface="Segoe UI" panose="020B0502040204020203" pitchFamily="34" charset="0"/>
+                    <a:cs typeface="Segoe UI" panose="020B0502040204020203" pitchFamily="34" charset="0"/>
+                  </a:rPr>
+                  <a:t>Temperature</a:t>
+                </a:r>
+                <a:endParaRPr lang="en-US" sz="1200" dirty="0">
+                  <a:solidFill>
+                    <a:schemeClr val="bg1"/>
+                  </a:solidFill>
+                  <a:latin typeface="Segoe UI" panose="020B0502040204020203" pitchFamily="34" charset="0"/>
+                  <a:cs typeface="Segoe UI" panose="020B0502040204020203" pitchFamily="34" charset="0"/>
+                </a:endParaRPr>
+              </a:p>
+            </p:txBody>
+          </p:sp>
+        </p:grpSp>
+        <p:sp>
+          <p:nvSpPr>
+            <p:cNvPr id="77" name="Rectangle 76">
+              <a:extLst>
+                <a:ext uri="{FF2B5EF4-FFF2-40B4-BE49-F238E27FC236}">
+                  <a16:creationId xmlns:a16="http://schemas.microsoft.com/office/drawing/2014/main" id="{A02EB584-1BF8-4DCF-F500-2D11E787CBAF}"/>
+                </a:ext>
+              </a:extLst>
+            </p:cNvPr>
+            <p:cNvSpPr/>
+            <p:nvPr/>
+          </p:nvSpPr>
+          <p:spPr>
+            <a:xfrm>
+              <a:off x="1215624" y="222953"/>
+              <a:ext cx="9224386" cy="6101825"/>
+            </a:xfrm>
+            <a:prstGeom prst="rect">
+              <a:avLst/>
+            </a:prstGeom>
+            <a:noFill/>
+            <a:ln>
+              <a:noFill/>
+            </a:ln>
+          </p:spPr>
+          <p:style>
+            <a:lnRef idx="2">
+              <a:schemeClr val="accent1">
+                <a:shade val="50000"/>
+              </a:schemeClr>
+            </a:lnRef>
+            <a:fillRef idx="1">
+              <a:schemeClr val="accent1"/>
+            </a:fillRef>
+            <a:effectRef idx="0">
+              <a:schemeClr val="accent1"/>
+            </a:effectRef>
+            <a:fontRef idx="minor">
+              <a:schemeClr val="lt1"/>
+            </a:fontRef>
+          </p:style>
+          <p:txBody>
+            <a:bodyPr rtlCol="0" anchor="ctr"/>
+            <a:lstStyle/>
+            <a:p>
+              <a:pPr algn="ctr"/>
+              <a:endParaRPr lang="en-SG"/>
+            </a:p>
+          </p:txBody>
+        </p:sp>
+      </p:grpSp>
+    </p:spTree>
+    <p:extLst>
+      <p:ext uri="{BB962C8B-B14F-4D97-AF65-F5344CB8AC3E}">
+        <p14:creationId xmlns:p14="http://schemas.microsoft.com/office/powerpoint/2010/main" val="1772218650"/>
+      </p:ext>
+    </p:extLst>
+  </p:cSld>
+  <p:clrMapOvr>
+    <a:masterClrMapping/>
+  </p:clrMapOvr>
+</p:sld>
+</file>
+
 <file path=ppt/theme/theme1.xml><?xml version="1.0" encoding="utf-8"?>
 <a:theme xmlns:a="http://schemas.openxmlformats.org/drawingml/2006/main" name="Office Theme">
   <a:themeElements>

</xml_diff>